<commit_message>
add diagram of loop closure
</commit_message>
<xml_diff>
--- a/Diagrams.pptx
+++ b/Diagrams.pptx
@@ -6,6 +6,8 @@
   </p:sldMasterIdLst>
   <p:sldIdLst>
     <p:sldId id="256" r:id="rId2"/>
+    <p:sldId id="257" r:id="rId3"/>
+    <p:sldId id="258" r:id="rId4"/>
   </p:sldIdLst>
   <p:sldSz cx="12192000" cy="6858000"/>
   <p:notesSz cx="6858000" cy="9144000"/>
@@ -104,6 +106,11 @@
       </a:defRPr>
     </a:lvl9pPr>
   </p:defaultTextStyle>
+  <p:extLst>
+    <p:ext uri="{EFAFB233-063F-42B5-8137-9DF3F51BA10A}">
+      <p15:sldGuideLst xmlns:p15="http://schemas.microsoft.com/office/powerpoint/2012/main"/>
+    </p:ext>
+  </p:extLst>
 </p:presentation>
 </file>
 
@@ -254,7 +261,7 @@
           <a:p>
             <a:fld id="{353E9D2D-3B11-4ED7-9E14-A57937F35400}" type="datetimeFigureOut">
               <a:rPr kumimoji="1" lang="ja-JP" altLang="en-US" smtClean="0"/>
-              <a:t>2019/8/2</a:t>
+              <a:t>2019/8/4</a:t>
             </a:fld>
             <a:endParaRPr kumimoji="1" lang="ja-JP" altLang="en-US"/>
           </a:p>
@@ -484,7 +491,7 @@
           <a:p>
             <a:fld id="{353E9D2D-3B11-4ED7-9E14-A57937F35400}" type="datetimeFigureOut">
               <a:rPr kumimoji="1" lang="ja-JP" altLang="en-US" smtClean="0"/>
-              <a:t>2019/8/2</a:t>
+              <a:t>2019/8/4</a:t>
             </a:fld>
             <a:endParaRPr kumimoji="1" lang="ja-JP" altLang="en-US"/>
           </a:p>
@@ -724,7 +731,7 @@
           <a:p>
             <a:fld id="{353E9D2D-3B11-4ED7-9E14-A57937F35400}" type="datetimeFigureOut">
               <a:rPr kumimoji="1" lang="ja-JP" altLang="en-US" smtClean="0"/>
-              <a:t>2019/8/2</a:t>
+              <a:t>2019/8/4</a:t>
             </a:fld>
             <a:endParaRPr kumimoji="1" lang="ja-JP" altLang="en-US"/>
           </a:p>
@@ -954,7 +961,7 @@
           <a:p>
             <a:fld id="{353E9D2D-3B11-4ED7-9E14-A57937F35400}" type="datetimeFigureOut">
               <a:rPr kumimoji="1" lang="ja-JP" altLang="en-US" smtClean="0"/>
-              <a:t>2019/8/2</a:t>
+              <a:t>2019/8/4</a:t>
             </a:fld>
             <a:endParaRPr kumimoji="1" lang="ja-JP" altLang="en-US"/>
           </a:p>
@@ -1229,7 +1236,7 @@
           <a:p>
             <a:fld id="{353E9D2D-3B11-4ED7-9E14-A57937F35400}" type="datetimeFigureOut">
               <a:rPr kumimoji="1" lang="ja-JP" altLang="en-US" smtClean="0"/>
-              <a:t>2019/8/2</a:t>
+              <a:t>2019/8/4</a:t>
             </a:fld>
             <a:endParaRPr kumimoji="1" lang="ja-JP" altLang="en-US"/>
           </a:p>
@@ -1558,7 +1565,7 @@
           <a:p>
             <a:fld id="{353E9D2D-3B11-4ED7-9E14-A57937F35400}" type="datetimeFigureOut">
               <a:rPr kumimoji="1" lang="ja-JP" altLang="en-US" smtClean="0"/>
-              <a:t>2019/8/2</a:t>
+              <a:t>2019/8/4</a:t>
             </a:fld>
             <a:endParaRPr kumimoji="1" lang="ja-JP" altLang="en-US"/>
           </a:p>
@@ -2034,7 +2041,7 @@
           <a:p>
             <a:fld id="{353E9D2D-3B11-4ED7-9E14-A57937F35400}" type="datetimeFigureOut">
               <a:rPr kumimoji="1" lang="ja-JP" altLang="en-US" smtClean="0"/>
-              <a:t>2019/8/2</a:t>
+              <a:t>2019/8/4</a:t>
             </a:fld>
             <a:endParaRPr kumimoji="1" lang="ja-JP" altLang="en-US"/>
           </a:p>
@@ -2175,7 +2182,7 @@
           <a:p>
             <a:fld id="{353E9D2D-3B11-4ED7-9E14-A57937F35400}" type="datetimeFigureOut">
               <a:rPr kumimoji="1" lang="ja-JP" altLang="en-US" smtClean="0"/>
-              <a:t>2019/8/2</a:t>
+              <a:t>2019/8/4</a:t>
             </a:fld>
             <a:endParaRPr kumimoji="1" lang="ja-JP" altLang="en-US"/>
           </a:p>
@@ -2288,7 +2295,7 @@
           <a:p>
             <a:fld id="{353E9D2D-3B11-4ED7-9E14-A57937F35400}" type="datetimeFigureOut">
               <a:rPr kumimoji="1" lang="ja-JP" altLang="en-US" smtClean="0"/>
-              <a:t>2019/8/2</a:t>
+              <a:t>2019/8/4</a:t>
             </a:fld>
             <a:endParaRPr kumimoji="1" lang="ja-JP" altLang="en-US"/>
           </a:p>
@@ -2631,7 +2638,7 @@
           <a:p>
             <a:fld id="{353E9D2D-3B11-4ED7-9E14-A57937F35400}" type="datetimeFigureOut">
               <a:rPr kumimoji="1" lang="ja-JP" altLang="en-US" smtClean="0"/>
-              <a:t>2019/8/2</a:t>
+              <a:t>2019/8/4</a:t>
             </a:fld>
             <a:endParaRPr kumimoji="1" lang="ja-JP" altLang="en-US"/>
           </a:p>
@@ -2919,7 +2926,7 @@
           <a:p>
             <a:fld id="{353E9D2D-3B11-4ED7-9E14-A57937F35400}" type="datetimeFigureOut">
               <a:rPr kumimoji="1" lang="ja-JP" altLang="en-US" smtClean="0"/>
-              <a:t>2019/8/2</a:t>
+              <a:t>2019/8/4</a:t>
             </a:fld>
             <a:endParaRPr kumimoji="1" lang="ja-JP" altLang="en-US"/>
           </a:p>
@@ -3192,7 +3199,7 @@
           <a:p>
             <a:fld id="{353E9D2D-3B11-4ED7-9E14-A57937F35400}" type="datetimeFigureOut">
               <a:rPr kumimoji="1" lang="ja-JP" altLang="en-US" smtClean="0"/>
-              <a:t>2019/8/2</a:t>
+              <a:t>2019/8/4</a:t>
             </a:fld>
             <a:endParaRPr kumimoji="1" lang="ja-JP" altLang="en-US"/>
           </a:p>
@@ -4307,8 +4314,8 @@
           </a:fontRef>
         </p:style>
       </p:cxnSp>
-      <mc:AlternateContent xmlns:mc="http://schemas.openxmlformats.org/markup-compatibility/2006">
-        <mc:Choice xmlns:a14="http://schemas.microsoft.com/office/drawing/2010/main" Requires="a14">
+      <mc:AlternateContent xmlns:mc="http://schemas.openxmlformats.org/markup-compatibility/2006" xmlns:a14="http://schemas.microsoft.com/office/drawing/2010/main">
+        <mc:Choice Requires="a14">
           <p:sp>
             <p:nvSpPr>
               <p:cNvPr id="37" name="テキスト ボックス 36">
@@ -4377,7 +4384,7 @@
             </p:txBody>
           </p:sp>
         </mc:Choice>
-        <mc:Fallback>
+        <mc:Fallback xmlns="">
           <p:sp>
             <p:nvSpPr>
               <p:cNvPr id="37" name="テキスト ボックス 36">
@@ -4422,8 +4429,8 @@
           </p:sp>
         </mc:Fallback>
       </mc:AlternateContent>
-      <mc:AlternateContent xmlns:mc="http://schemas.openxmlformats.org/markup-compatibility/2006">
-        <mc:Choice xmlns:a14="http://schemas.microsoft.com/office/drawing/2010/main" Requires="a14">
+      <mc:AlternateContent xmlns:mc="http://schemas.openxmlformats.org/markup-compatibility/2006" xmlns:a14="http://schemas.microsoft.com/office/drawing/2010/main">
+        <mc:Choice Requires="a14">
           <p:sp>
             <p:nvSpPr>
               <p:cNvPr id="38" name="テキスト ボックス 37">
@@ -4492,7 +4499,7 @@
             </p:txBody>
           </p:sp>
         </mc:Choice>
-        <mc:Fallback>
+        <mc:Fallback xmlns="">
           <p:sp>
             <p:nvSpPr>
               <p:cNvPr id="38" name="テキスト ボックス 37">
@@ -4537,8 +4544,8 @@
           </p:sp>
         </mc:Fallback>
       </mc:AlternateContent>
-      <mc:AlternateContent xmlns:mc="http://schemas.openxmlformats.org/markup-compatibility/2006">
-        <mc:Choice xmlns:a14="http://schemas.microsoft.com/office/drawing/2010/main" Requires="a14">
+      <mc:AlternateContent xmlns:mc="http://schemas.openxmlformats.org/markup-compatibility/2006" xmlns:a14="http://schemas.microsoft.com/office/drawing/2010/main">
+        <mc:Choice Requires="a14">
           <p:sp>
             <p:nvSpPr>
               <p:cNvPr id="39" name="テキスト ボックス 38">
@@ -4607,7 +4614,7 @@
             </p:txBody>
           </p:sp>
         </mc:Choice>
-        <mc:Fallback>
+        <mc:Fallback xmlns="">
           <p:sp>
             <p:nvSpPr>
               <p:cNvPr id="39" name="テキスト ボックス 38">
@@ -4652,8 +4659,8 @@
           </p:sp>
         </mc:Fallback>
       </mc:AlternateContent>
-      <mc:AlternateContent xmlns:mc="http://schemas.openxmlformats.org/markup-compatibility/2006">
-        <mc:Choice xmlns:a14="http://schemas.microsoft.com/office/drawing/2010/main" Requires="a14">
+      <mc:AlternateContent xmlns:mc="http://schemas.openxmlformats.org/markup-compatibility/2006" xmlns:a14="http://schemas.microsoft.com/office/drawing/2010/main">
+        <mc:Choice Requires="a14">
           <p:sp>
             <p:nvSpPr>
               <p:cNvPr id="40" name="テキスト ボックス 39">
@@ -4722,7 +4729,7 @@
             </p:txBody>
           </p:sp>
         </mc:Choice>
-        <mc:Fallback>
+        <mc:Fallback xmlns="">
           <p:sp>
             <p:nvSpPr>
               <p:cNvPr id="40" name="テキスト ボックス 39">
@@ -4767,8 +4774,8 @@
           </p:sp>
         </mc:Fallback>
       </mc:AlternateContent>
-      <mc:AlternateContent xmlns:mc="http://schemas.openxmlformats.org/markup-compatibility/2006">
-        <mc:Choice xmlns:a14="http://schemas.microsoft.com/office/drawing/2010/main" Requires="a14">
+      <mc:AlternateContent xmlns:mc="http://schemas.openxmlformats.org/markup-compatibility/2006" xmlns:a14="http://schemas.microsoft.com/office/drawing/2010/main">
+        <mc:Choice Requires="a14">
           <p:sp>
             <p:nvSpPr>
               <p:cNvPr id="41" name="テキスト ボックス 40">
@@ -4837,7 +4844,7 @@
             </p:txBody>
           </p:sp>
         </mc:Choice>
-        <mc:Fallback>
+        <mc:Fallback xmlns="">
           <p:sp>
             <p:nvSpPr>
               <p:cNvPr id="41" name="テキスト ボックス 40">
@@ -4882,8 +4889,8 @@
           </p:sp>
         </mc:Fallback>
       </mc:AlternateContent>
-      <mc:AlternateContent xmlns:mc="http://schemas.openxmlformats.org/markup-compatibility/2006">
-        <mc:Choice xmlns:a14="http://schemas.microsoft.com/office/drawing/2010/main" Requires="a14">
+      <mc:AlternateContent xmlns:mc="http://schemas.openxmlformats.org/markup-compatibility/2006" xmlns:a14="http://schemas.microsoft.com/office/drawing/2010/main">
+        <mc:Choice Requires="a14">
           <p:sp>
             <p:nvSpPr>
               <p:cNvPr id="42" name="テキスト ボックス 41">
@@ -4952,7 +4959,7 @@
             </p:txBody>
           </p:sp>
         </mc:Choice>
-        <mc:Fallback>
+        <mc:Fallback xmlns="">
           <p:sp>
             <p:nvSpPr>
               <p:cNvPr id="42" name="テキスト ボックス 41">
@@ -4997,8 +5004,8 @@
           </p:sp>
         </mc:Fallback>
       </mc:AlternateContent>
-      <mc:AlternateContent xmlns:mc="http://schemas.openxmlformats.org/markup-compatibility/2006">
-        <mc:Choice xmlns:a14="http://schemas.microsoft.com/office/drawing/2010/main" Requires="a14">
+      <mc:AlternateContent xmlns:mc="http://schemas.openxmlformats.org/markup-compatibility/2006" xmlns:a14="http://schemas.microsoft.com/office/drawing/2010/main">
+        <mc:Choice Requires="a14">
           <p:sp>
             <p:nvSpPr>
               <p:cNvPr id="43" name="テキスト ボックス 42">
@@ -5067,7 +5074,7 @@
             </p:txBody>
           </p:sp>
         </mc:Choice>
-        <mc:Fallback>
+        <mc:Fallback xmlns="">
           <p:sp>
             <p:nvSpPr>
               <p:cNvPr id="43" name="テキスト ボックス 42">
@@ -5112,8 +5119,8 @@
           </p:sp>
         </mc:Fallback>
       </mc:AlternateContent>
-      <mc:AlternateContent xmlns:mc="http://schemas.openxmlformats.org/markup-compatibility/2006">
-        <mc:Choice xmlns:a14="http://schemas.microsoft.com/office/drawing/2010/main" Requires="a14">
+      <mc:AlternateContent xmlns:mc="http://schemas.openxmlformats.org/markup-compatibility/2006" xmlns:a14="http://schemas.microsoft.com/office/drawing/2010/main">
+        <mc:Choice Requires="a14">
           <p:sp>
             <p:nvSpPr>
               <p:cNvPr id="44" name="テキスト ボックス 43">
@@ -5182,7 +5189,7 @@
             </p:txBody>
           </p:sp>
         </mc:Choice>
-        <mc:Fallback>
+        <mc:Fallback xmlns="">
           <p:sp>
             <p:nvSpPr>
               <p:cNvPr id="44" name="テキスト ボックス 43">
@@ -5227,8 +5234,8 @@
           </p:sp>
         </mc:Fallback>
       </mc:AlternateContent>
-      <mc:AlternateContent xmlns:mc="http://schemas.openxmlformats.org/markup-compatibility/2006">
-        <mc:Choice xmlns:a14="http://schemas.microsoft.com/office/drawing/2010/main" Requires="a14">
+      <mc:AlternateContent xmlns:mc="http://schemas.openxmlformats.org/markup-compatibility/2006" xmlns:a14="http://schemas.microsoft.com/office/drawing/2010/main">
+        <mc:Choice Requires="a14">
           <p:sp>
             <p:nvSpPr>
               <p:cNvPr id="45" name="テキスト ボックス 44">
@@ -5297,7 +5304,7 @@
             </p:txBody>
           </p:sp>
         </mc:Choice>
-        <mc:Fallback>
+        <mc:Fallback xmlns="">
           <p:sp>
             <p:nvSpPr>
               <p:cNvPr id="45" name="テキスト ボックス 44">
@@ -5342,8 +5349,8 @@
           </p:sp>
         </mc:Fallback>
       </mc:AlternateContent>
-      <mc:AlternateContent xmlns:mc="http://schemas.openxmlformats.org/markup-compatibility/2006">
-        <mc:Choice xmlns:a14="http://schemas.microsoft.com/office/drawing/2010/main" Requires="a14">
+      <mc:AlternateContent xmlns:mc="http://schemas.openxmlformats.org/markup-compatibility/2006" xmlns:a14="http://schemas.microsoft.com/office/drawing/2010/main">
+        <mc:Choice Requires="a14">
           <p:sp>
             <p:nvSpPr>
               <p:cNvPr id="46" name="テキスト ボックス 45">
@@ -5412,7 +5419,7 @@
             </p:txBody>
           </p:sp>
         </mc:Choice>
-        <mc:Fallback>
+        <mc:Fallback xmlns="">
           <p:sp>
             <p:nvSpPr>
               <p:cNvPr id="46" name="テキスト ボックス 45">
@@ -5457,8 +5464,8 @@
           </p:sp>
         </mc:Fallback>
       </mc:AlternateContent>
-      <mc:AlternateContent xmlns:mc="http://schemas.openxmlformats.org/markup-compatibility/2006">
-        <mc:Choice xmlns:a14="http://schemas.microsoft.com/office/drawing/2010/main" Requires="a14">
+      <mc:AlternateContent xmlns:mc="http://schemas.openxmlformats.org/markup-compatibility/2006" xmlns:a14="http://schemas.microsoft.com/office/drawing/2010/main">
+        <mc:Choice Requires="a14">
           <p:sp>
             <p:nvSpPr>
               <p:cNvPr id="47" name="テキスト ボックス 46">
@@ -5527,7 +5534,7 @@
             </p:txBody>
           </p:sp>
         </mc:Choice>
-        <mc:Fallback>
+        <mc:Fallback xmlns="">
           <p:sp>
             <p:nvSpPr>
               <p:cNvPr id="47" name="テキスト ボックス 46">
@@ -5572,8 +5579,8 @@
           </p:sp>
         </mc:Fallback>
       </mc:AlternateContent>
-      <mc:AlternateContent xmlns:mc="http://schemas.openxmlformats.org/markup-compatibility/2006">
-        <mc:Choice xmlns:a14="http://schemas.microsoft.com/office/drawing/2010/main" Requires="a14">
+      <mc:AlternateContent xmlns:mc="http://schemas.openxmlformats.org/markup-compatibility/2006" xmlns:a14="http://schemas.microsoft.com/office/drawing/2010/main">
+        <mc:Choice Requires="a14">
           <p:sp>
             <p:nvSpPr>
               <p:cNvPr id="48" name="テキスト ボックス 47">
@@ -5642,7 +5649,7 @@
             </p:txBody>
           </p:sp>
         </mc:Choice>
-        <mc:Fallback>
+        <mc:Fallback xmlns="">
           <p:sp>
             <p:nvSpPr>
               <p:cNvPr id="48" name="テキスト ボックス 47">
@@ -5687,8 +5694,8 @@
           </p:sp>
         </mc:Fallback>
       </mc:AlternateContent>
-      <mc:AlternateContent xmlns:mc="http://schemas.openxmlformats.org/markup-compatibility/2006">
-        <mc:Choice xmlns:a14="http://schemas.microsoft.com/office/drawing/2010/main" Requires="a14">
+      <mc:AlternateContent xmlns:mc="http://schemas.openxmlformats.org/markup-compatibility/2006" xmlns:a14="http://schemas.microsoft.com/office/drawing/2010/main">
+        <mc:Choice Requires="a14">
           <p:sp>
             <p:nvSpPr>
               <p:cNvPr id="49" name="テキスト ボックス 48">
@@ -5757,7 +5764,7 @@
             </p:txBody>
           </p:sp>
         </mc:Choice>
-        <mc:Fallback>
+        <mc:Fallback xmlns="">
           <p:sp>
             <p:nvSpPr>
               <p:cNvPr id="49" name="テキスト ボックス 48">
@@ -5802,8 +5809,8 @@
           </p:sp>
         </mc:Fallback>
       </mc:AlternateContent>
-      <mc:AlternateContent xmlns:mc="http://schemas.openxmlformats.org/markup-compatibility/2006">
-        <mc:Choice xmlns:a14="http://schemas.microsoft.com/office/drawing/2010/main" Requires="a14">
+      <mc:AlternateContent xmlns:mc="http://schemas.openxmlformats.org/markup-compatibility/2006" xmlns:a14="http://schemas.microsoft.com/office/drawing/2010/main">
+        <mc:Choice Requires="a14">
           <p:sp>
             <p:nvSpPr>
               <p:cNvPr id="50" name="テキスト ボックス 49">
@@ -5872,7 +5879,7 @@
             </p:txBody>
           </p:sp>
         </mc:Choice>
-        <mc:Fallback>
+        <mc:Fallback xmlns="">
           <p:sp>
             <p:nvSpPr>
               <p:cNvPr id="50" name="テキスト ボックス 49">
@@ -5917,8 +5924,8 @@
           </p:sp>
         </mc:Fallback>
       </mc:AlternateContent>
-      <mc:AlternateContent xmlns:mc="http://schemas.openxmlformats.org/markup-compatibility/2006">
-        <mc:Choice xmlns:a14="http://schemas.microsoft.com/office/drawing/2010/main" Requires="a14">
+      <mc:AlternateContent xmlns:mc="http://schemas.openxmlformats.org/markup-compatibility/2006" xmlns:a14="http://schemas.microsoft.com/office/drawing/2010/main">
+        <mc:Choice Requires="a14">
           <p:sp>
             <p:nvSpPr>
               <p:cNvPr id="51" name="テキスト ボックス 50">
@@ -5987,7 +5994,7 @@
             </p:txBody>
           </p:sp>
         </mc:Choice>
-        <mc:Fallback>
+        <mc:Fallback xmlns="">
           <p:sp>
             <p:nvSpPr>
               <p:cNvPr id="51" name="テキスト ボックス 50">
@@ -6036,6 +6043,4106 @@
     <p:extLst>
       <p:ext uri="{BB962C8B-B14F-4D97-AF65-F5344CB8AC3E}">
         <p14:creationId xmlns:p14="http://schemas.microsoft.com/office/powerpoint/2010/main" val="79048400"/>
+      </p:ext>
+    </p:extLst>
+  </p:cSld>
+  <p:clrMapOvr>
+    <a:masterClrMapping/>
+  </p:clrMapOvr>
+</p:sld>
+</file>
+
+<file path=ppt/slides/slide2.xml><?xml version="1.0" encoding="utf-8"?>
+<p:sld xmlns:a="http://schemas.openxmlformats.org/drawingml/2006/main" xmlns:r="http://schemas.openxmlformats.org/officeDocument/2006/relationships" xmlns:p="http://schemas.openxmlformats.org/presentationml/2006/main">
+  <p:cSld>
+    <p:spTree>
+      <p:nvGrpSpPr>
+        <p:cNvPr id="1" name=""/>
+        <p:cNvGrpSpPr/>
+        <p:nvPr/>
+      </p:nvGrpSpPr>
+      <p:grpSpPr>
+        <a:xfrm>
+          <a:off x="0" y="0"/>
+          <a:ext cx="0" cy="0"/>
+          <a:chOff x="0" y="0"/>
+          <a:chExt cx="0" cy="0"/>
+        </a:xfrm>
+      </p:grpSpPr>
+      <p:sp>
+        <p:nvSpPr>
+          <p:cNvPr id="2" name="矢印: 五方向 1">
+            <a:extLst>
+              <a:ext uri="{FF2B5EF4-FFF2-40B4-BE49-F238E27FC236}">
+                <a16:creationId xmlns:a16="http://schemas.microsoft.com/office/drawing/2014/main" id="{59B41FE0-3DAB-47A7-A820-0F55B592D954}"/>
+              </a:ext>
+            </a:extLst>
+          </p:cNvPr>
+          <p:cNvSpPr/>
+          <p:nvPr/>
+        </p:nvSpPr>
+        <p:spPr>
+          <a:xfrm rot="21211424">
+            <a:off x="5868145" y="3526653"/>
+            <a:ext cx="738711" cy="484632"/>
+          </a:xfrm>
+          <a:prstGeom prst="homePlate">
+            <a:avLst/>
+          </a:prstGeom>
+        </p:spPr>
+        <p:style>
+          <a:lnRef idx="2">
+            <a:schemeClr val="accent1">
+              <a:shade val="50000"/>
+            </a:schemeClr>
+          </a:lnRef>
+          <a:fillRef idx="1">
+            <a:schemeClr val="accent1"/>
+          </a:fillRef>
+          <a:effectRef idx="0">
+            <a:schemeClr val="accent1"/>
+          </a:effectRef>
+          <a:fontRef idx="minor">
+            <a:schemeClr val="lt1"/>
+          </a:fontRef>
+        </p:style>
+        <p:txBody>
+          <a:bodyPr rtlCol="0" anchor="ctr"/>
+          <a:lstStyle/>
+          <a:p>
+            <a:pPr algn="ctr"/>
+            <a:endParaRPr kumimoji="1" lang="ja-JP" altLang="en-US"/>
+          </a:p>
+        </p:txBody>
+      </p:sp>
+      <p:cxnSp>
+        <p:nvCxnSpPr>
+          <p:cNvPr id="3" name="直線矢印コネクタ 2">
+            <a:extLst>
+              <a:ext uri="{FF2B5EF4-FFF2-40B4-BE49-F238E27FC236}">
+                <a16:creationId xmlns:a16="http://schemas.microsoft.com/office/drawing/2014/main" id="{FF607F31-20C5-4356-AB69-B64B498D7420}"/>
+              </a:ext>
+            </a:extLst>
+          </p:cNvPr>
+          <p:cNvCxnSpPr>
+            <a:cxnSpLocks/>
+          </p:cNvCxnSpPr>
+          <p:nvPr/>
+        </p:nvCxnSpPr>
+        <p:spPr>
+          <a:xfrm flipV="1">
+            <a:off x="6161110" y="3486539"/>
+            <a:ext cx="2838823" cy="282430"/>
+          </a:xfrm>
+          <a:prstGeom prst="straightConnector1">
+            <a:avLst/>
+          </a:prstGeom>
+          <a:ln w="19050">
+            <a:solidFill>
+              <a:schemeClr val="tx1"/>
+            </a:solidFill>
+            <a:tailEnd type="triangle"/>
+          </a:ln>
+        </p:spPr>
+        <p:style>
+          <a:lnRef idx="1">
+            <a:schemeClr val="accent1"/>
+          </a:lnRef>
+          <a:fillRef idx="0">
+            <a:schemeClr val="accent1"/>
+          </a:fillRef>
+          <a:effectRef idx="0">
+            <a:schemeClr val="accent1"/>
+          </a:effectRef>
+          <a:fontRef idx="minor">
+            <a:schemeClr val="tx1"/>
+          </a:fontRef>
+        </p:style>
+      </p:cxnSp>
+      <p:sp>
+        <p:nvSpPr>
+          <p:cNvPr id="4" name="楕円 3">
+            <a:extLst>
+              <a:ext uri="{FF2B5EF4-FFF2-40B4-BE49-F238E27FC236}">
+                <a16:creationId xmlns:a16="http://schemas.microsoft.com/office/drawing/2014/main" id="{ABF30BCB-844F-4D80-A710-9C3D55A082D4}"/>
+              </a:ext>
+            </a:extLst>
+          </p:cNvPr>
+          <p:cNvSpPr/>
+          <p:nvPr/>
+        </p:nvSpPr>
+        <p:spPr>
+          <a:xfrm>
+            <a:off x="8622896" y="1010408"/>
+            <a:ext cx="264869" cy="240790"/>
+          </a:xfrm>
+          <a:prstGeom prst="ellipse">
+            <a:avLst/>
+          </a:prstGeom>
+          <a:solidFill>
+            <a:schemeClr val="accent2"/>
+          </a:solidFill>
+        </p:spPr>
+        <p:style>
+          <a:lnRef idx="2">
+            <a:schemeClr val="accent1">
+              <a:shade val="50000"/>
+            </a:schemeClr>
+          </a:lnRef>
+          <a:fillRef idx="1">
+            <a:schemeClr val="accent1"/>
+          </a:fillRef>
+          <a:effectRef idx="0">
+            <a:schemeClr val="accent1"/>
+          </a:effectRef>
+          <a:fontRef idx="minor">
+            <a:schemeClr val="lt1"/>
+          </a:fontRef>
+        </p:style>
+        <p:txBody>
+          <a:bodyPr rtlCol="0" anchor="ctr"/>
+          <a:lstStyle/>
+          <a:p>
+            <a:pPr algn="ctr"/>
+            <a:endParaRPr kumimoji="1" lang="ja-JP" altLang="en-US"/>
+          </a:p>
+        </p:txBody>
+      </p:sp>
+      <p:sp>
+        <p:nvSpPr>
+          <p:cNvPr id="5" name="楕円 4">
+            <a:extLst>
+              <a:ext uri="{FF2B5EF4-FFF2-40B4-BE49-F238E27FC236}">
+                <a16:creationId xmlns:a16="http://schemas.microsoft.com/office/drawing/2014/main" id="{2F2316B4-5E1A-41A2-A320-DEEB7AAAAF77}"/>
+              </a:ext>
+            </a:extLst>
+          </p:cNvPr>
+          <p:cNvSpPr/>
+          <p:nvPr/>
+        </p:nvSpPr>
+        <p:spPr>
+          <a:xfrm>
+            <a:off x="7617242" y="5317557"/>
+            <a:ext cx="264869" cy="240790"/>
+          </a:xfrm>
+          <a:prstGeom prst="ellipse">
+            <a:avLst/>
+          </a:prstGeom>
+          <a:solidFill>
+            <a:schemeClr val="accent2"/>
+          </a:solidFill>
+        </p:spPr>
+        <p:style>
+          <a:lnRef idx="2">
+            <a:schemeClr val="accent1">
+              <a:shade val="50000"/>
+            </a:schemeClr>
+          </a:lnRef>
+          <a:fillRef idx="1">
+            <a:schemeClr val="accent1"/>
+          </a:fillRef>
+          <a:effectRef idx="0">
+            <a:schemeClr val="accent1"/>
+          </a:effectRef>
+          <a:fontRef idx="minor">
+            <a:schemeClr val="lt1"/>
+          </a:fontRef>
+        </p:style>
+        <p:txBody>
+          <a:bodyPr rtlCol="0" anchor="ctr"/>
+          <a:lstStyle/>
+          <a:p>
+            <a:pPr algn="ctr"/>
+            <a:endParaRPr kumimoji="1" lang="ja-JP" altLang="en-US"/>
+          </a:p>
+        </p:txBody>
+      </p:sp>
+      <p:cxnSp>
+        <p:nvCxnSpPr>
+          <p:cNvPr id="6" name="直線矢印コネクタ 5">
+            <a:extLst>
+              <a:ext uri="{FF2B5EF4-FFF2-40B4-BE49-F238E27FC236}">
+                <a16:creationId xmlns:a16="http://schemas.microsoft.com/office/drawing/2014/main" id="{916A3DE5-13FF-44A2-92BC-B939239EC239}"/>
+              </a:ext>
+            </a:extLst>
+          </p:cNvPr>
+          <p:cNvCxnSpPr>
+            <a:cxnSpLocks/>
+            <a:endCxn id="5" idx="1"/>
+          </p:cNvCxnSpPr>
+          <p:nvPr/>
+        </p:nvCxnSpPr>
+        <p:spPr>
+          <a:xfrm>
+            <a:off x="6184232" y="3768969"/>
+            <a:ext cx="1471799" cy="1583851"/>
+          </a:xfrm>
+          <a:prstGeom prst="straightConnector1">
+            <a:avLst/>
+          </a:prstGeom>
+          <a:ln w="19050">
+            <a:solidFill>
+              <a:schemeClr val="tx1"/>
+            </a:solidFill>
+            <a:prstDash val="dash"/>
+            <a:tailEnd type="triangle"/>
+          </a:ln>
+        </p:spPr>
+        <p:style>
+          <a:lnRef idx="1">
+            <a:schemeClr val="accent1"/>
+          </a:lnRef>
+          <a:fillRef idx="0">
+            <a:schemeClr val="accent1"/>
+          </a:fillRef>
+          <a:effectRef idx="0">
+            <a:schemeClr val="accent1"/>
+          </a:effectRef>
+          <a:fontRef idx="minor">
+            <a:schemeClr val="tx1"/>
+          </a:fontRef>
+        </p:style>
+      </p:cxnSp>
+      <p:cxnSp>
+        <p:nvCxnSpPr>
+          <p:cNvPr id="7" name="直線矢印コネクタ 6">
+            <a:extLst>
+              <a:ext uri="{FF2B5EF4-FFF2-40B4-BE49-F238E27FC236}">
+                <a16:creationId xmlns:a16="http://schemas.microsoft.com/office/drawing/2014/main" id="{5C4EC2F8-936E-4A43-A253-C4D10FCEBE86}"/>
+              </a:ext>
+            </a:extLst>
+          </p:cNvPr>
+          <p:cNvCxnSpPr>
+            <a:cxnSpLocks/>
+            <a:endCxn id="4" idx="3"/>
+          </p:cNvCxnSpPr>
+          <p:nvPr/>
+        </p:nvCxnSpPr>
+        <p:spPr>
+          <a:xfrm flipV="1">
+            <a:off x="6184232" y="1215935"/>
+            <a:ext cx="2477453" cy="2553034"/>
+          </a:xfrm>
+          <a:prstGeom prst="straightConnector1">
+            <a:avLst/>
+          </a:prstGeom>
+          <a:ln w="19050">
+            <a:solidFill>
+              <a:schemeClr val="tx1"/>
+            </a:solidFill>
+            <a:prstDash val="dash"/>
+            <a:tailEnd type="triangle"/>
+          </a:ln>
+        </p:spPr>
+        <p:style>
+          <a:lnRef idx="1">
+            <a:schemeClr val="accent1"/>
+          </a:lnRef>
+          <a:fillRef idx="0">
+            <a:schemeClr val="accent1"/>
+          </a:fillRef>
+          <a:effectRef idx="0">
+            <a:schemeClr val="accent1"/>
+          </a:effectRef>
+          <a:fontRef idx="minor">
+            <a:schemeClr val="tx1"/>
+          </a:fontRef>
+        </p:style>
+      </p:cxnSp>
+      <mc:AlternateContent xmlns:mc="http://schemas.openxmlformats.org/markup-compatibility/2006">
+        <mc:Choice xmlns:a14="http://schemas.microsoft.com/office/drawing/2010/main" Requires="a14">
+          <p:sp>
+            <p:nvSpPr>
+              <p:cNvPr id="9" name="テキスト ボックス 8">
+                <a:extLst>
+                  <a:ext uri="{FF2B5EF4-FFF2-40B4-BE49-F238E27FC236}">
+                    <a16:creationId xmlns:a16="http://schemas.microsoft.com/office/drawing/2014/main" id="{890598E5-6B16-487B-9CE4-1CD15D3F15BC}"/>
+                  </a:ext>
+                </a:extLst>
+              </p:cNvPr>
+              <p:cNvSpPr txBox="1"/>
+              <p:nvPr/>
+            </p:nvSpPr>
+            <p:spPr>
+              <a:xfrm>
+                <a:off x="5731656" y="4019569"/>
+                <a:ext cx="505844" cy="400110"/>
+              </a:xfrm>
+              <a:prstGeom prst="rect">
+                <a:avLst/>
+              </a:prstGeom>
+              <a:noFill/>
+            </p:spPr>
+            <p:txBody>
+              <a:bodyPr wrap="none" rtlCol="0">
+                <a:spAutoFit/>
+              </a:bodyPr>
+              <a:lstStyle/>
+              <a:p>
+                <a:pPr algn="ctr"/>
+                <a14:m>
+                  <m:oMathPara xmlns:m="http://schemas.openxmlformats.org/officeDocument/2006/math">
+                    <m:oMathParaPr>
+                      <m:jc m:val="centerGroup"/>
+                    </m:oMathParaPr>
+                    <m:oMath xmlns:m="http://schemas.openxmlformats.org/officeDocument/2006/math">
+                      <m:sSub>
+                        <m:sSubPr>
+                          <m:ctrlPr>
+                            <a:rPr kumimoji="1" lang="en-US" altLang="ja-JP" sz="2000" i="1" smtClean="0">
+                              <a:latin typeface="Cambria Math" panose="02040503050406030204" pitchFamily="18" charset="0"/>
+                            </a:rPr>
+                          </m:ctrlPr>
+                        </m:sSubPr>
+                        <m:e>
+                          <m:r>
+                            <a:rPr kumimoji="1" lang="en-US" altLang="ja-JP" sz="2000" b="0" i="1" smtClean="0">
+                              <a:latin typeface="Cambria Math" panose="02040503050406030204" pitchFamily="18" charset="0"/>
+                            </a:rPr>
+                            <m:t>𝑥</m:t>
+                          </m:r>
+                        </m:e>
+                        <m:sub>
+                          <m:r>
+                            <a:rPr kumimoji="1" lang="en-US" altLang="ja-JP" sz="2000" b="0" i="1" smtClean="0">
+                              <a:latin typeface="Cambria Math" panose="02040503050406030204" pitchFamily="18" charset="0"/>
+                            </a:rPr>
+                            <m:t>1</m:t>
+                          </m:r>
+                        </m:sub>
+                      </m:sSub>
+                    </m:oMath>
+                  </m:oMathPara>
+                </a14:m>
+                <a:endParaRPr kumimoji="1" lang="ja-JP" altLang="en-US" sz="2000" dirty="0"/>
+              </a:p>
+            </p:txBody>
+          </p:sp>
+        </mc:Choice>
+        <mc:Fallback>
+          <p:sp>
+            <p:nvSpPr>
+              <p:cNvPr id="9" name="テキスト ボックス 8">
+                <a:extLst>
+                  <a:ext uri="{FF2B5EF4-FFF2-40B4-BE49-F238E27FC236}">
+                    <a16:creationId xmlns:a16="http://schemas.microsoft.com/office/drawing/2014/main" id="{890598E5-6B16-487B-9CE4-1CD15D3F15BC}"/>
+                  </a:ext>
+                </a:extLst>
+              </p:cNvPr>
+              <p:cNvSpPr txBox="1">
+                <a:spLocks noRot="1" noChangeAspect="1" noMove="1" noResize="1" noEditPoints="1" noAdjustHandles="1" noChangeArrowheads="1" noChangeShapeType="1" noTextEdit="1"/>
+              </p:cNvSpPr>
+              <p:nvPr/>
+            </p:nvSpPr>
+            <p:spPr>
+              <a:xfrm>
+                <a:off x="5731656" y="4019569"/>
+                <a:ext cx="505844" cy="400110"/>
+              </a:xfrm>
+              <a:prstGeom prst="rect">
+                <a:avLst/>
+              </a:prstGeom>
+              <a:blipFill>
+                <a:blip r:embed="rId2"/>
+                <a:stretch>
+                  <a:fillRect/>
+                </a:stretch>
+              </a:blipFill>
+            </p:spPr>
+            <p:txBody>
+              <a:bodyPr/>
+              <a:lstStyle/>
+              <a:p>
+                <a:r>
+                  <a:rPr lang="ja-JP" altLang="en-US">
+                    <a:noFill/>
+                  </a:rPr>
+                  <a:t> </a:t>
+                </a:r>
+              </a:p>
+            </p:txBody>
+          </p:sp>
+        </mc:Fallback>
+      </mc:AlternateContent>
+      <mc:AlternateContent xmlns:mc="http://schemas.openxmlformats.org/markup-compatibility/2006">
+        <mc:Choice xmlns:a14="http://schemas.microsoft.com/office/drawing/2010/main" Requires="a14">
+          <p:sp>
+            <p:nvSpPr>
+              <p:cNvPr id="10" name="テキスト ボックス 9">
+                <a:extLst>
+                  <a:ext uri="{FF2B5EF4-FFF2-40B4-BE49-F238E27FC236}">
+                    <a16:creationId xmlns:a16="http://schemas.microsoft.com/office/drawing/2014/main" id="{BA5A3ECC-C9F0-473F-8BB3-BA0865CA0CD4}"/>
+                  </a:ext>
+                </a:extLst>
+              </p:cNvPr>
+              <p:cNvSpPr txBox="1"/>
+              <p:nvPr/>
+            </p:nvSpPr>
+            <p:spPr>
+              <a:xfrm>
+                <a:off x="7020467" y="4340980"/>
+                <a:ext cx="489236" cy="400110"/>
+              </a:xfrm>
+              <a:prstGeom prst="rect">
+                <a:avLst/>
+              </a:prstGeom>
+              <a:noFill/>
+            </p:spPr>
+            <p:txBody>
+              <a:bodyPr wrap="none" rtlCol="0">
+                <a:spAutoFit/>
+              </a:bodyPr>
+              <a:lstStyle/>
+              <a:p>
+                <a:pPr algn="ctr"/>
+                <a14:m>
+                  <m:oMathPara xmlns:m="http://schemas.openxmlformats.org/officeDocument/2006/math">
+                    <m:oMathParaPr>
+                      <m:jc m:val="centerGroup"/>
+                    </m:oMathParaPr>
+                    <m:oMath xmlns:m="http://schemas.openxmlformats.org/officeDocument/2006/math">
+                      <m:sSub>
+                        <m:sSubPr>
+                          <m:ctrlPr>
+                            <a:rPr kumimoji="1" lang="en-US" altLang="ja-JP" sz="2000" i="1" smtClean="0">
+                              <a:latin typeface="Cambria Math" panose="02040503050406030204" pitchFamily="18" charset="0"/>
+                            </a:rPr>
+                          </m:ctrlPr>
+                        </m:sSubPr>
+                        <m:e>
+                          <m:r>
+                            <a:rPr kumimoji="1" lang="en-US" altLang="ja-JP" sz="2000" b="0" i="1" smtClean="0">
+                              <a:latin typeface="Cambria Math" panose="02040503050406030204" pitchFamily="18" charset="0"/>
+                            </a:rPr>
+                            <m:t>𝑧</m:t>
+                          </m:r>
+                        </m:e>
+                        <m:sub>
+                          <m:r>
+                            <a:rPr kumimoji="1" lang="en-US" altLang="ja-JP" sz="2000" b="0" i="1" smtClean="0">
+                              <a:latin typeface="Cambria Math" panose="02040503050406030204" pitchFamily="18" charset="0"/>
+                            </a:rPr>
+                            <m:t>1</m:t>
+                          </m:r>
+                        </m:sub>
+                      </m:sSub>
+                    </m:oMath>
+                  </m:oMathPara>
+                </a14:m>
+                <a:endParaRPr kumimoji="1" lang="ja-JP" altLang="en-US" sz="2000" dirty="0"/>
+              </a:p>
+            </p:txBody>
+          </p:sp>
+        </mc:Choice>
+        <mc:Fallback>
+          <p:sp>
+            <p:nvSpPr>
+              <p:cNvPr id="10" name="テキスト ボックス 9">
+                <a:extLst>
+                  <a:ext uri="{FF2B5EF4-FFF2-40B4-BE49-F238E27FC236}">
+                    <a16:creationId xmlns:a16="http://schemas.microsoft.com/office/drawing/2014/main" id="{BA5A3ECC-C9F0-473F-8BB3-BA0865CA0CD4}"/>
+                  </a:ext>
+                </a:extLst>
+              </p:cNvPr>
+              <p:cNvSpPr txBox="1">
+                <a:spLocks noRot="1" noChangeAspect="1" noMove="1" noResize="1" noEditPoints="1" noAdjustHandles="1" noChangeArrowheads="1" noChangeShapeType="1" noTextEdit="1"/>
+              </p:cNvSpPr>
+              <p:nvPr/>
+            </p:nvSpPr>
+            <p:spPr>
+              <a:xfrm>
+                <a:off x="7020467" y="4340980"/>
+                <a:ext cx="489236" cy="400110"/>
+              </a:xfrm>
+              <a:prstGeom prst="rect">
+                <a:avLst/>
+              </a:prstGeom>
+              <a:blipFill>
+                <a:blip r:embed="rId3"/>
+                <a:stretch>
+                  <a:fillRect/>
+                </a:stretch>
+              </a:blipFill>
+            </p:spPr>
+            <p:txBody>
+              <a:bodyPr/>
+              <a:lstStyle/>
+              <a:p>
+                <a:r>
+                  <a:rPr lang="ja-JP" altLang="en-US">
+                    <a:noFill/>
+                  </a:rPr>
+                  <a:t> </a:t>
+                </a:r>
+              </a:p>
+            </p:txBody>
+          </p:sp>
+        </mc:Fallback>
+      </mc:AlternateContent>
+      <mc:AlternateContent xmlns:mc="http://schemas.openxmlformats.org/markup-compatibility/2006">
+        <mc:Choice xmlns:a14="http://schemas.microsoft.com/office/drawing/2010/main" Requires="a14">
+          <p:sp>
+            <p:nvSpPr>
+              <p:cNvPr id="11" name="テキスト ボックス 10">
+                <a:extLst>
+                  <a:ext uri="{FF2B5EF4-FFF2-40B4-BE49-F238E27FC236}">
+                    <a16:creationId xmlns:a16="http://schemas.microsoft.com/office/drawing/2014/main" id="{12684556-FED9-41EE-86F4-3E4FCCF760FC}"/>
+                  </a:ext>
+                </a:extLst>
+              </p:cNvPr>
+              <p:cNvSpPr txBox="1"/>
+              <p:nvPr/>
+            </p:nvSpPr>
+            <p:spPr>
+              <a:xfrm>
+                <a:off x="7885798" y="5152765"/>
+                <a:ext cx="504945" cy="400110"/>
+              </a:xfrm>
+              <a:prstGeom prst="rect">
+                <a:avLst/>
+              </a:prstGeom>
+              <a:noFill/>
+            </p:spPr>
+            <p:txBody>
+              <a:bodyPr wrap="none" rtlCol="0">
+                <a:spAutoFit/>
+              </a:bodyPr>
+              <a:lstStyle/>
+              <a:p>
+                <a:pPr algn="ctr"/>
+                <a14:m>
+                  <m:oMathPara xmlns:m="http://schemas.openxmlformats.org/officeDocument/2006/math">
+                    <m:oMathParaPr>
+                      <m:jc m:val="centerGroup"/>
+                    </m:oMathParaPr>
+                    <m:oMath xmlns:m="http://schemas.openxmlformats.org/officeDocument/2006/math">
+                      <m:sSub>
+                        <m:sSubPr>
+                          <m:ctrlPr>
+                            <a:rPr kumimoji="1" lang="en-US" altLang="ja-JP" sz="2000" i="1" smtClean="0">
+                              <a:latin typeface="Cambria Math" panose="02040503050406030204" pitchFamily="18" charset="0"/>
+                            </a:rPr>
+                          </m:ctrlPr>
+                        </m:sSubPr>
+                        <m:e>
+                          <m:r>
+                            <a:rPr kumimoji="1" lang="en-US" altLang="ja-JP" sz="2000" b="0" i="1" smtClean="0">
+                              <a:latin typeface="Cambria Math" panose="02040503050406030204" pitchFamily="18" charset="0"/>
+                            </a:rPr>
+                            <m:t>𝑞</m:t>
+                          </m:r>
+                        </m:e>
+                        <m:sub>
+                          <m:r>
+                            <a:rPr kumimoji="1" lang="en-US" altLang="ja-JP" sz="2000" b="0" i="1" smtClean="0">
+                              <a:latin typeface="Cambria Math" panose="02040503050406030204" pitchFamily="18" charset="0"/>
+                            </a:rPr>
+                            <m:t>1</m:t>
+                          </m:r>
+                        </m:sub>
+                      </m:sSub>
+                    </m:oMath>
+                  </m:oMathPara>
+                </a14:m>
+                <a:endParaRPr kumimoji="1" lang="ja-JP" altLang="en-US" sz="2000" dirty="0"/>
+              </a:p>
+            </p:txBody>
+          </p:sp>
+        </mc:Choice>
+        <mc:Fallback>
+          <p:sp>
+            <p:nvSpPr>
+              <p:cNvPr id="11" name="テキスト ボックス 10">
+                <a:extLst>
+                  <a:ext uri="{FF2B5EF4-FFF2-40B4-BE49-F238E27FC236}">
+                    <a16:creationId xmlns:a16="http://schemas.microsoft.com/office/drawing/2014/main" id="{12684556-FED9-41EE-86F4-3E4FCCF760FC}"/>
+                  </a:ext>
+                </a:extLst>
+              </p:cNvPr>
+              <p:cNvSpPr txBox="1">
+                <a:spLocks noRot="1" noChangeAspect="1" noMove="1" noResize="1" noEditPoints="1" noAdjustHandles="1" noChangeArrowheads="1" noChangeShapeType="1" noTextEdit="1"/>
+              </p:cNvSpPr>
+              <p:nvPr/>
+            </p:nvSpPr>
+            <p:spPr>
+              <a:xfrm>
+                <a:off x="7885798" y="5152765"/>
+                <a:ext cx="504945" cy="400110"/>
+              </a:xfrm>
+              <a:prstGeom prst="rect">
+                <a:avLst/>
+              </a:prstGeom>
+              <a:blipFill>
+                <a:blip r:embed="rId4"/>
+                <a:stretch>
+                  <a:fillRect b="-7576"/>
+                </a:stretch>
+              </a:blipFill>
+            </p:spPr>
+            <p:txBody>
+              <a:bodyPr/>
+              <a:lstStyle/>
+              <a:p>
+                <a:r>
+                  <a:rPr lang="ja-JP" altLang="en-US">
+                    <a:noFill/>
+                  </a:rPr>
+                  <a:t> </a:t>
+                </a:r>
+              </a:p>
+            </p:txBody>
+          </p:sp>
+        </mc:Fallback>
+      </mc:AlternateContent>
+      <mc:AlternateContent xmlns:mc="http://schemas.openxmlformats.org/markup-compatibility/2006">
+        <mc:Choice xmlns:a14="http://schemas.microsoft.com/office/drawing/2010/main" Requires="a14">
+          <p:sp>
+            <p:nvSpPr>
+              <p:cNvPr id="12" name="テキスト ボックス 11">
+                <a:extLst>
+                  <a:ext uri="{FF2B5EF4-FFF2-40B4-BE49-F238E27FC236}">
+                    <a16:creationId xmlns:a16="http://schemas.microsoft.com/office/drawing/2014/main" id="{452CC0E0-503F-472D-8DCC-10B0C47B0061}"/>
+                  </a:ext>
+                </a:extLst>
+              </p:cNvPr>
+              <p:cNvSpPr txBox="1"/>
+              <p:nvPr/>
+            </p:nvSpPr>
+            <p:spPr>
+              <a:xfrm>
+                <a:off x="7087111" y="2102743"/>
+                <a:ext cx="495199" cy="400110"/>
+              </a:xfrm>
+              <a:prstGeom prst="rect">
+                <a:avLst/>
+              </a:prstGeom>
+              <a:noFill/>
+            </p:spPr>
+            <p:txBody>
+              <a:bodyPr wrap="none" rtlCol="0">
+                <a:spAutoFit/>
+              </a:bodyPr>
+              <a:lstStyle/>
+              <a:p>
+                <a:pPr algn="ctr"/>
+                <a14:m>
+                  <m:oMathPara xmlns:m="http://schemas.openxmlformats.org/officeDocument/2006/math">
+                    <m:oMathParaPr>
+                      <m:jc m:val="centerGroup"/>
+                    </m:oMathParaPr>
+                    <m:oMath xmlns:m="http://schemas.openxmlformats.org/officeDocument/2006/math">
+                      <m:sSub>
+                        <m:sSubPr>
+                          <m:ctrlPr>
+                            <a:rPr kumimoji="1" lang="en-US" altLang="ja-JP" sz="2000" i="1" smtClean="0">
+                              <a:latin typeface="Cambria Math" panose="02040503050406030204" pitchFamily="18" charset="0"/>
+                            </a:rPr>
+                          </m:ctrlPr>
+                        </m:sSubPr>
+                        <m:e>
+                          <m:r>
+                            <a:rPr kumimoji="1" lang="en-US" altLang="ja-JP" sz="2000" b="0" i="1" smtClean="0">
+                              <a:latin typeface="Cambria Math" panose="02040503050406030204" pitchFamily="18" charset="0"/>
+                            </a:rPr>
+                            <m:t>𝑧</m:t>
+                          </m:r>
+                        </m:e>
+                        <m:sub>
+                          <m:r>
+                            <a:rPr kumimoji="1" lang="en-US" altLang="ja-JP" sz="2000" b="0" i="1" smtClean="0">
+                              <a:latin typeface="Cambria Math" panose="02040503050406030204" pitchFamily="18" charset="0"/>
+                            </a:rPr>
+                            <m:t>2</m:t>
+                          </m:r>
+                        </m:sub>
+                      </m:sSub>
+                    </m:oMath>
+                  </m:oMathPara>
+                </a14:m>
+                <a:endParaRPr kumimoji="1" lang="ja-JP" altLang="en-US" sz="2000" dirty="0"/>
+              </a:p>
+            </p:txBody>
+          </p:sp>
+        </mc:Choice>
+        <mc:Fallback>
+          <p:sp>
+            <p:nvSpPr>
+              <p:cNvPr id="12" name="テキスト ボックス 11">
+                <a:extLst>
+                  <a:ext uri="{FF2B5EF4-FFF2-40B4-BE49-F238E27FC236}">
+                    <a16:creationId xmlns:a16="http://schemas.microsoft.com/office/drawing/2014/main" id="{452CC0E0-503F-472D-8DCC-10B0C47B0061}"/>
+                  </a:ext>
+                </a:extLst>
+              </p:cNvPr>
+              <p:cNvSpPr txBox="1">
+                <a:spLocks noRot="1" noChangeAspect="1" noMove="1" noResize="1" noEditPoints="1" noAdjustHandles="1" noChangeArrowheads="1" noChangeShapeType="1" noTextEdit="1"/>
+              </p:cNvSpPr>
+              <p:nvPr/>
+            </p:nvSpPr>
+            <p:spPr>
+              <a:xfrm>
+                <a:off x="7087111" y="2102743"/>
+                <a:ext cx="495199" cy="400110"/>
+              </a:xfrm>
+              <a:prstGeom prst="rect">
+                <a:avLst/>
+              </a:prstGeom>
+              <a:blipFill>
+                <a:blip r:embed="rId5"/>
+                <a:stretch>
+                  <a:fillRect/>
+                </a:stretch>
+              </a:blipFill>
+            </p:spPr>
+            <p:txBody>
+              <a:bodyPr/>
+              <a:lstStyle/>
+              <a:p>
+                <a:r>
+                  <a:rPr lang="ja-JP" altLang="en-US">
+                    <a:noFill/>
+                  </a:rPr>
+                  <a:t> </a:t>
+                </a:r>
+              </a:p>
+            </p:txBody>
+          </p:sp>
+        </mc:Fallback>
+      </mc:AlternateContent>
+      <mc:AlternateContent xmlns:mc="http://schemas.openxmlformats.org/markup-compatibility/2006">
+        <mc:Choice xmlns:a14="http://schemas.microsoft.com/office/drawing/2010/main" Requires="a14">
+          <p:sp>
+            <p:nvSpPr>
+              <p:cNvPr id="13" name="テキスト ボックス 12">
+                <a:extLst>
+                  <a:ext uri="{FF2B5EF4-FFF2-40B4-BE49-F238E27FC236}">
+                    <a16:creationId xmlns:a16="http://schemas.microsoft.com/office/drawing/2014/main" id="{4704451E-B047-4F22-8235-7819B6E968CD}"/>
+                  </a:ext>
+                </a:extLst>
+              </p:cNvPr>
+              <p:cNvSpPr txBox="1"/>
+              <p:nvPr/>
+            </p:nvSpPr>
+            <p:spPr>
+              <a:xfrm>
+                <a:off x="8655576" y="595747"/>
+                <a:ext cx="510909" cy="400110"/>
+              </a:xfrm>
+              <a:prstGeom prst="rect">
+                <a:avLst/>
+              </a:prstGeom>
+              <a:noFill/>
+            </p:spPr>
+            <p:txBody>
+              <a:bodyPr wrap="none" rtlCol="0">
+                <a:spAutoFit/>
+              </a:bodyPr>
+              <a:lstStyle/>
+              <a:p>
+                <a:pPr algn="ctr"/>
+                <a14:m>
+                  <m:oMathPara xmlns:m="http://schemas.openxmlformats.org/officeDocument/2006/math">
+                    <m:oMathParaPr>
+                      <m:jc m:val="centerGroup"/>
+                    </m:oMathParaPr>
+                    <m:oMath xmlns:m="http://schemas.openxmlformats.org/officeDocument/2006/math">
+                      <m:sSub>
+                        <m:sSubPr>
+                          <m:ctrlPr>
+                            <a:rPr kumimoji="1" lang="en-US" altLang="ja-JP" sz="2000" i="1" smtClean="0">
+                              <a:latin typeface="Cambria Math" panose="02040503050406030204" pitchFamily="18" charset="0"/>
+                            </a:rPr>
+                          </m:ctrlPr>
+                        </m:sSubPr>
+                        <m:e>
+                          <m:r>
+                            <a:rPr kumimoji="1" lang="en-US" altLang="ja-JP" sz="2000" b="0" i="1" smtClean="0">
+                              <a:latin typeface="Cambria Math" panose="02040503050406030204" pitchFamily="18" charset="0"/>
+                            </a:rPr>
+                            <m:t>𝑞</m:t>
+                          </m:r>
+                        </m:e>
+                        <m:sub>
+                          <m:r>
+                            <a:rPr kumimoji="1" lang="en-US" altLang="ja-JP" sz="2000" b="0" i="1" smtClean="0">
+                              <a:latin typeface="Cambria Math" panose="02040503050406030204" pitchFamily="18" charset="0"/>
+                            </a:rPr>
+                            <m:t>2</m:t>
+                          </m:r>
+                        </m:sub>
+                      </m:sSub>
+                    </m:oMath>
+                  </m:oMathPara>
+                </a14:m>
+                <a:endParaRPr kumimoji="1" lang="ja-JP" altLang="en-US" sz="2000" dirty="0"/>
+              </a:p>
+            </p:txBody>
+          </p:sp>
+        </mc:Choice>
+        <mc:Fallback>
+          <p:sp>
+            <p:nvSpPr>
+              <p:cNvPr id="13" name="テキスト ボックス 12">
+                <a:extLst>
+                  <a:ext uri="{FF2B5EF4-FFF2-40B4-BE49-F238E27FC236}">
+                    <a16:creationId xmlns:a16="http://schemas.microsoft.com/office/drawing/2014/main" id="{4704451E-B047-4F22-8235-7819B6E968CD}"/>
+                  </a:ext>
+                </a:extLst>
+              </p:cNvPr>
+              <p:cNvSpPr txBox="1">
+                <a:spLocks noRot="1" noChangeAspect="1" noMove="1" noResize="1" noEditPoints="1" noAdjustHandles="1" noChangeArrowheads="1" noChangeShapeType="1" noTextEdit="1"/>
+              </p:cNvSpPr>
+              <p:nvPr/>
+            </p:nvSpPr>
+            <p:spPr>
+              <a:xfrm>
+                <a:off x="8655576" y="595747"/>
+                <a:ext cx="510909" cy="400110"/>
+              </a:xfrm>
+              <a:prstGeom prst="rect">
+                <a:avLst/>
+              </a:prstGeom>
+              <a:blipFill>
+                <a:blip r:embed="rId6"/>
+                <a:stretch>
+                  <a:fillRect b="-7692"/>
+                </a:stretch>
+              </a:blipFill>
+            </p:spPr>
+            <p:txBody>
+              <a:bodyPr/>
+              <a:lstStyle/>
+              <a:p>
+                <a:r>
+                  <a:rPr lang="ja-JP" altLang="en-US">
+                    <a:noFill/>
+                  </a:rPr>
+                  <a:t> </a:t>
+                </a:r>
+              </a:p>
+            </p:txBody>
+          </p:sp>
+        </mc:Fallback>
+      </mc:AlternateContent>
+      <mc:AlternateContent xmlns:mc="http://schemas.openxmlformats.org/markup-compatibility/2006">
+        <mc:Choice xmlns:a14="http://schemas.microsoft.com/office/drawing/2010/main" Requires="a14">
+          <p:sp>
+            <p:nvSpPr>
+              <p:cNvPr id="14" name="テキスト ボックス 13">
+                <a:extLst>
+                  <a:ext uri="{FF2B5EF4-FFF2-40B4-BE49-F238E27FC236}">
+                    <a16:creationId xmlns:a16="http://schemas.microsoft.com/office/drawing/2014/main" id="{443AC0A3-B78F-4040-AA4E-847B1B3B366F}"/>
+                  </a:ext>
+                </a:extLst>
+              </p:cNvPr>
+              <p:cNvSpPr txBox="1"/>
+              <p:nvPr/>
+            </p:nvSpPr>
+            <p:spPr>
+              <a:xfrm>
+                <a:off x="7511948" y="3235939"/>
+                <a:ext cx="514756" cy="400110"/>
+              </a:xfrm>
+              <a:prstGeom prst="rect">
+                <a:avLst/>
+              </a:prstGeom>
+              <a:noFill/>
+            </p:spPr>
+            <p:txBody>
+              <a:bodyPr wrap="none" rtlCol="0">
+                <a:spAutoFit/>
+              </a:bodyPr>
+              <a:lstStyle/>
+              <a:p>
+                <a:pPr algn="ctr"/>
+                <a14:m>
+                  <m:oMathPara xmlns:m="http://schemas.openxmlformats.org/officeDocument/2006/math">
+                    <m:oMathParaPr>
+                      <m:jc m:val="centerGroup"/>
+                    </m:oMathParaPr>
+                    <m:oMath xmlns:m="http://schemas.openxmlformats.org/officeDocument/2006/math">
+                      <m:sSub>
+                        <m:sSubPr>
+                          <m:ctrlPr>
+                            <a:rPr kumimoji="1" lang="en-US" altLang="ja-JP" sz="2000" i="1" smtClean="0">
+                              <a:latin typeface="Cambria Math" panose="02040503050406030204" pitchFamily="18" charset="0"/>
+                            </a:rPr>
+                          </m:ctrlPr>
+                        </m:sSubPr>
+                        <m:e>
+                          <m:r>
+                            <a:rPr kumimoji="1" lang="en-US" altLang="ja-JP" sz="2000" b="0" i="1" smtClean="0">
+                              <a:latin typeface="Cambria Math" panose="02040503050406030204" pitchFamily="18" charset="0"/>
+                            </a:rPr>
+                            <m:t>𝑎</m:t>
+                          </m:r>
+                        </m:e>
+                        <m:sub>
+                          <m:r>
+                            <a:rPr kumimoji="1" lang="en-US" altLang="ja-JP" sz="2000" b="0" i="1" smtClean="0">
+                              <a:latin typeface="Cambria Math" panose="02040503050406030204" pitchFamily="18" charset="0"/>
+                            </a:rPr>
+                            <m:t>1</m:t>
+                          </m:r>
+                        </m:sub>
+                      </m:sSub>
+                    </m:oMath>
+                  </m:oMathPara>
+                </a14:m>
+                <a:endParaRPr kumimoji="1" lang="ja-JP" altLang="en-US" sz="2000" dirty="0"/>
+              </a:p>
+            </p:txBody>
+          </p:sp>
+        </mc:Choice>
+        <mc:Fallback>
+          <p:sp>
+            <p:nvSpPr>
+              <p:cNvPr id="14" name="テキスト ボックス 13">
+                <a:extLst>
+                  <a:ext uri="{FF2B5EF4-FFF2-40B4-BE49-F238E27FC236}">
+                    <a16:creationId xmlns:a16="http://schemas.microsoft.com/office/drawing/2014/main" id="{443AC0A3-B78F-4040-AA4E-847B1B3B366F}"/>
+                  </a:ext>
+                </a:extLst>
+              </p:cNvPr>
+              <p:cNvSpPr txBox="1">
+                <a:spLocks noRot="1" noChangeAspect="1" noMove="1" noResize="1" noEditPoints="1" noAdjustHandles="1" noChangeArrowheads="1" noChangeShapeType="1" noTextEdit="1"/>
+              </p:cNvSpPr>
+              <p:nvPr/>
+            </p:nvSpPr>
+            <p:spPr>
+              <a:xfrm>
+                <a:off x="7511948" y="3235939"/>
+                <a:ext cx="514756" cy="400110"/>
+              </a:xfrm>
+              <a:prstGeom prst="rect">
+                <a:avLst/>
+              </a:prstGeom>
+              <a:blipFill>
+                <a:blip r:embed="rId7"/>
+                <a:stretch>
+                  <a:fillRect/>
+                </a:stretch>
+              </a:blipFill>
+            </p:spPr>
+            <p:txBody>
+              <a:bodyPr/>
+              <a:lstStyle/>
+              <a:p>
+                <a:r>
+                  <a:rPr lang="ja-JP" altLang="en-US">
+                    <a:noFill/>
+                  </a:rPr>
+                  <a:t> </a:t>
+                </a:r>
+              </a:p>
+            </p:txBody>
+          </p:sp>
+        </mc:Fallback>
+      </mc:AlternateContent>
+      <p:grpSp>
+        <p:nvGrpSpPr>
+          <p:cNvPr id="27" name="グループ化 26">
+            <a:extLst>
+              <a:ext uri="{FF2B5EF4-FFF2-40B4-BE49-F238E27FC236}">
+                <a16:creationId xmlns:a16="http://schemas.microsoft.com/office/drawing/2014/main" id="{F18D1C34-3F9C-4063-A2EF-19AAA755AB0E}"/>
+              </a:ext>
+            </a:extLst>
+          </p:cNvPr>
+          <p:cNvGrpSpPr/>
+          <p:nvPr/>
+        </p:nvGrpSpPr>
+        <p:grpSpPr>
+          <a:xfrm rot="317610">
+            <a:off x="4524093" y="757026"/>
+            <a:ext cx="3478336" cy="4962600"/>
+            <a:chOff x="1295023" y="748147"/>
+            <a:chExt cx="3478336" cy="4962600"/>
+          </a:xfrm>
+        </p:grpSpPr>
+        <p:sp>
+          <p:nvSpPr>
+            <p:cNvPr id="15" name="矢印: 五方向 14">
+              <a:extLst>
+                <a:ext uri="{FF2B5EF4-FFF2-40B4-BE49-F238E27FC236}">
+                  <a16:creationId xmlns:a16="http://schemas.microsoft.com/office/drawing/2014/main" id="{125A40A2-4FA4-4193-8FFF-ACBF338AB93F}"/>
+                </a:ext>
+              </a:extLst>
+            </p:cNvPr>
+            <p:cNvSpPr/>
+            <p:nvPr/>
+          </p:nvSpPr>
+          <p:spPr>
+            <a:xfrm rot="21211424">
+              <a:off x="1439656" y="3679053"/>
+              <a:ext cx="738711" cy="484632"/>
+            </a:xfrm>
+            <a:prstGeom prst="homePlate">
+              <a:avLst/>
+            </a:prstGeom>
+          </p:spPr>
+          <p:style>
+            <a:lnRef idx="2">
+              <a:schemeClr val="accent1">
+                <a:shade val="50000"/>
+              </a:schemeClr>
+            </a:lnRef>
+            <a:fillRef idx="1">
+              <a:schemeClr val="accent1"/>
+            </a:fillRef>
+            <a:effectRef idx="0">
+              <a:schemeClr val="accent1"/>
+            </a:effectRef>
+            <a:fontRef idx="minor">
+              <a:schemeClr val="lt1"/>
+            </a:fontRef>
+          </p:style>
+          <p:txBody>
+            <a:bodyPr rtlCol="0" anchor="ctr"/>
+            <a:lstStyle/>
+            <a:p>
+              <a:pPr algn="ctr"/>
+              <a:endParaRPr kumimoji="1" lang="ja-JP" altLang="en-US"/>
+            </a:p>
+          </p:txBody>
+        </p:sp>
+        <p:sp>
+          <p:nvSpPr>
+            <p:cNvPr id="17" name="楕円 16">
+              <a:extLst>
+                <a:ext uri="{FF2B5EF4-FFF2-40B4-BE49-F238E27FC236}">
+                  <a16:creationId xmlns:a16="http://schemas.microsoft.com/office/drawing/2014/main" id="{7D2B6234-0A71-46C1-B2F8-516ECCDC570B}"/>
+                </a:ext>
+              </a:extLst>
+            </p:cNvPr>
+            <p:cNvSpPr/>
+            <p:nvPr/>
+          </p:nvSpPr>
+          <p:spPr>
+            <a:xfrm>
+              <a:off x="4194407" y="1162808"/>
+              <a:ext cx="264869" cy="240790"/>
+            </a:xfrm>
+            <a:prstGeom prst="ellipse">
+              <a:avLst/>
+            </a:prstGeom>
+            <a:solidFill>
+              <a:schemeClr val="accent2"/>
+            </a:solidFill>
+          </p:spPr>
+          <p:style>
+            <a:lnRef idx="2">
+              <a:schemeClr val="accent1">
+                <a:shade val="50000"/>
+              </a:schemeClr>
+            </a:lnRef>
+            <a:fillRef idx="1">
+              <a:schemeClr val="accent1"/>
+            </a:fillRef>
+            <a:effectRef idx="0">
+              <a:schemeClr val="accent1"/>
+            </a:effectRef>
+            <a:fontRef idx="minor">
+              <a:schemeClr val="lt1"/>
+            </a:fontRef>
+          </p:style>
+          <p:txBody>
+            <a:bodyPr rtlCol="0" anchor="ctr"/>
+            <a:lstStyle/>
+            <a:p>
+              <a:pPr algn="ctr"/>
+              <a:endParaRPr kumimoji="1" lang="ja-JP" altLang="en-US"/>
+            </a:p>
+          </p:txBody>
+        </p:sp>
+        <p:sp>
+          <p:nvSpPr>
+            <p:cNvPr id="18" name="楕円 17">
+              <a:extLst>
+                <a:ext uri="{FF2B5EF4-FFF2-40B4-BE49-F238E27FC236}">
+                  <a16:creationId xmlns:a16="http://schemas.microsoft.com/office/drawing/2014/main" id="{FD36BE98-151A-4CBD-A0ED-6930D3B9C615}"/>
+                </a:ext>
+              </a:extLst>
+            </p:cNvPr>
+            <p:cNvSpPr/>
+            <p:nvPr/>
+          </p:nvSpPr>
+          <p:spPr>
+            <a:xfrm>
+              <a:off x="3188753" y="5469957"/>
+              <a:ext cx="264869" cy="240790"/>
+            </a:xfrm>
+            <a:prstGeom prst="ellipse">
+              <a:avLst/>
+            </a:prstGeom>
+            <a:solidFill>
+              <a:schemeClr val="accent2"/>
+            </a:solidFill>
+          </p:spPr>
+          <p:style>
+            <a:lnRef idx="2">
+              <a:schemeClr val="accent1">
+                <a:shade val="50000"/>
+              </a:schemeClr>
+            </a:lnRef>
+            <a:fillRef idx="1">
+              <a:schemeClr val="accent1"/>
+            </a:fillRef>
+            <a:effectRef idx="0">
+              <a:schemeClr val="accent1"/>
+            </a:effectRef>
+            <a:fontRef idx="minor">
+              <a:schemeClr val="lt1"/>
+            </a:fontRef>
+          </p:style>
+          <p:txBody>
+            <a:bodyPr rtlCol="0" anchor="ctr"/>
+            <a:lstStyle/>
+            <a:p>
+              <a:pPr algn="ctr"/>
+              <a:endParaRPr kumimoji="1" lang="ja-JP" altLang="en-US"/>
+            </a:p>
+          </p:txBody>
+        </p:sp>
+        <p:cxnSp>
+          <p:nvCxnSpPr>
+            <p:cNvPr id="19" name="直線矢印コネクタ 18">
+              <a:extLst>
+                <a:ext uri="{FF2B5EF4-FFF2-40B4-BE49-F238E27FC236}">
+                  <a16:creationId xmlns:a16="http://schemas.microsoft.com/office/drawing/2014/main" id="{F0AF50BE-4C1B-4593-A59F-AF8DA711021B}"/>
+                </a:ext>
+              </a:extLst>
+            </p:cNvPr>
+            <p:cNvCxnSpPr>
+              <a:cxnSpLocks/>
+              <a:endCxn id="18" idx="1"/>
+            </p:cNvCxnSpPr>
+            <p:nvPr/>
+          </p:nvCxnSpPr>
+          <p:spPr>
+            <a:xfrm>
+              <a:off x="1755743" y="3921369"/>
+              <a:ext cx="1471799" cy="1583851"/>
+            </a:xfrm>
+            <a:prstGeom prst="straightConnector1">
+              <a:avLst/>
+            </a:prstGeom>
+            <a:ln w="19050">
+              <a:solidFill>
+                <a:schemeClr val="tx1"/>
+              </a:solidFill>
+              <a:prstDash val="dash"/>
+              <a:tailEnd type="triangle"/>
+            </a:ln>
+          </p:spPr>
+          <p:style>
+            <a:lnRef idx="1">
+              <a:schemeClr val="accent1"/>
+            </a:lnRef>
+            <a:fillRef idx="0">
+              <a:schemeClr val="accent1"/>
+            </a:fillRef>
+            <a:effectRef idx="0">
+              <a:schemeClr val="accent1"/>
+            </a:effectRef>
+            <a:fontRef idx="minor">
+              <a:schemeClr val="tx1"/>
+            </a:fontRef>
+          </p:style>
+        </p:cxnSp>
+        <p:cxnSp>
+          <p:nvCxnSpPr>
+            <p:cNvPr id="20" name="直線矢印コネクタ 19">
+              <a:extLst>
+                <a:ext uri="{FF2B5EF4-FFF2-40B4-BE49-F238E27FC236}">
+                  <a16:creationId xmlns:a16="http://schemas.microsoft.com/office/drawing/2014/main" id="{6BA08854-37F1-4007-872E-A008E46E6951}"/>
+                </a:ext>
+              </a:extLst>
+            </p:cNvPr>
+            <p:cNvCxnSpPr>
+              <a:cxnSpLocks/>
+              <a:endCxn id="17" idx="3"/>
+            </p:cNvCxnSpPr>
+            <p:nvPr/>
+          </p:nvCxnSpPr>
+          <p:spPr>
+            <a:xfrm flipV="1">
+              <a:off x="1755743" y="1368335"/>
+              <a:ext cx="2477453" cy="2553034"/>
+            </a:xfrm>
+            <a:prstGeom prst="straightConnector1">
+              <a:avLst/>
+            </a:prstGeom>
+            <a:ln w="19050">
+              <a:solidFill>
+                <a:schemeClr val="tx1"/>
+              </a:solidFill>
+              <a:prstDash val="dash"/>
+              <a:tailEnd type="triangle"/>
+            </a:ln>
+          </p:spPr>
+          <p:style>
+            <a:lnRef idx="1">
+              <a:schemeClr val="accent1"/>
+            </a:lnRef>
+            <a:fillRef idx="0">
+              <a:schemeClr val="accent1"/>
+            </a:fillRef>
+            <a:effectRef idx="0">
+              <a:schemeClr val="accent1"/>
+            </a:effectRef>
+            <a:fontRef idx="minor">
+              <a:schemeClr val="tx1"/>
+            </a:fontRef>
+          </p:style>
+        </p:cxnSp>
+        <mc:AlternateContent xmlns:mc="http://schemas.openxmlformats.org/markup-compatibility/2006">
+          <mc:Choice xmlns:a14="http://schemas.microsoft.com/office/drawing/2010/main" Requires="a14">
+            <p:sp>
+              <p:nvSpPr>
+                <p:cNvPr id="21" name="テキスト ボックス 20">
+                  <a:extLst>
+                    <a:ext uri="{FF2B5EF4-FFF2-40B4-BE49-F238E27FC236}">
+                      <a16:creationId xmlns:a16="http://schemas.microsoft.com/office/drawing/2014/main" id="{1239C06C-EFA9-497F-84C8-90B42DAAD3B2}"/>
+                    </a:ext>
+                  </a:extLst>
+                </p:cNvPr>
+                <p:cNvSpPr txBox="1"/>
+                <p:nvPr/>
+              </p:nvSpPr>
+              <p:spPr>
+                <a:xfrm>
+                  <a:off x="1295023" y="4171969"/>
+                  <a:ext cx="522131" cy="400110"/>
+                </a:xfrm>
+                <a:prstGeom prst="rect">
+                  <a:avLst/>
+                </a:prstGeom>
+                <a:noFill/>
+              </p:spPr>
+              <p:txBody>
+                <a:bodyPr wrap="none" rtlCol="0">
+                  <a:spAutoFit/>
+                </a:bodyPr>
+                <a:lstStyle/>
+                <a:p>
+                  <a:pPr algn="ctr"/>
+                  <a14:m>
+                    <m:oMathPara xmlns:m="http://schemas.openxmlformats.org/officeDocument/2006/math">
+                      <m:oMathParaPr>
+                        <m:jc m:val="centerGroup"/>
+                      </m:oMathParaPr>
+                      <m:oMath xmlns:m="http://schemas.openxmlformats.org/officeDocument/2006/math">
+                        <m:sSub>
+                          <m:sSubPr>
+                            <m:ctrlPr>
+                              <a:rPr kumimoji="1" lang="en-US" altLang="ja-JP" sz="2000" i="1" smtClean="0">
+                                <a:latin typeface="Cambria Math" panose="02040503050406030204" pitchFamily="18" charset="0"/>
+                              </a:rPr>
+                            </m:ctrlPr>
+                          </m:sSubPr>
+                          <m:e>
+                            <m:r>
+                              <a:rPr kumimoji="1" lang="en-US" altLang="ja-JP" sz="2000" b="0" i="1" smtClean="0">
+                                <a:latin typeface="Cambria Math" panose="02040503050406030204" pitchFamily="18" charset="0"/>
+                              </a:rPr>
+                              <m:t>𝑥</m:t>
+                            </m:r>
+                          </m:e>
+                          <m:sub>
+                            <m:r>
+                              <a:rPr kumimoji="1" lang="en-US" altLang="ja-JP" sz="2000" b="0" i="1" smtClean="0">
+                                <a:latin typeface="Cambria Math" panose="02040503050406030204" pitchFamily="18" charset="0"/>
+                              </a:rPr>
+                              <m:t>𝑘</m:t>
+                            </m:r>
+                          </m:sub>
+                        </m:sSub>
+                      </m:oMath>
+                    </m:oMathPara>
+                  </a14:m>
+                  <a:endParaRPr kumimoji="1" lang="ja-JP" altLang="en-US" sz="2000" dirty="0"/>
+                </a:p>
+              </p:txBody>
+            </p:sp>
+          </mc:Choice>
+          <mc:Fallback>
+            <p:sp>
+              <p:nvSpPr>
+                <p:cNvPr id="21" name="テキスト ボックス 20">
+                  <a:extLst>
+                    <a:ext uri="{FF2B5EF4-FFF2-40B4-BE49-F238E27FC236}">
+                      <a16:creationId xmlns:a16="http://schemas.microsoft.com/office/drawing/2014/main" id="{1239C06C-EFA9-497F-84C8-90B42DAAD3B2}"/>
+                    </a:ext>
+                  </a:extLst>
+                </p:cNvPr>
+                <p:cNvSpPr txBox="1">
+                  <a:spLocks noRot="1" noChangeAspect="1" noMove="1" noResize="1" noEditPoints="1" noAdjustHandles="1" noChangeArrowheads="1" noChangeShapeType="1" noTextEdit="1"/>
+                </p:cNvSpPr>
+                <p:nvPr/>
+              </p:nvSpPr>
+              <p:spPr>
+                <a:xfrm>
+                  <a:off x="1295023" y="4171969"/>
+                  <a:ext cx="522131" cy="400110"/>
+                </a:xfrm>
+                <a:prstGeom prst="rect">
+                  <a:avLst/>
+                </a:prstGeom>
+                <a:blipFill>
+                  <a:blip r:embed="rId8"/>
+                  <a:stretch>
+                    <a:fillRect/>
+                  </a:stretch>
+                </a:blipFill>
+              </p:spPr>
+              <p:txBody>
+                <a:bodyPr/>
+                <a:lstStyle/>
+                <a:p>
+                  <a:r>
+                    <a:rPr lang="ja-JP" altLang="en-US">
+                      <a:noFill/>
+                    </a:rPr>
+                    <a:t> </a:t>
+                  </a:r>
+                </a:p>
+              </p:txBody>
+            </p:sp>
+          </mc:Fallback>
+        </mc:AlternateContent>
+        <mc:AlternateContent xmlns:mc="http://schemas.openxmlformats.org/markup-compatibility/2006">
+          <mc:Choice xmlns:a14="http://schemas.microsoft.com/office/drawing/2010/main" Requires="a14">
+            <p:sp>
+              <p:nvSpPr>
+                <p:cNvPr id="22" name="テキスト ボックス 21">
+                  <a:extLst>
+                    <a:ext uri="{FF2B5EF4-FFF2-40B4-BE49-F238E27FC236}">
+                      <a16:creationId xmlns:a16="http://schemas.microsoft.com/office/drawing/2014/main" id="{B58EFF20-4A22-4EA8-A95A-F1377DDF7A35}"/>
+                    </a:ext>
+                  </a:extLst>
+                </p:cNvPr>
+                <p:cNvSpPr txBox="1"/>
+                <p:nvPr/>
+              </p:nvSpPr>
+              <p:spPr>
+                <a:xfrm>
+                  <a:off x="2532090" y="4493380"/>
+                  <a:ext cx="609013" cy="400110"/>
+                </a:xfrm>
+                <a:prstGeom prst="rect">
+                  <a:avLst/>
+                </a:prstGeom>
+                <a:noFill/>
+              </p:spPr>
+              <p:txBody>
+                <a:bodyPr wrap="none" rtlCol="0">
+                  <a:spAutoFit/>
+                </a:bodyPr>
+                <a:lstStyle/>
+                <a:p>
+                  <a:pPr algn="ctr"/>
+                  <a14:m>
+                    <m:oMathPara xmlns:m="http://schemas.openxmlformats.org/officeDocument/2006/math">
+                      <m:oMathParaPr>
+                        <m:jc m:val="centerGroup"/>
+                      </m:oMathParaPr>
+                      <m:oMath xmlns:m="http://schemas.openxmlformats.org/officeDocument/2006/math">
+                        <m:sSub>
+                          <m:sSubPr>
+                            <m:ctrlPr>
+                              <a:rPr kumimoji="1" lang="en-US" altLang="ja-JP" sz="2000" i="1" smtClean="0">
+                                <a:latin typeface="Cambria Math" panose="02040503050406030204" pitchFamily="18" charset="0"/>
+                              </a:rPr>
+                            </m:ctrlPr>
+                          </m:sSubPr>
+                          <m:e>
+                            <m:r>
+                              <a:rPr kumimoji="1" lang="en-US" altLang="ja-JP" sz="2000" b="0" i="1" smtClean="0">
+                                <a:latin typeface="Cambria Math" panose="02040503050406030204" pitchFamily="18" charset="0"/>
+                              </a:rPr>
+                              <m:t>𝑧</m:t>
+                            </m:r>
+                          </m:e>
+                          <m:sub>
+                            <m:r>
+                              <a:rPr kumimoji="1" lang="en-US" altLang="ja-JP" sz="2000" b="0" i="1" smtClean="0">
+                                <a:latin typeface="Cambria Math" panose="02040503050406030204" pitchFamily="18" charset="0"/>
+                              </a:rPr>
+                              <m:t>𝑘</m:t>
+                            </m:r>
+                            <m:r>
+                              <a:rPr kumimoji="1" lang="en-US" altLang="ja-JP" sz="2000" b="0" i="1" smtClean="0">
+                                <a:latin typeface="Cambria Math" panose="02040503050406030204" pitchFamily="18" charset="0"/>
+                              </a:rPr>
+                              <m:t>1</m:t>
+                            </m:r>
+                          </m:sub>
+                        </m:sSub>
+                      </m:oMath>
+                    </m:oMathPara>
+                  </a14:m>
+                  <a:endParaRPr kumimoji="1" lang="ja-JP" altLang="en-US" sz="2000" dirty="0"/>
+                </a:p>
+              </p:txBody>
+            </p:sp>
+          </mc:Choice>
+          <mc:Fallback>
+            <p:sp>
+              <p:nvSpPr>
+                <p:cNvPr id="22" name="テキスト ボックス 21">
+                  <a:extLst>
+                    <a:ext uri="{FF2B5EF4-FFF2-40B4-BE49-F238E27FC236}">
+                      <a16:creationId xmlns:a16="http://schemas.microsoft.com/office/drawing/2014/main" id="{B58EFF20-4A22-4EA8-A95A-F1377DDF7A35}"/>
+                    </a:ext>
+                  </a:extLst>
+                </p:cNvPr>
+                <p:cNvSpPr txBox="1">
+                  <a:spLocks noRot="1" noChangeAspect="1" noMove="1" noResize="1" noEditPoints="1" noAdjustHandles="1" noChangeArrowheads="1" noChangeShapeType="1" noTextEdit="1"/>
+                </p:cNvSpPr>
+                <p:nvPr/>
+              </p:nvSpPr>
+              <p:spPr>
+                <a:xfrm>
+                  <a:off x="2532090" y="4493380"/>
+                  <a:ext cx="609013" cy="400110"/>
+                </a:xfrm>
+                <a:prstGeom prst="rect">
+                  <a:avLst/>
+                </a:prstGeom>
+                <a:blipFill>
+                  <a:blip r:embed="rId9"/>
+                  <a:stretch>
+                    <a:fillRect/>
+                  </a:stretch>
+                </a:blipFill>
+              </p:spPr>
+              <p:txBody>
+                <a:bodyPr/>
+                <a:lstStyle/>
+                <a:p>
+                  <a:r>
+                    <a:rPr lang="ja-JP" altLang="en-US">
+                      <a:noFill/>
+                    </a:rPr>
+                    <a:t> </a:t>
+                  </a:r>
+                </a:p>
+              </p:txBody>
+            </p:sp>
+          </mc:Fallback>
+        </mc:AlternateContent>
+        <mc:AlternateContent xmlns:mc="http://schemas.openxmlformats.org/markup-compatibility/2006">
+          <mc:Choice xmlns:a14="http://schemas.microsoft.com/office/drawing/2010/main" Requires="a14">
+            <p:sp>
+              <p:nvSpPr>
+                <p:cNvPr id="23" name="テキスト ボックス 22">
+                  <a:extLst>
+                    <a:ext uri="{FF2B5EF4-FFF2-40B4-BE49-F238E27FC236}">
+                      <a16:creationId xmlns:a16="http://schemas.microsoft.com/office/drawing/2014/main" id="{B8AC3873-A863-44CA-9428-FB298EE0DE90}"/>
+                    </a:ext>
+                  </a:extLst>
+                </p:cNvPr>
+                <p:cNvSpPr txBox="1"/>
+                <p:nvPr/>
+              </p:nvSpPr>
+              <p:spPr>
+                <a:xfrm>
+                  <a:off x="3421947" y="5305165"/>
+                  <a:ext cx="575670" cy="400110"/>
+                </a:xfrm>
+                <a:prstGeom prst="rect">
+                  <a:avLst/>
+                </a:prstGeom>
+                <a:noFill/>
+              </p:spPr>
+              <p:txBody>
+                <a:bodyPr wrap="none" rtlCol="0">
+                  <a:spAutoFit/>
+                </a:bodyPr>
+                <a:lstStyle/>
+                <a:p>
+                  <a:pPr algn="ctr"/>
+                  <a14:m>
+                    <m:oMathPara xmlns:m="http://schemas.openxmlformats.org/officeDocument/2006/math">
+                      <m:oMathParaPr>
+                        <m:jc m:val="centerGroup"/>
+                      </m:oMathParaPr>
+                      <m:oMath xmlns:m="http://schemas.openxmlformats.org/officeDocument/2006/math">
+                        <m:sSub>
+                          <m:sSubPr>
+                            <m:ctrlPr>
+                              <a:rPr kumimoji="1" lang="en-US" altLang="ja-JP" sz="2000" i="1" smtClean="0">
+                                <a:latin typeface="Cambria Math" panose="02040503050406030204" pitchFamily="18" charset="0"/>
+                              </a:rPr>
+                            </m:ctrlPr>
+                          </m:sSubPr>
+                          <m:e>
+                            <m:r>
+                              <a:rPr kumimoji="1" lang="en-US" altLang="ja-JP" sz="2000" b="0" i="1" smtClean="0">
+                                <a:latin typeface="Cambria Math" panose="02040503050406030204" pitchFamily="18" charset="0"/>
+                              </a:rPr>
+                              <m:t>𝑞</m:t>
+                            </m:r>
+                            <m:r>
+                              <a:rPr kumimoji="1" lang="en-US" altLang="ja-JP" sz="2000" b="0" i="1" smtClean="0">
+                                <a:latin typeface="Cambria Math" panose="02040503050406030204" pitchFamily="18" charset="0"/>
+                              </a:rPr>
+                              <m:t>′</m:t>
+                            </m:r>
+                          </m:e>
+                          <m:sub>
+                            <m:r>
+                              <a:rPr kumimoji="1" lang="en-US" altLang="ja-JP" sz="2000" b="0" i="1" smtClean="0">
+                                <a:latin typeface="Cambria Math" panose="02040503050406030204" pitchFamily="18" charset="0"/>
+                              </a:rPr>
+                              <m:t>1</m:t>
+                            </m:r>
+                          </m:sub>
+                        </m:sSub>
+                      </m:oMath>
+                    </m:oMathPara>
+                  </a14:m>
+                  <a:endParaRPr kumimoji="1" lang="ja-JP" altLang="en-US" sz="2000" dirty="0"/>
+                </a:p>
+              </p:txBody>
+            </p:sp>
+          </mc:Choice>
+          <mc:Fallback>
+            <p:sp>
+              <p:nvSpPr>
+                <p:cNvPr id="23" name="テキスト ボックス 22">
+                  <a:extLst>
+                    <a:ext uri="{FF2B5EF4-FFF2-40B4-BE49-F238E27FC236}">
+                      <a16:creationId xmlns:a16="http://schemas.microsoft.com/office/drawing/2014/main" id="{B8AC3873-A863-44CA-9428-FB298EE0DE90}"/>
+                    </a:ext>
+                  </a:extLst>
+                </p:cNvPr>
+                <p:cNvSpPr txBox="1">
+                  <a:spLocks noRot="1" noChangeAspect="1" noMove="1" noResize="1" noEditPoints="1" noAdjustHandles="1" noChangeArrowheads="1" noChangeShapeType="1" noTextEdit="1"/>
+                </p:cNvSpPr>
+                <p:nvPr/>
+              </p:nvSpPr>
+              <p:spPr>
+                <a:xfrm>
+                  <a:off x="3421947" y="5305165"/>
+                  <a:ext cx="575670" cy="400110"/>
+                </a:xfrm>
+                <a:prstGeom prst="rect">
+                  <a:avLst/>
+                </a:prstGeom>
+                <a:blipFill>
+                  <a:blip r:embed="rId10"/>
+                  <a:stretch>
+                    <a:fillRect/>
+                  </a:stretch>
+                </a:blipFill>
+              </p:spPr>
+              <p:txBody>
+                <a:bodyPr/>
+                <a:lstStyle/>
+                <a:p>
+                  <a:r>
+                    <a:rPr lang="ja-JP" altLang="en-US">
+                      <a:noFill/>
+                    </a:rPr>
+                    <a:t> </a:t>
+                  </a:r>
+                </a:p>
+              </p:txBody>
+            </p:sp>
+          </mc:Fallback>
+        </mc:AlternateContent>
+        <mc:AlternateContent xmlns:mc="http://schemas.openxmlformats.org/markup-compatibility/2006">
+          <mc:Choice xmlns:a14="http://schemas.microsoft.com/office/drawing/2010/main" Requires="a14">
+            <p:sp>
+              <p:nvSpPr>
+                <p:cNvPr id="24" name="テキスト ボックス 23">
+                  <a:extLst>
+                    <a:ext uri="{FF2B5EF4-FFF2-40B4-BE49-F238E27FC236}">
+                      <a16:creationId xmlns:a16="http://schemas.microsoft.com/office/drawing/2014/main" id="{DCC1E4DA-EDE8-4631-8325-0320284BC554}"/>
+                    </a:ext>
+                  </a:extLst>
+                </p:cNvPr>
+                <p:cNvSpPr txBox="1"/>
+                <p:nvPr/>
+              </p:nvSpPr>
+              <p:spPr>
+                <a:xfrm>
+                  <a:off x="2441916" y="2255143"/>
+                  <a:ext cx="609013" cy="400110"/>
+                </a:xfrm>
+                <a:prstGeom prst="rect">
+                  <a:avLst/>
+                </a:prstGeom>
+                <a:noFill/>
+              </p:spPr>
+              <p:txBody>
+                <a:bodyPr wrap="none" rtlCol="0">
+                  <a:spAutoFit/>
+                </a:bodyPr>
+                <a:lstStyle/>
+                <a:p>
+                  <a:pPr algn="ctr"/>
+                  <a14:m>
+                    <m:oMathPara xmlns:m="http://schemas.openxmlformats.org/officeDocument/2006/math">
+                      <m:oMathParaPr>
+                        <m:jc m:val="centerGroup"/>
+                      </m:oMathParaPr>
+                      <m:oMath xmlns:m="http://schemas.openxmlformats.org/officeDocument/2006/math">
+                        <m:sSub>
+                          <m:sSubPr>
+                            <m:ctrlPr>
+                              <a:rPr kumimoji="1" lang="en-US" altLang="ja-JP" sz="2000" i="1" smtClean="0">
+                                <a:latin typeface="Cambria Math" panose="02040503050406030204" pitchFamily="18" charset="0"/>
+                              </a:rPr>
+                            </m:ctrlPr>
+                          </m:sSubPr>
+                          <m:e>
+                            <m:r>
+                              <a:rPr kumimoji="1" lang="en-US" altLang="ja-JP" sz="2000" b="0" i="1" smtClean="0">
+                                <a:latin typeface="Cambria Math" panose="02040503050406030204" pitchFamily="18" charset="0"/>
+                              </a:rPr>
+                              <m:t>𝑧</m:t>
+                            </m:r>
+                          </m:e>
+                          <m:sub>
+                            <m:r>
+                              <a:rPr kumimoji="1" lang="en-US" altLang="ja-JP" sz="2000" b="0" i="1" smtClean="0">
+                                <a:latin typeface="Cambria Math" panose="02040503050406030204" pitchFamily="18" charset="0"/>
+                              </a:rPr>
+                              <m:t>𝑘</m:t>
+                            </m:r>
+                            <m:r>
+                              <a:rPr kumimoji="1" lang="en-US" altLang="ja-JP" sz="2000" b="0" i="1" smtClean="0">
+                                <a:latin typeface="Cambria Math" panose="02040503050406030204" pitchFamily="18" charset="0"/>
+                              </a:rPr>
+                              <m:t>2</m:t>
+                            </m:r>
+                          </m:sub>
+                        </m:sSub>
+                      </m:oMath>
+                    </m:oMathPara>
+                  </a14:m>
+                  <a:endParaRPr kumimoji="1" lang="ja-JP" altLang="en-US" sz="2000" dirty="0"/>
+                </a:p>
+              </p:txBody>
+            </p:sp>
+          </mc:Choice>
+          <mc:Fallback>
+            <p:sp>
+              <p:nvSpPr>
+                <p:cNvPr id="24" name="テキスト ボックス 23">
+                  <a:extLst>
+                    <a:ext uri="{FF2B5EF4-FFF2-40B4-BE49-F238E27FC236}">
+                      <a16:creationId xmlns:a16="http://schemas.microsoft.com/office/drawing/2014/main" id="{DCC1E4DA-EDE8-4631-8325-0320284BC554}"/>
+                    </a:ext>
+                  </a:extLst>
+                </p:cNvPr>
+                <p:cNvSpPr txBox="1">
+                  <a:spLocks noRot="1" noChangeAspect="1" noMove="1" noResize="1" noEditPoints="1" noAdjustHandles="1" noChangeArrowheads="1" noChangeShapeType="1" noTextEdit="1"/>
+                </p:cNvSpPr>
+                <p:nvPr/>
+              </p:nvSpPr>
+              <p:spPr>
+                <a:xfrm>
+                  <a:off x="2441916" y="2255143"/>
+                  <a:ext cx="609013" cy="400110"/>
+                </a:xfrm>
+                <a:prstGeom prst="rect">
+                  <a:avLst/>
+                </a:prstGeom>
+                <a:blipFill>
+                  <a:blip r:embed="rId11"/>
+                  <a:stretch>
+                    <a:fillRect/>
+                  </a:stretch>
+                </a:blipFill>
+              </p:spPr>
+              <p:txBody>
+                <a:bodyPr/>
+                <a:lstStyle/>
+                <a:p>
+                  <a:r>
+                    <a:rPr lang="ja-JP" altLang="en-US">
+                      <a:noFill/>
+                    </a:rPr>
+                    <a:t> </a:t>
+                  </a:r>
+                </a:p>
+              </p:txBody>
+            </p:sp>
+          </mc:Fallback>
+        </mc:AlternateContent>
+        <mc:AlternateContent xmlns:mc="http://schemas.openxmlformats.org/markup-compatibility/2006">
+          <mc:Choice xmlns:a14="http://schemas.microsoft.com/office/drawing/2010/main" Requires="a14">
+            <p:sp>
+              <p:nvSpPr>
+                <p:cNvPr id="25" name="テキスト ボックス 24">
+                  <a:extLst>
+                    <a:ext uri="{FF2B5EF4-FFF2-40B4-BE49-F238E27FC236}">
+                      <a16:creationId xmlns:a16="http://schemas.microsoft.com/office/drawing/2014/main" id="{B21FF96A-9365-4493-B7B3-B911C4D78C2E}"/>
+                    </a:ext>
+                  </a:extLst>
+                </p:cNvPr>
+                <p:cNvSpPr txBox="1"/>
+                <p:nvPr/>
+              </p:nvSpPr>
+              <p:spPr>
+                <a:xfrm>
+                  <a:off x="4191725" y="748147"/>
+                  <a:ext cx="581634" cy="400110"/>
+                </a:xfrm>
+                <a:prstGeom prst="rect">
+                  <a:avLst/>
+                </a:prstGeom>
+                <a:noFill/>
+              </p:spPr>
+              <p:txBody>
+                <a:bodyPr wrap="none" rtlCol="0">
+                  <a:spAutoFit/>
+                </a:bodyPr>
+                <a:lstStyle/>
+                <a:p>
+                  <a:pPr algn="ctr"/>
+                  <a14:m>
+                    <m:oMathPara xmlns:m="http://schemas.openxmlformats.org/officeDocument/2006/math">
+                      <m:oMathParaPr>
+                        <m:jc m:val="centerGroup"/>
+                      </m:oMathParaPr>
+                      <m:oMath xmlns:m="http://schemas.openxmlformats.org/officeDocument/2006/math">
+                        <m:sSub>
+                          <m:sSubPr>
+                            <m:ctrlPr>
+                              <a:rPr kumimoji="1" lang="en-US" altLang="ja-JP" sz="2000" i="1" smtClean="0">
+                                <a:latin typeface="Cambria Math" panose="02040503050406030204" pitchFamily="18" charset="0"/>
+                              </a:rPr>
+                            </m:ctrlPr>
+                          </m:sSubPr>
+                          <m:e>
+                            <m:r>
+                              <a:rPr kumimoji="1" lang="en-US" altLang="ja-JP" sz="2000" b="0" i="1" smtClean="0">
+                                <a:latin typeface="Cambria Math" panose="02040503050406030204" pitchFamily="18" charset="0"/>
+                              </a:rPr>
+                              <m:t>𝑞</m:t>
+                            </m:r>
+                            <m:r>
+                              <a:rPr kumimoji="1" lang="en-US" altLang="ja-JP" sz="2000" b="0" i="1" smtClean="0">
+                                <a:latin typeface="Cambria Math" panose="02040503050406030204" pitchFamily="18" charset="0"/>
+                              </a:rPr>
+                              <m:t>′</m:t>
+                            </m:r>
+                          </m:e>
+                          <m:sub>
+                            <m:r>
+                              <a:rPr kumimoji="1" lang="en-US" altLang="ja-JP" sz="2000" b="0" i="1" smtClean="0">
+                                <a:latin typeface="Cambria Math" panose="02040503050406030204" pitchFamily="18" charset="0"/>
+                              </a:rPr>
+                              <m:t>2</m:t>
+                            </m:r>
+                          </m:sub>
+                        </m:sSub>
+                      </m:oMath>
+                    </m:oMathPara>
+                  </a14:m>
+                  <a:endParaRPr kumimoji="1" lang="ja-JP" altLang="en-US" sz="2000" dirty="0"/>
+                </a:p>
+              </p:txBody>
+            </p:sp>
+          </mc:Choice>
+          <mc:Fallback>
+            <p:sp>
+              <p:nvSpPr>
+                <p:cNvPr id="25" name="テキスト ボックス 24">
+                  <a:extLst>
+                    <a:ext uri="{FF2B5EF4-FFF2-40B4-BE49-F238E27FC236}">
+                      <a16:creationId xmlns:a16="http://schemas.microsoft.com/office/drawing/2014/main" id="{B21FF96A-9365-4493-B7B3-B911C4D78C2E}"/>
+                    </a:ext>
+                  </a:extLst>
+                </p:cNvPr>
+                <p:cNvSpPr txBox="1">
+                  <a:spLocks noRot="1" noChangeAspect="1" noMove="1" noResize="1" noEditPoints="1" noAdjustHandles="1" noChangeArrowheads="1" noChangeShapeType="1" noTextEdit="1"/>
+                </p:cNvSpPr>
+                <p:nvPr/>
+              </p:nvSpPr>
+              <p:spPr>
+                <a:xfrm>
+                  <a:off x="4191725" y="748147"/>
+                  <a:ext cx="581634" cy="400110"/>
+                </a:xfrm>
+                <a:prstGeom prst="rect">
+                  <a:avLst/>
+                </a:prstGeom>
+                <a:blipFill>
+                  <a:blip r:embed="rId12"/>
+                  <a:stretch>
+                    <a:fillRect/>
+                  </a:stretch>
+                </a:blipFill>
+              </p:spPr>
+              <p:txBody>
+                <a:bodyPr/>
+                <a:lstStyle/>
+                <a:p>
+                  <a:r>
+                    <a:rPr lang="ja-JP" altLang="en-US">
+                      <a:noFill/>
+                    </a:rPr>
+                    <a:t> </a:t>
+                  </a:r>
+                </a:p>
+              </p:txBody>
+            </p:sp>
+          </mc:Fallback>
+        </mc:AlternateContent>
+      </p:grpSp>
+      <p:sp>
+        <p:nvSpPr>
+          <p:cNvPr id="28" name="矢印: 五方向 27">
+            <a:extLst>
+              <a:ext uri="{FF2B5EF4-FFF2-40B4-BE49-F238E27FC236}">
+                <a16:creationId xmlns:a16="http://schemas.microsoft.com/office/drawing/2014/main" id="{0C406453-8582-4157-8968-0009F9C84730}"/>
+              </a:ext>
+            </a:extLst>
+          </p:cNvPr>
+          <p:cNvSpPr/>
+          <p:nvPr/>
+        </p:nvSpPr>
+        <p:spPr>
+          <a:xfrm rot="1552166">
+            <a:off x="3168864" y="2942867"/>
+            <a:ext cx="738711" cy="484632"/>
+          </a:xfrm>
+          <a:prstGeom prst="homePlate">
+            <a:avLst/>
+          </a:prstGeom>
+        </p:spPr>
+        <p:style>
+          <a:lnRef idx="2">
+            <a:schemeClr val="accent1">
+              <a:shade val="50000"/>
+            </a:schemeClr>
+          </a:lnRef>
+          <a:fillRef idx="1">
+            <a:schemeClr val="accent1"/>
+          </a:fillRef>
+          <a:effectRef idx="0">
+            <a:schemeClr val="accent1"/>
+          </a:effectRef>
+          <a:fontRef idx="minor">
+            <a:schemeClr val="lt1"/>
+          </a:fontRef>
+        </p:style>
+        <p:txBody>
+          <a:bodyPr rtlCol="0" anchor="ctr"/>
+          <a:lstStyle/>
+          <a:p>
+            <a:pPr algn="ctr"/>
+            <a:endParaRPr kumimoji="1" lang="ja-JP" altLang="en-US"/>
+          </a:p>
+        </p:txBody>
+      </p:sp>
+      <p:cxnSp>
+        <p:nvCxnSpPr>
+          <p:cNvPr id="29" name="直線矢印コネクタ 28">
+            <a:extLst>
+              <a:ext uri="{FF2B5EF4-FFF2-40B4-BE49-F238E27FC236}">
+                <a16:creationId xmlns:a16="http://schemas.microsoft.com/office/drawing/2014/main" id="{0C2465AF-1672-42FE-ACC0-E82ED3908D9C}"/>
+              </a:ext>
+            </a:extLst>
+          </p:cNvPr>
+          <p:cNvCxnSpPr>
+            <a:cxnSpLocks/>
+          </p:cNvCxnSpPr>
+          <p:nvPr/>
+        </p:nvCxnSpPr>
+        <p:spPr>
+          <a:xfrm>
+            <a:off x="3455073" y="3156360"/>
+            <a:ext cx="1444179" cy="662276"/>
+          </a:xfrm>
+          <a:prstGeom prst="straightConnector1">
+            <a:avLst/>
+          </a:prstGeom>
+          <a:ln w="19050">
+            <a:solidFill>
+              <a:schemeClr val="tx1"/>
+            </a:solidFill>
+            <a:tailEnd type="triangle"/>
+          </a:ln>
+        </p:spPr>
+        <p:style>
+          <a:lnRef idx="1">
+            <a:schemeClr val="accent1"/>
+          </a:lnRef>
+          <a:fillRef idx="0">
+            <a:schemeClr val="accent1"/>
+          </a:fillRef>
+          <a:effectRef idx="0">
+            <a:schemeClr val="accent1"/>
+          </a:effectRef>
+          <a:fontRef idx="minor">
+            <a:schemeClr val="tx1"/>
+          </a:fontRef>
+        </p:style>
+      </p:cxnSp>
+      <mc:AlternateContent xmlns:mc="http://schemas.openxmlformats.org/markup-compatibility/2006">
+        <mc:Choice xmlns:a14="http://schemas.microsoft.com/office/drawing/2010/main" Requires="a14">
+          <p:sp>
+            <p:nvSpPr>
+              <p:cNvPr id="31" name="テキスト ボックス 30">
+                <a:extLst>
+                  <a:ext uri="{FF2B5EF4-FFF2-40B4-BE49-F238E27FC236}">
+                    <a16:creationId xmlns:a16="http://schemas.microsoft.com/office/drawing/2014/main" id="{086CC3D7-7C27-4F7F-BAB3-2FD93A4909B9}"/>
+                  </a:ext>
+                </a:extLst>
+              </p:cNvPr>
+              <p:cNvSpPr txBox="1"/>
+              <p:nvPr/>
+            </p:nvSpPr>
+            <p:spPr>
+              <a:xfrm>
+                <a:off x="2647925" y="3185183"/>
+                <a:ext cx="767390" cy="400110"/>
+              </a:xfrm>
+              <a:prstGeom prst="rect">
+                <a:avLst/>
+              </a:prstGeom>
+              <a:noFill/>
+            </p:spPr>
+            <p:txBody>
+              <a:bodyPr wrap="none" rtlCol="0">
+                <a:spAutoFit/>
+              </a:bodyPr>
+              <a:lstStyle/>
+              <a:p>
+                <a:pPr algn="ctr"/>
+                <a14:m>
+                  <m:oMathPara xmlns:m="http://schemas.openxmlformats.org/officeDocument/2006/math">
+                    <m:oMathParaPr>
+                      <m:jc m:val="centerGroup"/>
+                    </m:oMathParaPr>
+                    <m:oMath xmlns:m="http://schemas.openxmlformats.org/officeDocument/2006/math">
+                      <m:sSub>
+                        <m:sSubPr>
+                          <m:ctrlPr>
+                            <a:rPr kumimoji="1" lang="en-US" altLang="ja-JP" sz="2000" i="1" smtClean="0">
+                              <a:latin typeface="Cambria Math" panose="02040503050406030204" pitchFamily="18" charset="0"/>
+                            </a:rPr>
+                          </m:ctrlPr>
+                        </m:sSubPr>
+                        <m:e>
+                          <m:r>
+                            <a:rPr kumimoji="1" lang="en-US" altLang="ja-JP" sz="2000" b="0" i="1" smtClean="0">
+                              <a:latin typeface="Cambria Math" panose="02040503050406030204" pitchFamily="18" charset="0"/>
+                            </a:rPr>
+                            <m:t>𝑥</m:t>
+                          </m:r>
+                        </m:e>
+                        <m:sub>
+                          <m:r>
+                            <a:rPr kumimoji="1" lang="en-US" altLang="ja-JP" sz="2000" b="0" i="1" smtClean="0">
+                              <a:latin typeface="Cambria Math" panose="02040503050406030204" pitchFamily="18" charset="0"/>
+                            </a:rPr>
+                            <m:t>𝑘</m:t>
+                          </m:r>
+                          <m:r>
+                            <a:rPr kumimoji="1" lang="en-US" altLang="ja-JP" sz="2000" b="0" i="1" smtClean="0">
+                              <a:latin typeface="Cambria Math" panose="02040503050406030204" pitchFamily="18" charset="0"/>
+                            </a:rPr>
+                            <m:t>−1</m:t>
+                          </m:r>
+                        </m:sub>
+                      </m:sSub>
+                    </m:oMath>
+                  </m:oMathPara>
+                </a14:m>
+                <a:endParaRPr kumimoji="1" lang="ja-JP" altLang="en-US" sz="2000" dirty="0"/>
+              </a:p>
+            </p:txBody>
+          </p:sp>
+        </mc:Choice>
+        <mc:Fallback>
+          <p:sp>
+            <p:nvSpPr>
+              <p:cNvPr id="31" name="テキスト ボックス 30">
+                <a:extLst>
+                  <a:ext uri="{FF2B5EF4-FFF2-40B4-BE49-F238E27FC236}">
+                    <a16:creationId xmlns:a16="http://schemas.microsoft.com/office/drawing/2014/main" id="{086CC3D7-7C27-4F7F-BAB3-2FD93A4909B9}"/>
+                  </a:ext>
+                </a:extLst>
+              </p:cNvPr>
+              <p:cNvSpPr txBox="1">
+                <a:spLocks noRot="1" noChangeAspect="1" noMove="1" noResize="1" noEditPoints="1" noAdjustHandles="1" noChangeArrowheads="1" noChangeShapeType="1" noTextEdit="1"/>
+              </p:cNvSpPr>
+              <p:nvPr/>
+            </p:nvSpPr>
+            <p:spPr>
+              <a:xfrm>
+                <a:off x="2647925" y="3185183"/>
+                <a:ext cx="767390" cy="400110"/>
+              </a:xfrm>
+              <a:prstGeom prst="rect">
+                <a:avLst/>
+              </a:prstGeom>
+              <a:blipFill>
+                <a:blip r:embed="rId13"/>
+                <a:stretch>
+                  <a:fillRect b="-1538"/>
+                </a:stretch>
+              </a:blipFill>
+            </p:spPr>
+            <p:txBody>
+              <a:bodyPr/>
+              <a:lstStyle/>
+              <a:p>
+                <a:r>
+                  <a:rPr lang="ja-JP" altLang="en-US">
+                    <a:noFill/>
+                  </a:rPr>
+                  <a:t> </a:t>
+                </a:r>
+              </a:p>
+            </p:txBody>
+          </p:sp>
+        </mc:Fallback>
+      </mc:AlternateContent>
+    </p:spTree>
+    <p:extLst>
+      <p:ext uri="{BB962C8B-B14F-4D97-AF65-F5344CB8AC3E}">
+        <p14:creationId xmlns:p14="http://schemas.microsoft.com/office/powerpoint/2010/main" val="1217307754"/>
+      </p:ext>
+    </p:extLst>
+  </p:cSld>
+  <p:clrMapOvr>
+    <a:masterClrMapping/>
+  </p:clrMapOvr>
+</p:sld>
+</file>
+
+<file path=ppt/slides/slide3.xml><?xml version="1.0" encoding="utf-8"?>
+<p:sld xmlns:a="http://schemas.openxmlformats.org/drawingml/2006/main" xmlns:r="http://schemas.openxmlformats.org/officeDocument/2006/relationships" xmlns:p="http://schemas.openxmlformats.org/presentationml/2006/main">
+  <p:cSld>
+    <p:spTree>
+      <p:nvGrpSpPr>
+        <p:cNvPr id="1" name=""/>
+        <p:cNvGrpSpPr/>
+        <p:nvPr/>
+      </p:nvGrpSpPr>
+      <p:grpSpPr>
+        <a:xfrm>
+          <a:off x="0" y="0"/>
+          <a:ext cx="0" cy="0"/>
+          <a:chOff x="0" y="0"/>
+          <a:chExt cx="0" cy="0"/>
+        </a:xfrm>
+      </p:grpSpPr>
+      <p:sp>
+        <p:nvSpPr>
+          <p:cNvPr id="2" name="矢印: 五方向 1">
+            <a:extLst>
+              <a:ext uri="{FF2B5EF4-FFF2-40B4-BE49-F238E27FC236}">
+                <a16:creationId xmlns:a16="http://schemas.microsoft.com/office/drawing/2014/main" id="{59B41FE0-3DAB-47A7-A820-0F55B592D954}"/>
+              </a:ext>
+            </a:extLst>
+          </p:cNvPr>
+          <p:cNvSpPr/>
+          <p:nvPr/>
+        </p:nvSpPr>
+        <p:spPr>
+          <a:xfrm rot="21211424">
+            <a:off x="5868145" y="3526653"/>
+            <a:ext cx="738711" cy="484632"/>
+          </a:xfrm>
+          <a:prstGeom prst="homePlate">
+            <a:avLst/>
+          </a:prstGeom>
+        </p:spPr>
+        <p:style>
+          <a:lnRef idx="2">
+            <a:schemeClr val="accent1">
+              <a:shade val="50000"/>
+            </a:schemeClr>
+          </a:lnRef>
+          <a:fillRef idx="1">
+            <a:schemeClr val="accent1"/>
+          </a:fillRef>
+          <a:effectRef idx="0">
+            <a:schemeClr val="accent1"/>
+          </a:effectRef>
+          <a:fontRef idx="minor">
+            <a:schemeClr val="lt1"/>
+          </a:fontRef>
+        </p:style>
+        <p:txBody>
+          <a:bodyPr rtlCol="0" anchor="ctr"/>
+          <a:lstStyle/>
+          <a:p>
+            <a:pPr algn="ctr"/>
+            <a:endParaRPr kumimoji="1" lang="ja-JP" altLang="en-US"/>
+          </a:p>
+        </p:txBody>
+      </p:sp>
+      <p:cxnSp>
+        <p:nvCxnSpPr>
+          <p:cNvPr id="3" name="直線矢印コネクタ 2">
+            <a:extLst>
+              <a:ext uri="{FF2B5EF4-FFF2-40B4-BE49-F238E27FC236}">
+                <a16:creationId xmlns:a16="http://schemas.microsoft.com/office/drawing/2014/main" id="{FF607F31-20C5-4356-AB69-B64B498D7420}"/>
+              </a:ext>
+            </a:extLst>
+          </p:cNvPr>
+          <p:cNvCxnSpPr>
+            <a:cxnSpLocks/>
+          </p:cNvCxnSpPr>
+          <p:nvPr/>
+        </p:nvCxnSpPr>
+        <p:spPr>
+          <a:xfrm flipV="1">
+            <a:off x="6161110" y="3486539"/>
+            <a:ext cx="2838823" cy="282430"/>
+          </a:xfrm>
+          <a:prstGeom prst="straightConnector1">
+            <a:avLst/>
+          </a:prstGeom>
+          <a:ln w="19050">
+            <a:solidFill>
+              <a:schemeClr val="tx1"/>
+            </a:solidFill>
+            <a:tailEnd type="triangle"/>
+          </a:ln>
+        </p:spPr>
+        <p:style>
+          <a:lnRef idx="1">
+            <a:schemeClr val="accent1"/>
+          </a:lnRef>
+          <a:fillRef idx="0">
+            <a:schemeClr val="accent1"/>
+          </a:fillRef>
+          <a:effectRef idx="0">
+            <a:schemeClr val="accent1"/>
+          </a:effectRef>
+          <a:fontRef idx="minor">
+            <a:schemeClr val="tx1"/>
+          </a:fontRef>
+        </p:style>
+      </p:cxnSp>
+      <p:sp>
+        <p:nvSpPr>
+          <p:cNvPr id="4" name="楕円 3">
+            <a:extLst>
+              <a:ext uri="{FF2B5EF4-FFF2-40B4-BE49-F238E27FC236}">
+                <a16:creationId xmlns:a16="http://schemas.microsoft.com/office/drawing/2014/main" id="{ABF30BCB-844F-4D80-A710-9C3D55A082D4}"/>
+              </a:ext>
+            </a:extLst>
+          </p:cNvPr>
+          <p:cNvSpPr/>
+          <p:nvPr/>
+        </p:nvSpPr>
+        <p:spPr>
+          <a:xfrm>
+            <a:off x="8622896" y="1010408"/>
+            <a:ext cx="264869" cy="240790"/>
+          </a:xfrm>
+          <a:prstGeom prst="ellipse">
+            <a:avLst/>
+          </a:prstGeom>
+          <a:solidFill>
+            <a:schemeClr val="accent2"/>
+          </a:solidFill>
+        </p:spPr>
+        <p:style>
+          <a:lnRef idx="2">
+            <a:schemeClr val="accent1">
+              <a:shade val="50000"/>
+            </a:schemeClr>
+          </a:lnRef>
+          <a:fillRef idx="1">
+            <a:schemeClr val="accent1"/>
+          </a:fillRef>
+          <a:effectRef idx="0">
+            <a:schemeClr val="accent1"/>
+          </a:effectRef>
+          <a:fontRef idx="minor">
+            <a:schemeClr val="lt1"/>
+          </a:fontRef>
+        </p:style>
+        <p:txBody>
+          <a:bodyPr rtlCol="0" anchor="ctr"/>
+          <a:lstStyle/>
+          <a:p>
+            <a:pPr algn="ctr"/>
+            <a:endParaRPr kumimoji="1" lang="ja-JP" altLang="en-US"/>
+          </a:p>
+        </p:txBody>
+      </p:sp>
+      <p:sp>
+        <p:nvSpPr>
+          <p:cNvPr id="5" name="楕円 4">
+            <a:extLst>
+              <a:ext uri="{FF2B5EF4-FFF2-40B4-BE49-F238E27FC236}">
+                <a16:creationId xmlns:a16="http://schemas.microsoft.com/office/drawing/2014/main" id="{2F2316B4-5E1A-41A2-A320-DEEB7AAAAF77}"/>
+              </a:ext>
+            </a:extLst>
+          </p:cNvPr>
+          <p:cNvSpPr/>
+          <p:nvPr/>
+        </p:nvSpPr>
+        <p:spPr>
+          <a:xfrm>
+            <a:off x="7617242" y="5317557"/>
+            <a:ext cx="264869" cy="240790"/>
+          </a:xfrm>
+          <a:prstGeom prst="ellipse">
+            <a:avLst/>
+          </a:prstGeom>
+          <a:solidFill>
+            <a:schemeClr val="accent2"/>
+          </a:solidFill>
+        </p:spPr>
+        <p:style>
+          <a:lnRef idx="2">
+            <a:schemeClr val="accent1">
+              <a:shade val="50000"/>
+            </a:schemeClr>
+          </a:lnRef>
+          <a:fillRef idx="1">
+            <a:schemeClr val="accent1"/>
+          </a:fillRef>
+          <a:effectRef idx="0">
+            <a:schemeClr val="accent1"/>
+          </a:effectRef>
+          <a:fontRef idx="minor">
+            <a:schemeClr val="lt1"/>
+          </a:fontRef>
+        </p:style>
+        <p:txBody>
+          <a:bodyPr rtlCol="0" anchor="ctr"/>
+          <a:lstStyle/>
+          <a:p>
+            <a:pPr algn="ctr"/>
+            <a:endParaRPr kumimoji="1" lang="ja-JP" altLang="en-US"/>
+          </a:p>
+        </p:txBody>
+      </p:sp>
+      <p:cxnSp>
+        <p:nvCxnSpPr>
+          <p:cNvPr id="6" name="直線矢印コネクタ 5">
+            <a:extLst>
+              <a:ext uri="{FF2B5EF4-FFF2-40B4-BE49-F238E27FC236}">
+                <a16:creationId xmlns:a16="http://schemas.microsoft.com/office/drawing/2014/main" id="{916A3DE5-13FF-44A2-92BC-B939239EC239}"/>
+              </a:ext>
+            </a:extLst>
+          </p:cNvPr>
+          <p:cNvCxnSpPr>
+            <a:cxnSpLocks/>
+            <a:endCxn id="5" idx="1"/>
+          </p:cNvCxnSpPr>
+          <p:nvPr/>
+        </p:nvCxnSpPr>
+        <p:spPr>
+          <a:xfrm>
+            <a:off x="6184232" y="3768969"/>
+            <a:ext cx="1471799" cy="1583851"/>
+          </a:xfrm>
+          <a:prstGeom prst="straightConnector1">
+            <a:avLst/>
+          </a:prstGeom>
+          <a:ln w="19050">
+            <a:solidFill>
+              <a:schemeClr val="tx1"/>
+            </a:solidFill>
+            <a:prstDash val="dash"/>
+            <a:tailEnd type="triangle"/>
+          </a:ln>
+        </p:spPr>
+        <p:style>
+          <a:lnRef idx="1">
+            <a:schemeClr val="accent1"/>
+          </a:lnRef>
+          <a:fillRef idx="0">
+            <a:schemeClr val="accent1"/>
+          </a:fillRef>
+          <a:effectRef idx="0">
+            <a:schemeClr val="accent1"/>
+          </a:effectRef>
+          <a:fontRef idx="minor">
+            <a:schemeClr val="tx1"/>
+          </a:fontRef>
+        </p:style>
+      </p:cxnSp>
+      <p:cxnSp>
+        <p:nvCxnSpPr>
+          <p:cNvPr id="7" name="直線矢印コネクタ 6">
+            <a:extLst>
+              <a:ext uri="{FF2B5EF4-FFF2-40B4-BE49-F238E27FC236}">
+                <a16:creationId xmlns:a16="http://schemas.microsoft.com/office/drawing/2014/main" id="{5C4EC2F8-936E-4A43-A253-C4D10FCEBE86}"/>
+              </a:ext>
+            </a:extLst>
+          </p:cNvPr>
+          <p:cNvCxnSpPr>
+            <a:cxnSpLocks/>
+            <a:endCxn id="4" idx="3"/>
+          </p:cNvCxnSpPr>
+          <p:nvPr/>
+        </p:nvCxnSpPr>
+        <p:spPr>
+          <a:xfrm flipV="1">
+            <a:off x="6184232" y="1215935"/>
+            <a:ext cx="2477453" cy="2553034"/>
+          </a:xfrm>
+          <a:prstGeom prst="straightConnector1">
+            <a:avLst/>
+          </a:prstGeom>
+          <a:ln w="19050">
+            <a:solidFill>
+              <a:schemeClr val="tx1"/>
+            </a:solidFill>
+            <a:prstDash val="dash"/>
+            <a:tailEnd type="triangle"/>
+          </a:ln>
+        </p:spPr>
+        <p:style>
+          <a:lnRef idx="1">
+            <a:schemeClr val="accent1"/>
+          </a:lnRef>
+          <a:fillRef idx="0">
+            <a:schemeClr val="accent1"/>
+          </a:fillRef>
+          <a:effectRef idx="0">
+            <a:schemeClr val="accent1"/>
+          </a:effectRef>
+          <a:fontRef idx="minor">
+            <a:schemeClr val="tx1"/>
+          </a:fontRef>
+        </p:style>
+      </p:cxnSp>
+      <mc:AlternateContent xmlns:mc="http://schemas.openxmlformats.org/markup-compatibility/2006">
+        <mc:Choice xmlns:a14="http://schemas.microsoft.com/office/drawing/2010/main" Requires="a14">
+          <p:sp>
+            <p:nvSpPr>
+              <p:cNvPr id="9" name="テキスト ボックス 8">
+                <a:extLst>
+                  <a:ext uri="{FF2B5EF4-FFF2-40B4-BE49-F238E27FC236}">
+                    <a16:creationId xmlns:a16="http://schemas.microsoft.com/office/drawing/2014/main" id="{890598E5-6B16-487B-9CE4-1CD15D3F15BC}"/>
+                  </a:ext>
+                </a:extLst>
+              </p:cNvPr>
+              <p:cNvSpPr txBox="1"/>
+              <p:nvPr/>
+            </p:nvSpPr>
+            <p:spPr>
+              <a:xfrm>
+                <a:off x="5731656" y="4019569"/>
+                <a:ext cx="505844" cy="400110"/>
+              </a:xfrm>
+              <a:prstGeom prst="rect">
+                <a:avLst/>
+              </a:prstGeom>
+              <a:noFill/>
+            </p:spPr>
+            <p:txBody>
+              <a:bodyPr wrap="none" rtlCol="0">
+                <a:spAutoFit/>
+              </a:bodyPr>
+              <a:lstStyle/>
+              <a:p>
+                <a:pPr algn="ctr"/>
+                <a14:m>
+                  <m:oMathPara xmlns:m="http://schemas.openxmlformats.org/officeDocument/2006/math">
+                    <m:oMathParaPr>
+                      <m:jc m:val="centerGroup"/>
+                    </m:oMathParaPr>
+                    <m:oMath xmlns:m="http://schemas.openxmlformats.org/officeDocument/2006/math">
+                      <m:sSub>
+                        <m:sSubPr>
+                          <m:ctrlPr>
+                            <a:rPr kumimoji="1" lang="en-US" altLang="ja-JP" sz="2000" i="1" smtClean="0">
+                              <a:latin typeface="Cambria Math" panose="02040503050406030204" pitchFamily="18" charset="0"/>
+                            </a:rPr>
+                          </m:ctrlPr>
+                        </m:sSubPr>
+                        <m:e>
+                          <m:r>
+                            <a:rPr kumimoji="1" lang="en-US" altLang="ja-JP" sz="2000" b="0" i="1" smtClean="0">
+                              <a:latin typeface="Cambria Math" panose="02040503050406030204" pitchFamily="18" charset="0"/>
+                            </a:rPr>
+                            <m:t>𝑥</m:t>
+                          </m:r>
+                        </m:e>
+                        <m:sub>
+                          <m:r>
+                            <a:rPr kumimoji="1" lang="en-US" altLang="ja-JP" sz="2000" b="0" i="1" smtClean="0">
+                              <a:latin typeface="Cambria Math" panose="02040503050406030204" pitchFamily="18" charset="0"/>
+                            </a:rPr>
+                            <m:t>1</m:t>
+                          </m:r>
+                        </m:sub>
+                      </m:sSub>
+                    </m:oMath>
+                  </m:oMathPara>
+                </a14:m>
+                <a:endParaRPr kumimoji="1" lang="ja-JP" altLang="en-US" sz="2000" dirty="0"/>
+              </a:p>
+            </p:txBody>
+          </p:sp>
+        </mc:Choice>
+        <mc:Fallback>
+          <p:sp>
+            <p:nvSpPr>
+              <p:cNvPr id="9" name="テキスト ボックス 8">
+                <a:extLst>
+                  <a:ext uri="{FF2B5EF4-FFF2-40B4-BE49-F238E27FC236}">
+                    <a16:creationId xmlns:a16="http://schemas.microsoft.com/office/drawing/2014/main" id="{890598E5-6B16-487B-9CE4-1CD15D3F15BC}"/>
+                  </a:ext>
+                </a:extLst>
+              </p:cNvPr>
+              <p:cNvSpPr txBox="1">
+                <a:spLocks noRot="1" noChangeAspect="1" noMove="1" noResize="1" noEditPoints="1" noAdjustHandles="1" noChangeArrowheads="1" noChangeShapeType="1" noTextEdit="1"/>
+              </p:cNvSpPr>
+              <p:nvPr/>
+            </p:nvSpPr>
+            <p:spPr>
+              <a:xfrm>
+                <a:off x="5731656" y="4019569"/>
+                <a:ext cx="505844" cy="400110"/>
+              </a:xfrm>
+              <a:prstGeom prst="rect">
+                <a:avLst/>
+              </a:prstGeom>
+              <a:blipFill>
+                <a:blip r:embed="rId2"/>
+                <a:stretch>
+                  <a:fillRect/>
+                </a:stretch>
+              </a:blipFill>
+            </p:spPr>
+            <p:txBody>
+              <a:bodyPr/>
+              <a:lstStyle/>
+              <a:p>
+                <a:r>
+                  <a:rPr lang="ja-JP" altLang="en-US">
+                    <a:noFill/>
+                  </a:rPr>
+                  <a:t> </a:t>
+                </a:r>
+              </a:p>
+            </p:txBody>
+          </p:sp>
+        </mc:Fallback>
+      </mc:AlternateContent>
+      <mc:AlternateContent xmlns:mc="http://schemas.openxmlformats.org/markup-compatibility/2006">
+        <mc:Choice xmlns:a14="http://schemas.microsoft.com/office/drawing/2010/main" Requires="a14">
+          <p:sp>
+            <p:nvSpPr>
+              <p:cNvPr id="10" name="テキスト ボックス 9">
+                <a:extLst>
+                  <a:ext uri="{FF2B5EF4-FFF2-40B4-BE49-F238E27FC236}">
+                    <a16:creationId xmlns:a16="http://schemas.microsoft.com/office/drawing/2014/main" id="{BA5A3ECC-C9F0-473F-8BB3-BA0865CA0CD4}"/>
+                  </a:ext>
+                </a:extLst>
+              </p:cNvPr>
+              <p:cNvSpPr txBox="1"/>
+              <p:nvPr/>
+            </p:nvSpPr>
+            <p:spPr>
+              <a:xfrm>
+                <a:off x="7020467" y="4340980"/>
+                <a:ext cx="489236" cy="400110"/>
+              </a:xfrm>
+              <a:prstGeom prst="rect">
+                <a:avLst/>
+              </a:prstGeom>
+              <a:noFill/>
+            </p:spPr>
+            <p:txBody>
+              <a:bodyPr wrap="none" rtlCol="0">
+                <a:spAutoFit/>
+              </a:bodyPr>
+              <a:lstStyle/>
+              <a:p>
+                <a:pPr algn="ctr"/>
+                <a14:m>
+                  <m:oMathPara xmlns:m="http://schemas.openxmlformats.org/officeDocument/2006/math">
+                    <m:oMathParaPr>
+                      <m:jc m:val="centerGroup"/>
+                    </m:oMathParaPr>
+                    <m:oMath xmlns:m="http://schemas.openxmlformats.org/officeDocument/2006/math">
+                      <m:sSub>
+                        <m:sSubPr>
+                          <m:ctrlPr>
+                            <a:rPr kumimoji="1" lang="en-US" altLang="ja-JP" sz="2000" i="1" smtClean="0">
+                              <a:latin typeface="Cambria Math" panose="02040503050406030204" pitchFamily="18" charset="0"/>
+                            </a:rPr>
+                          </m:ctrlPr>
+                        </m:sSubPr>
+                        <m:e>
+                          <m:r>
+                            <a:rPr kumimoji="1" lang="en-US" altLang="ja-JP" sz="2000" b="0" i="1" smtClean="0">
+                              <a:latin typeface="Cambria Math" panose="02040503050406030204" pitchFamily="18" charset="0"/>
+                            </a:rPr>
+                            <m:t>𝑧</m:t>
+                          </m:r>
+                        </m:e>
+                        <m:sub>
+                          <m:r>
+                            <a:rPr kumimoji="1" lang="en-US" altLang="ja-JP" sz="2000" b="0" i="1" smtClean="0">
+                              <a:latin typeface="Cambria Math" panose="02040503050406030204" pitchFamily="18" charset="0"/>
+                            </a:rPr>
+                            <m:t>1</m:t>
+                          </m:r>
+                        </m:sub>
+                      </m:sSub>
+                    </m:oMath>
+                  </m:oMathPara>
+                </a14:m>
+                <a:endParaRPr kumimoji="1" lang="ja-JP" altLang="en-US" sz="2000" dirty="0"/>
+              </a:p>
+            </p:txBody>
+          </p:sp>
+        </mc:Choice>
+        <mc:Fallback>
+          <p:sp>
+            <p:nvSpPr>
+              <p:cNvPr id="10" name="テキスト ボックス 9">
+                <a:extLst>
+                  <a:ext uri="{FF2B5EF4-FFF2-40B4-BE49-F238E27FC236}">
+                    <a16:creationId xmlns:a16="http://schemas.microsoft.com/office/drawing/2014/main" id="{BA5A3ECC-C9F0-473F-8BB3-BA0865CA0CD4}"/>
+                  </a:ext>
+                </a:extLst>
+              </p:cNvPr>
+              <p:cNvSpPr txBox="1">
+                <a:spLocks noRot="1" noChangeAspect="1" noMove="1" noResize="1" noEditPoints="1" noAdjustHandles="1" noChangeArrowheads="1" noChangeShapeType="1" noTextEdit="1"/>
+              </p:cNvSpPr>
+              <p:nvPr/>
+            </p:nvSpPr>
+            <p:spPr>
+              <a:xfrm>
+                <a:off x="7020467" y="4340980"/>
+                <a:ext cx="489236" cy="400110"/>
+              </a:xfrm>
+              <a:prstGeom prst="rect">
+                <a:avLst/>
+              </a:prstGeom>
+              <a:blipFill>
+                <a:blip r:embed="rId3"/>
+                <a:stretch>
+                  <a:fillRect/>
+                </a:stretch>
+              </a:blipFill>
+            </p:spPr>
+            <p:txBody>
+              <a:bodyPr/>
+              <a:lstStyle/>
+              <a:p>
+                <a:r>
+                  <a:rPr lang="ja-JP" altLang="en-US">
+                    <a:noFill/>
+                  </a:rPr>
+                  <a:t> </a:t>
+                </a:r>
+              </a:p>
+            </p:txBody>
+          </p:sp>
+        </mc:Fallback>
+      </mc:AlternateContent>
+      <mc:AlternateContent xmlns:mc="http://schemas.openxmlformats.org/markup-compatibility/2006">
+        <mc:Choice xmlns:a14="http://schemas.microsoft.com/office/drawing/2010/main" Requires="a14">
+          <p:sp>
+            <p:nvSpPr>
+              <p:cNvPr id="11" name="テキスト ボックス 10">
+                <a:extLst>
+                  <a:ext uri="{FF2B5EF4-FFF2-40B4-BE49-F238E27FC236}">
+                    <a16:creationId xmlns:a16="http://schemas.microsoft.com/office/drawing/2014/main" id="{12684556-FED9-41EE-86F4-3E4FCCF760FC}"/>
+                  </a:ext>
+                </a:extLst>
+              </p:cNvPr>
+              <p:cNvSpPr txBox="1"/>
+              <p:nvPr/>
+            </p:nvSpPr>
+            <p:spPr>
+              <a:xfrm>
+                <a:off x="7885798" y="5152765"/>
+                <a:ext cx="504945" cy="400110"/>
+              </a:xfrm>
+              <a:prstGeom prst="rect">
+                <a:avLst/>
+              </a:prstGeom>
+              <a:noFill/>
+            </p:spPr>
+            <p:txBody>
+              <a:bodyPr wrap="none" rtlCol="0">
+                <a:spAutoFit/>
+              </a:bodyPr>
+              <a:lstStyle/>
+              <a:p>
+                <a:pPr algn="ctr"/>
+                <a14:m>
+                  <m:oMathPara xmlns:m="http://schemas.openxmlformats.org/officeDocument/2006/math">
+                    <m:oMathParaPr>
+                      <m:jc m:val="centerGroup"/>
+                    </m:oMathParaPr>
+                    <m:oMath xmlns:m="http://schemas.openxmlformats.org/officeDocument/2006/math">
+                      <m:sSub>
+                        <m:sSubPr>
+                          <m:ctrlPr>
+                            <a:rPr kumimoji="1" lang="en-US" altLang="ja-JP" sz="2000" i="1" smtClean="0">
+                              <a:latin typeface="Cambria Math" panose="02040503050406030204" pitchFamily="18" charset="0"/>
+                            </a:rPr>
+                          </m:ctrlPr>
+                        </m:sSubPr>
+                        <m:e>
+                          <m:r>
+                            <a:rPr kumimoji="1" lang="en-US" altLang="ja-JP" sz="2000" b="0" i="1" smtClean="0">
+                              <a:latin typeface="Cambria Math" panose="02040503050406030204" pitchFamily="18" charset="0"/>
+                            </a:rPr>
+                            <m:t>𝑞</m:t>
+                          </m:r>
+                        </m:e>
+                        <m:sub>
+                          <m:r>
+                            <a:rPr kumimoji="1" lang="en-US" altLang="ja-JP" sz="2000" b="0" i="1" smtClean="0">
+                              <a:latin typeface="Cambria Math" panose="02040503050406030204" pitchFamily="18" charset="0"/>
+                            </a:rPr>
+                            <m:t>1</m:t>
+                          </m:r>
+                        </m:sub>
+                      </m:sSub>
+                    </m:oMath>
+                  </m:oMathPara>
+                </a14:m>
+                <a:endParaRPr kumimoji="1" lang="ja-JP" altLang="en-US" sz="2000" dirty="0"/>
+              </a:p>
+            </p:txBody>
+          </p:sp>
+        </mc:Choice>
+        <mc:Fallback>
+          <p:sp>
+            <p:nvSpPr>
+              <p:cNvPr id="11" name="テキスト ボックス 10">
+                <a:extLst>
+                  <a:ext uri="{FF2B5EF4-FFF2-40B4-BE49-F238E27FC236}">
+                    <a16:creationId xmlns:a16="http://schemas.microsoft.com/office/drawing/2014/main" id="{12684556-FED9-41EE-86F4-3E4FCCF760FC}"/>
+                  </a:ext>
+                </a:extLst>
+              </p:cNvPr>
+              <p:cNvSpPr txBox="1">
+                <a:spLocks noRot="1" noChangeAspect="1" noMove="1" noResize="1" noEditPoints="1" noAdjustHandles="1" noChangeArrowheads="1" noChangeShapeType="1" noTextEdit="1"/>
+              </p:cNvSpPr>
+              <p:nvPr/>
+            </p:nvSpPr>
+            <p:spPr>
+              <a:xfrm>
+                <a:off x="7885798" y="5152765"/>
+                <a:ext cx="504945" cy="400110"/>
+              </a:xfrm>
+              <a:prstGeom prst="rect">
+                <a:avLst/>
+              </a:prstGeom>
+              <a:blipFill>
+                <a:blip r:embed="rId4"/>
+                <a:stretch>
+                  <a:fillRect b="-7576"/>
+                </a:stretch>
+              </a:blipFill>
+            </p:spPr>
+            <p:txBody>
+              <a:bodyPr/>
+              <a:lstStyle/>
+              <a:p>
+                <a:r>
+                  <a:rPr lang="ja-JP" altLang="en-US">
+                    <a:noFill/>
+                  </a:rPr>
+                  <a:t> </a:t>
+                </a:r>
+              </a:p>
+            </p:txBody>
+          </p:sp>
+        </mc:Fallback>
+      </mc:AlternateContent>
+      <mc:AlternateContent xmlns:mc="http://schemas.openxmlformats.org/markup-compatibility/2006">
+        <mc:Choice xmlns:a14="http://schemas.microsoft.com/office/drawing/2010/main" Requires="a14">
+          <p:sp>
+            <p:nvSpPr>
+              <p:cNvPr id="12" name="テキスト ボックス 11">
+                <a:extLst>
+                  <a:ext uri="{FF2B5EF4-FFF2-40B4-BE49-F238E27FC236}">
+                    <a16:creationId xmlns:a16="http://schemas.microsoft.com/office/drawing/2014/main" id="{452CC0E0-503F-472D-8DCC-10B0C47B0061}"/>
+                  </a:ext>
+                </a:extLst>
+              </p:cNvPr>
+              <p:cNvSpPr txBox="1"/>
+              <p:nvPr/>
+            </p:nvSpPr>
+            <p:spPr>
+              <a:xfrm>
+                <a:off x="7087111" y="2102743"/>
+                <a:ext cx="495199" cy="400110"/>
+              </a:xfrm>
+              <a:prstGeom prst="rect">
+                <a:avLst/>
+              </a:prstGeom>
+              <a:noFill/>
+            </p:spPr>
+            <p:txBody>
+              <a:bodyPr wrap="none" rtlCol="0">
+                <a:spAutoFit/>
+              </a:bodyPr>
+              <a:lstStyle/>
+              <a:p>
+                <a:pPr algn="ctr"/>
+                <a14:m>
+                  <m:oMathPara xmlns:m="http://schemas.openxmlformats.org/officeDocument/2006/math">
+                    <m:oMathParaPr>
+                      <m:jc m:val="centerGroup"/>
+                    </m:oMathParaPr>
+                    <m:oMath xmlns:m="http://schemas.openxmlformats.org/officeDocument/2006/math">
+                      <m:sSub>
+                        <m:sSubPr>
+                          <m:ctrlPr>
+                            <a:rPr kumimoji="1" lang="en-US" altLang="ja-JP" sz="2000" i="1" smtClean="0">
+                              <a:latin typeface="Cambria Math" panose="02040503050406030204" pitchFamily="18" charset="0"/>
+                            </a:rPr>
+                          </m:ctrlPr>
+                        </m:sSubPr>
+                        <m:e>
+                          <m:r>
+                            <a:rPr kumimoji="1" lang="en-US" altLang="ja-JP" sz="2000" b="0" i="1" smtClean="0">
+                              <a:latin typeface="Cambria Math" panose="02040503050406030204" pitchFamily="18" charset="0"/>
+                            </a:rPr>
+                            <m:t>𝑧</m:t>
+                          </m:r>
+                        </m:e>
+                        <m:sub>
+                          <m:r>
+                            <a:rPr kumimoji="1" lang="en-US" altLang="ja-JP" sz="2000" b="0" i="1" smtClean="0">
+                              <a:latin typeface="Cambria Math" panose="02040503050406030204" pitchFamily="18" charset="0"/>
+                            </a:rPr>
+                            <m:t>2</m:t>
+                          </m:r>
+                        </m:sub>
+                      </m:sSub>
+                    </m:oMath>
+                  </m:oMathPara>
+                </a14:m>
+                <a:endParaRPr kumimoji="1" lang="ja-JP" altLang="en-US" sz="2000" dirty="0"/>
+              </a:p>
+            </p:txBody>
+          </p:sp>
+        </mc:Choice>
+        <mc:Fallback>
+          <p:sp>
+            <p:nvSpPr>
+              <p:cNvPr id="12" name="テキスト ボックス 11">
+                <a:extLst>
+                  <a:ext uri="{FF2B5EF4-FFF2-40B4-BE49-F238E27FC236}">
+                    <a16:creationId xmlns:a16="http://schemas.microsoft.com/office/drawing/2014/main" id="{452CC0E0-503F-472D-8DCC-10B0C47B0061}"/>
+                  </a:ext>
+                </a:extLst>
+              </p:cNvPr>
+              <p:cNvSpPr txBox="1">
+                <a:spLocks noRot="1" noChangeAspect="1" noMove="1" noResize="1" noEditPoints="1" noAdjustHandles="1" noChangeArrowheads="1" noChangeShapeType="1" noTextEdit="1"/>
+              </p:cNvSpPr>
+              <p:nvPr/>
+            </p:nvSpPr>
+            <p:spPr>
+              <a:xfrm>
+                <a:off x="7087111" y="2102743"/>
+                <a:ext cx="495199" cy="400110"/>
+              </a:xfrm>
+              <a:prstGeom prst="rect">
+                <a:avLst/>
+              </a:prstGeom>
+              <a:blipFill>
+                <a:blip r:embed="rId5"/>
+                <a:stretch>
+                  <a:fillRect/>
+                </a:stretch>
+              </a:blipFill>
+            </p:spPr>
+            <p:txBody>
+              <a:bodyPr/>
+              <a:lstStyle/>
+              <a:p>
+                <a:r>
+                  <a:rPr lang="ja-JP" altLang="en-US">
+                    <a:noFill/>
+                  </a:rPr>
+                  <a:t> </a:t>
+                </a:r>
+              </a:p>
+            </p:txBody>
+          </p:sp>
+        </mc:Fallback>
+      </mc:AlternateContent>
+      <mc:AlternateContent xmlns:mc="http://schemas.openxmlformats.org/markup-compatibility/2006">
+        <mc:Choice xmlns:a14="http://schemas.microsoft.com/office/drawing/2010/main" Requires="a14">
+          <p:sp>
+            <p:nvSpPr>
+              <p:cNvPr id="13" name="テキスト ボックス 12">
+                <a:extLst>
+                  <a:ext uri="{FF2B5EF4-FFF2-40B4-BE49-F238E27FC236}">
+                    <a16:creationId xmlns:a16="http://schemas.microsoft.com/office/drawing/2014/main" id="{4704451E-B047-4F22-8235-7819B6E968CD}"/>
+                  </a:ext>
+                </a:extLst>
+              </p:cNvPr>
+              <p:cNvSpPr txBox="1"/>
+              <p:nvPr/>
+            </p:nvSpPr>
+            <p:spPr>
+              <a:xfrm>
+                <a:off x="8655576" y="595747"/>
+                <a:ext cx="510909" cy="400110"/>
+              </a:xfrm>
+              <a:prstGeom prst="rect">
+                <a:avLst/>
+              </a:prstGeom>
+              <a:noFill/>
+            </p:spPr>
+            <p:txBody>
+              <a:bodyPr wrap="none" rtlCol="0">
+                <a:spAutoFit/>
+              </a:bodyPr>
+              <a:lstStyle/>
+              <a:p>
+                <a:pPr algn="ctr"/>
+                <a14:m>
+                  <m:oMathPara xmlns:m="http://schemas.openxmlformats.org/officeDocument/2006/math">
+                    <m:oMathParaPr>
+                      <m:jc m:val="centerGroup"/>
+                    </m:oMathParaPr>
+                    <m:oMath xmlns:m="http://schemas.openxmlformats.org/officeDocument/2006/math">
+                      <m:sSub>
+                        <m:sSubPr>
+                          <m:ctrlPr>
+                            <a:rPr kumimoji="1" lang="en-US" altLang="ja-JP" sz="2000" i="1" smtClean="0">
+                              <a:latin typeface="Cambria Math" panose="02040503050406030204" pitchFamily="18" charset="0"/>
+                            </a:rPr>
+                          </m:ctrlPr>
+                        </m:sSubPr>
+                        <m:e>
+                          <m:r>
+                            <a:rPr kumimoji="1" lang="en-US" altLang="ja-JP" sz="2000" b="0" i="1" smtClean="0">
+                              <a:latin typeface="Cambria Math" panose="02040503050406030204" pitchFamily="18" charset="0"/>
+                            </a:rPr>
+                            <m:t>𝑞</m:t>
+                          </m:r>
+                        </m:e>
+                        <m:sub>
+                          <m:r>
+                            <a:rPr kumimoji="1" lang="en-US" altLang="ja-JP" sz="2000" b="0" i="1" smtClean="0">
+                              <a:latin typeface="Cambria Math" panose="02040503050406030204" pitchFamily="18" charset="0"/>
+                            </a:rPr>
+                            <m:t>2</m:t>
+                          </m:r>
+                        </m:sub>
+                      </m:sSub>
+                    </m:oMath>
+                  </m:oMathPara>
+                </a14:m>
+                <a:endParaRPr kumimoji="1" lang="ja-JP" altLang="en-US" sz="2000" dirty="0"/>
+              </a:p>
+            </p:txBody>
+          </p:sp>
+        </mc:Choice>
+        <mc:Fallback>
+          <p:sp>
+            <p:nvSpPr>
+              <p:cNvPr id="13" name="テキスト ボックス 12">
+                <a:extLst>
+                  <a:ext uri="{FF2B5EF4-FFF2-40B4-BE49-F238E27FC236}">
+                    <a16:creationId xmlns:a16="http://schemas.microsoft.com/office/drawing/2014/main" id="{4704451E-B047-4F22-8235-7819B6E968CD}"/>
+                  </a:ext>
+                </a:extLst>
+              </p:cNvPr>
+              <p:cNvSpPr txBox="1">
+                <a:spLocks noRot="1" noChangeAspect="1" noMove="1" noResize="1" noEditPoints="1" noAdjustHandles="1" noChangeArrowheads="1" noChangeShapeType="1" noTextEdit="1"/>
+              </p:cNvSpPr>
+              <p:nvPr/>
+            </p:nvSpPr>
+            <p:spPr>
+              <a:xfrm>
+                <a:off x="8655576" y="595747"/>
+                <a:ext cx="510909" cy="400110"/>
+              </a:xfrm>
+              <a:prstGeom prst="rect">
+                <a:avLst/>
+              </a:prstGeom>
+              <a:blipFill>
+                <a:blip r:embed="rId6"/>
+                <a:stretch>
+                  <a:fillRect b="-7692"/>
+                </a:stretch>
+              </a:blipFill>
+            </p:spPr>
+            <p:txBody>
+              <a:bodyPr/>
+              <a:lstStyle/>
+              <a:p>
+                <a:r>
+                  <a:rPr lang="ja-JP" altLang="en-US">
+                    <a:noFill/>
+                  </a:rPr>
+                  <a:t> </a:t>
+                </a:r>
+              </a:p>
+            </p:txBody>
+          </p:sp>
+        </mc:Fallback>
+      </mc:AlternateContent>
+      <mc:AlternateContent xmlns:mc="http://schemas.openxmlformats.org/markup-compatibility/2006">
+        <mc:Choice xmlns:a14="http://schemas.microsoft.com/office/drawing/2010/main" Requires="a14">
+          <p:sp>
+            <p:nvSpPr>
+              <p:cNvPr id="14" name="テキスト ボックス 13">
+                <a:extLst>
+                  <a:ext uri="{FF2B5EF4-FFF2-40B4-BE49-F238E27FC236}">
+                    <a16:creationId xmlns:a16="http://schemas.microsoft.com/office/drawing/2014/main" id="{443AC0A3-B78F-4040-AA4E-847B1B3B366F}"/>
+                  </a:ext>
+                </a:extLst>
+              </p:cNvPr>
+              <p:cNvSpPr txBox="1"/>
+              <p:nvPr/>
+            </p:nvSpPr>
+            <p:spPr>
+              <a:xfrm>
+                <a:off x="7511948" y="3235939"/>
+                <a:ext cx="514756" cy="400110"/>
+              </a:xfrm>
+              <a:prstGeom prst="rect">
+                <a:avLst/>
+              </a:prstGeom>
+              <a:noFill/>
+            </p:spPr>
+            <p:txBody>
+              <a:bodyPr wrap="none" rtlCol="0">
+                <a:spAutoFit/>
+              </a:bodyPr>
+              <a:lstStyle/>
+              <a:p>
+                <a:pPr algn="ctr"/>
+                <a14:m>
+                  <m:oMathPara xmlns:m="http://schemas.openxmlformats.org/officeDocument/2006/math">
+                    <m:oMathParaPr>
+                      <m:jc m:val="centerGroup"/>
+                    </m:oMathParaPr>
+                    <m:oMath xmlns:m="http://schemas.openxmlformats.org/officeDocument/2006/math">
+                      <m:sSub>
+                        <m:sSubPr>
+                          <m:ctrlPr>
+                            <a:rPr kumimoji="1" lang="en-US" altLang="ja-JP" sz="2000" i="1" smtClean="0">
+                              <a:latin typeface="Cambria Math" panose="02040503050406030204" pitchFamily="18" charset="0"/>
+                            </a:rPr>
+                          </m:ctrlPr>
+                        </m:sSubPr>
+                        <m:e>
+                          <m:r>
+                            <a:rPr kumimoji="1" lang="en-US" altLang="ja-JP" sz="2000" b="0" i="1" smtClean="0">
+                              <a:latin typeface="Cambria Math" panose="02040503050406030204" pitchFamily="18" charset="0"/>
+                            </a:rPr>
+                            <m:t>𝑎</m:t>
+                          </m:r>
+                        </m:e>
+                        <m:sub>
+                          <m:r>
+                            <a:rPr kumimoji="1" lang="en-US" altLang="ja-JP" sz="2000" b="0" i="1" smtClean="0">
+                              <a:latin typeface="Cambria Math" panose="02040503050406030204" pitchFamily="18" charset="0"/>
+                            </a:rPr>
+                            <m:t>1</m:t>
+                          </m:r>
+                        </m:sub>
+                      </m:sSub>
+                    </m:oMath>
+                  </m:oMathPara>
+                </a14:m>
+                <a:endParaRPr kumimoji="1" lang="ja-JP" altLang="en-US" sz="2000" dirty="0"/>
+              </a:p>
+            </p:txBody>
+          </p:sp>
+        </mc:Choice>
+        <mc:Fallback>
+          <p:sp>
+            <p:nvSpPr>
+              <p:cNvPr id="14" name="テキスト ボックス 13">
+                <a:extLst>
+                  <a:ext uri="{FF2B5EF4-FFF2-40B4-BE49-F238E27FC236}">
+                    <a16:creationId xmlns:a16="http://schemas.microsoft.com/office/drawing/2014/main" id="{443AC0A3-B78F-4040-AA4E-847B1B3B366F}"/>
+                  </a:ext>
+                </a:extLst>
+              </p:cNvPr>
+              <p:cNvSpPr txBox="1">
+                <a:spLocks noRot="1" noChangeAspect="1" noMove="1" noResize="1" noEditPoints="1" noAdjustHandles="1" noChangeArrowheads="1" noChangeShapeType="1" noTextEdit="1"/>
+              </p:cNvSpPr>
+              <p:nvPr/>
+            </p:nvSpPr>
+            <p:spPr>
+              <a:xfrm>
+                <a:off x="7511948" y="3235939"/>
+                <a:ext cx="514756" cy="400110"/>
+              </a:xfrm>
+              <a:prstGeom prst="rect">
+                <a:avLst/>
+              </a:prstGeom>
+              <a:blipFill>
+                <a:blip r:embed="rId7"/>
+                <a:stretch>
+                  <a:fillRect/>
+                </a:stretch>
+              </a:blipFill>
+            </p:spPr>
+            <p:txBody>
+              <a:bodyPr/>
+              <a:lstStyle/>
+              <a:p>
+                <a:r>
+                  <a:rPr lang="ja-JP" altLang="en-US">
+                    <a:noFill/>
+                  </a:rPr>
+                  <a:t> </a:t>
+                </a:r>
+              </a:p>
+            </p:txBody>
+          </p:sp>
+        </mc:Fallback>
+      </mc:AlternateContent>
+      <p:sp>
+        <p:nvSpPr>
+          <p:cNvPr id="15" name="矢印: 五方向 14">
+            <a:extLst>
+              <a:ext uri="{FF2B5EF4-FFF2-40B4-BE49-F238E27FC236}">
+                <a16:creationId xmlns:a16="http://schemas.microsoft.com/office/drawing/2014/main" id="{125A40A2-4FA4-4193-8FFF-ACBF338AB93F}"/>
+              </a:ext>
+            </a:extLst>
+          </p:cNvPr>
+          <p:cNvSpPr/>
+          <p:nvPr/>
+        </p:nvSpPr>
+        <p:spPr>
+          <a:xfrm rot="1038264">
+            <a:off x="5493866" y="2976791"/>
+            <a:ext cx="738711" cy="484632"/>
+          </a:xfrm>
+          <a:prstGeom prst="homePlate">
+            <a:avLst/>
+          </a:prstGeom>
+        </p:spPr>
+        <p:style>
+          <a:lnRef idx="2">
+            <a:schemeClr val="accent1">
+              <a:shade val="50000"/>
+            </a:schemeClr>
+          </a:lnRef>
+          <a:fillRef idx="1">
+            <a:schemeClr val="accent1"/>
+          </a:fillRef>
+          <a:effectRef idx="0">
+            <a:schemeClr val="accent1"/>
+          </a:effectRef>
+          <a:fontRef idx="minor">
+            <a:schemeClr val="lt1"/>
+          </a:fontRef>
+        </p:style>
+        <p:txBody>
+          <a:bodyPr rtlCol="0" anchor="ctr"/>
+          <a:lstStyle/>
+          <a:p>
+            <a:pPr algn="ctr"/>
+            <a:endParaRPr kumimoji="1" lang="ja-JP" altLang="en-US"/>
+          </a:p>
+        </p:txBody>
+      </p:sp>
+      <p:cxnSp>
+        <p:nvCxnSpPr>
+          <p:cNvPr id="19" name="直線矢印コネクタ 18">
+            <a:extLst>
+              <a:ext uri="{FF2B5EF4-FFF2-40B4-BE49-F238E27FC236}">
+                <a16:creationId xmlns:a16="http://schemas.microsoft.com/office/drawing/2014/main" id="{F0AF50BE-4C1B-4593-A59F-AF8DA711021B}"/>
+              </a:ext>
+            </a:extLst>
+          </p:cNvPr>
+          <p:cNvCxnSpPr>
+            <a:cxnSpLocks/>
+            <a:endCxn id="5" idx="1"/>
+          </p:cNvCxnSpPr>
+          <p:nvPr/>
+        </p:nvCxnSpPr>
+        <p:spPr>
+          <a:xfrm>
+            <a:off x="5881958" y="3187742"/>
+            <a:ext cx="1774073" cy="2165078"/>
+          </a:xfrm>
+          <a:prstGeom prst="straightConnector1">
+            <a:avLst/>
+          </a:prstGeom>
+          <a:ln w="19050">
+            <a:solidFill>
+              <a:schemeClr val="tx1"/>
+            </a:solidFill>
+            <a:prstDash val="dash"/>
+            <a:tailEnd type="triangle"/>
+          </a:ln>
+        </p:spPr>
+        <p:style>
+          <a:lnRef idx="1">
+            <a:schemeClr val="accent1"/>
+          </a:lnRef>
+          <a:fillRef idx="0">
+            <a:schemeClr val="accent1"/>
+          </a:fillRef>
+          <a:effectRef idx="0">
+            <a:schemeClr val="accent1"/>
+          </a:effectRef>
+          <a:fontRef idx="minor">
+            <a:schemeClr val="tx1"/>
+          </a:fontRef>
+        </p:style>
+      </p:cxnSp>
+      <p:cxnSp>
+        <p:nvCxnSpPr>
+          <p:cNvPr id="20" name="直線矢印コネクタ 19">
+            <a:extLst>
+              <a:ext uri="{FF2B5EF4-FFF2-40B4-BE49-F238E27FC236}">
+                <a16:creationId xmlns:a16="http://schemas.microsoft.com/office/drawing/2014/main" id="{6BA08854-37F1-4007-872E-A008E46E6951}"/>
+              </a:ext>
+            </a:extLst>
+          </p:cNvPr>
+          <p:cNvCxnSpPr>
+            <a:cxnSpLocks/>
+            <a:endCxn id="4" idx="3"/>
+          </p:cNvCxnSpPr>
+          <p:nvPr/>
+        </p:nvCxnSpPr>
+        <p:spPr>
+          <a:xfrm flipV="1">
+            <a:off x="5881958" y="1215935"/>
+            <a:ext cx="2779727" cy="1969248"/>
+          </a:xfrm>
+          <a:prstGeom prst="straightConnector1">
+            <a:avLst/>
+          </a:prstGeom>
+          <a:ln w="19050">
+            <a:solidFill>
+              <a:schemeClr val="tx1"/>
+            </a:solidFill>
+            <a:prstDash val="dash"/>
+            <a:tailEnd type="triangle"/>
+          </a:ln>
+        </p:spPr>
+        <p:style>
+          <a:lnRef idx="1">
+            <a:schemeClr val="accent1"/>
+          </a:lnRef>
+          <a:fillRef idx="0">
+            <a:schemeClr val="accent1"/>
+          </a:fillRef>
+          <a:effectRef idx="0">
+            <a:schemeClr val="accent1"/>
+          </a:effectRef>
+          <a:fontRef idx="minor">
+            <a:schemeClr val="tx1"/>
+          </a:fontRef>
+        </p:style>
+      </p:cxnSp>
+      <mc:AlternateContent xmlns:mc="http://schemas.openxmlformats.org/markup-compatibility/2006">
+        <mc:Choice xmlns:a14="http://schemas.microsoft.com/office/drawing/2010/main" Requires="a14">
+          <p:sp>
+            <p:nvSpPr>
+              <p:cNvPr id="21" name="テキスト ボックス 20">
+                <a:extLst>
+                  <a:ext uri="{FF2B5EF4-FFF2-40B4-BE49-F238E27FC236}">
+                    <a16:creationId xmlns:a16="http://schemas.microsoft.com/office/drawing/2014/main" id="{1239C06C-EFA9-497F-84C8-90B42DAAD3B2}"/>
+                  </a:ext>
+                </a:extLst>
+              </p:cNvPr>
+              <p:cNvSpPr txBox="1"/>
+              <p:nvPr/>
+            </p:nvSpPr>
+            <p:spPr>
+              <a:xfrm rot="317610">
+                <a:off x="5372961" y="2526086"/>
+                <a:ext cx="522131" cy="400110"/>
+              </a:xfrm>
+              <a:prstGeom prst="rect">
+                <a:avLst/>
+              </a:prstGeom>
+              <a:noFill/>
+            </p:spPr>
+            <p:txBody>
+              <a:bodyPr wrap="none" rtlCol="0">
+                <a:spAutoFit/>
+              </a:bodyPr>
+              <a:lstStyle/>
+              <a:p>
+                <a:pPr algn="ctr"/>
+                <a14:m>
+                  <m:oMathPara xmlns:m="http://schemas.openxmlformats.org/officeDocument/2006/math">
+                    <m:oMathParaPr>
+                      <m:jc m:val="centerGroup"/>
+                    </m:oMathParaPr>
+                    <m:oMath xmlns:m="http://schemas.openxmlformats.org/officeDocument/2006/math">
+                      <m:sSub>
+                        <m:sSubPr>
+                          <m:ctrlPr>
+                            <a:rPr kumimoji="1" lang="en-US" altLang="ja-JP" sz="2000" i="1" smtClean="0">
+                              <a:latin typeface="Cambria Math" panose="02040503050406030204" pitchFamily="18" charset="0"/>
+                            </a:rPr>
+                          </m:ctrlPr>
+                        </m:sSubPr>
+                        <m:e>
+                          <m:r>
+                            <a:rPr kumimoji="1" lang="en-US" altLang="ja-JP" sz="2000" b="0" i="1" smtClean="0">
+                              <a:latin typeface="Cambria Math" panose="02040503050406030204" pitchFamily="18" charset="0"/>
+                            </a:rPr>
+                            <m:t>𝑥</m:t>
+                          </m:r>
+                        </m:e>
+                        <m:sub>
+                          <m:r>
+                            <a:rPr kumimoji="1" lang="en-US" altLang="ja-JP" sz="2000" b="0" i="1" smtClean="0">
+                              <a:latin typeface="Cambria Math" panose="02040503050406030204" pitchFamily="18" charset="0"/>
+                            </a:rPr>
+                            <m:t>𝑘</m:t>
+                          </m:r>
+                        </m:sub>
+                      </m:sSub>
+                    </m:oMath>
+                  </m:oMathPara>
+                </a14:m>
+                <a:endParaRPr kumimoji="1" lang="ja-JP" altLang="en-US" sz="2000" dirty="0"/>
+              </a:p>
+            </p:txBody>
+          </p:sp>
+        </mc:Choice>
+        <mc:Fallback>
+          <p:sp>
+            <p:nvSpPr>
+              <p:cNvPr id="21" name="テキスト ボックス 20">
+                <a:extLst>
+                  <a:ext uri="{FF2B5EF4-FFF2-40B4-BE49-F238E27FC236}">
+                    <a16:creationId xmlns:a16="http://schemas.microsoft.com/office/drawing/2014/main" id="{1239C06C-EFA9-497F-84C8-90B42DAAD3B2}"/>
+                  </a:ext>
+                </a:extLst>
+              </p:cNvPr>
+              <p:cNvSpPr txBox="1">
+                <a:spLocks noRot="1" noChangeAspect="1" noMove="1" noResize="1" noEditPoints="1" noAdjustHandles="1" noChangeArrowheads="1" noChangeShapeType="1" noTextEdit="1"/>
+              </p:cNvSpPr>
+              <p:nvPr/>
+            </p:nvSpPr>
+            <p:spPr>
+              <a:xfrm rot="317610">
+                <a:off x="5372961" y="2526086"/>
+                <a:ext cx="522131" cy="400110"/>
+              </a:xfrm>
+              <a:prstGeom prst="rect">
+                <a:avLst/>
+              </a:prstGeom>
+              <a:blipFill>
+                <a:blip r:embed="rId8"/>
+                <a:stretch>
+                  <a:fillRect/>
+                </a:stretch>
+              </a:blipFill>
+            </p:spPr>
+            <p:txBody>
+              <a:bodyPr/>
+              <a:lstStyle/>
+              <a:p>
+                <a:r>
+                  <a:rPr lang="ja-JP" altLang="en-US">
+                    <a:noFill/>
+                  </a:rPr>
+                  <a:t> </a:t>
+                </a:r>
+              </a:p>
+            </p:txBody>
+          </p:sp>
+        </mc:Fallback>
+      </mc:AlternateContent>
+      <mc:AlternateContent xmlns:mc="http://schemas.openxmlformats.org/markup-compatibility/2006">
+        <mc:Choice xmlns:a14="http://schemas.microsoft.com/office/drawing/2010/main" Requires="a14">
+          <p:sp>
+            <p:nvSpPr>
+              <p:cNvPr id="22" name="テキスト ボックス 21">
+                <a:extLst>
+                  <a:ext uri="{FF2B5EF4-FFF2-40B4-BE49-F238E27FC236}">
+                    <a16:creationId xmlns:a16="http://schemas.microsoft.com/office/drawing/2014/main" id="{B58EFF20-4A22-4EA8-A95A-F1377DDF7A35}"/>
+                  </a:ext>
+                </a:extLst>
+              </p:cNvPr>
+              <p:cNvSpPr txBox="1"/>
+              <p:nvPr/>
+            </p:nvSpPr>
+            <p:spPr>
+              <a:xfrm rot="317610">
+                <a:off x="6581087" y="3777054"/>
+                <a:ext cx="609013" cy="400110"/>
+              </a:xfrm>
+              <a:prstGeom prst="rect">
+                <a:avLst/>
+              </a:prstGeom>
+              <a:noFill/>
+            </p:spPr>
+            <p:txBody>
+              <a:bodyPr wrap="none" rtlCol="0">
+                <a:spAutoFit/>
+              </a:bodyPr>
+              <a:lstStyle/>
+              <a:p>
+                <a:pPr algn="ctr"/>
+                <a14:m>
+                  <m:oMathPara xmlns:m="http://schemas.openxmlformats.org/officeDocument/2006/math">
+                    <m:oMathParaPr>
+                      <m:jc m:val="centerGroup"/>
+                    </m:oMathParaPr>
+                    <m:oMath xmlns:m="http://schemas.openxmlformats.org/officeDocument/2006/math">
+                      <m:sSub>
+                        <m:sSubPr>
+                          <m:ctrlPr>
+                            <a:rPr kumimoji="1" lang="en-US" altLang="ja-JP" sz="2000" i="1" smtClean="0">
+                              <a:latin typeface="Cambria Math" panose="02040503050406030204" pitchFamily="18" charset="0"/>
+                            </a:rPr>
+                          </m:ctrlPr>
+                        </m:sSubPr>
+                        <m:e>
+                          <m:r>
+                            <a:rPr kumimoji="1" lang="en-US" altLang="ja-JP" sz="2000" b="0" i="1" smtClean="0">
+                              <a:latin typeface="Cambria Math" panose="02040503050406030204" pitchFamily="18" charset="0"/>
+                            </a:rPr>
+                            <m:t>𝑧</m:t>
+                          </m:r>
+                        </m:e>
+                        <m:sub>
+                          <m:r>
+                            <a:rPr kumimoji="1" lang="en-US" altLang="ja-JP" sz="2000" b="0" i="1" smtClean="0">
+                              <a:latin typeface="Cambria Math" panose="02040503050406030204" pitchFamily="18" charset="0"/>
+                            </a:rPr>
+                            <m:t>𝑘</m:t>
+                          </m:r>
+                          <m:r>
+                            <a:rPr kumimoji="1" lang="en-US" altLang="ja-JP" sz="2000" b="0" i="1" smtClean="0">
+                              <a:latin typeface="Cambria Math" panose="02040503050406030204" pitchFamily="18" charset="0"/>
+                            </a:rPr>
+                            <m:t>1</m:t>
+                          </m:r>
+                        </m:sub>
+                      </m:sSub>
+                    </m:oMath>
+                  </m:oMathPara>
+                </a14:m>
+                <a:endParaRPr kumimoji="1" lang="ja-JP" altLang="en-US" sz="2000" dirty="0"/>
+              </a:p>
+            </p:txBody>
+          </p:sp>
+        </mc:Choice>
+        <mc:Fallback>
+          <p:sp>
+            <p:nvSpPr>
+              <p:cNvPr id="22" name="テキスト ボックス 21">
+                <a:extLst>
+                  <a:ext uri="{FF2B5EF4-FFF2-40B4-BE49-F238E27FC236}">
+                    <a16:creationId xmlns:a16="http://schemas.microsoft.com/office/drawing/2014/main" id="{B58EFF20-4A22-4EA8-A95A-F1377DDF7A35}"/>
+                  </a:ext>
+                </a:extLst>
+              </p:cNvPr>
+              <p:cNvSpPr txBox="1">
+                <a:spLocks noRot="1" noChangeAspect="1" noMove="1" noResize="1" noEditPoints="1" noAdjustHandles="1" noChangeArrowheads="1" noChangeShapeType="1" noTextEdit="1"/>
+              </p:cNvSpPr>
+              <p:nvPr/>
+            </p:nvSpPr>
+            <p:spPr>
+              <a:xfrm rot="317610">
+                <a:off x="6581087" y="3777054"/>
+                <a:ext cx="609013" cy="400110"/>
+              </a:xfrm>
+              <a:prstGeom prst="rect">
+                <a:avLst/>
+              </a:prstGeom>
+              <a:blipFill>
+                <a:blip r:embed="rId9"/>
+                <a:stretch>
+                  <a:fillRect/>
+                </a:stretch>
+              </a:blipFill>
+            </p:spPr>
+            <p:txBody>
+              <a:bodyPr/>
+              <a:lstStyle/>
+              <a:p>
+                <a:r>
+                  <a:rPr lang="ja-JP" altLang="en-US">
+                    <a:noFill/>
+                  </a:rPr>
+                  <a:t> </a:t>
+                </a:r>
+              </a:p>
+            </p:txBody>
+          </p:sp>
+        </mc:Fallback>
+      </mc:AlternateContent>
+      <mc:AlternateContent xmlns:mc="http://schemas.openxmlformats.org/markup-compatibility/2006">
+        <mc:Choice xmlns:a14="http://schemas.microsoft.com/office/drawing/2010/main" Requires="a14">
+          <p:sp>
+            <p:nvSpPr>
+              <p:cNvPr id="24" name="テキスト ボックス 23">
+                <a:extLst>
+                  <a:ext uri="{FF2B5EF4-FFF2-40B4-BE49-F238E27FC236}">
+                    <a16:creationId xmlns:a16="http://schemas.microsoft.com/office/drawing/2014/main" id="{DCC1E4DA-EDE8-4631-8325-0320284BC554}"/>
+                  </a:ext>
+                </a:extLst>
+              </p:cNvPr>
+              <p:cNvSpPr txBox="1"/>
+              <p:nvPr/>
+            </p:nvSpPr>
+            <p:spPr>
+              <a:xfrm rot="317610">
+                <a:off x="6032412" y="2376484"/>
+                <a:ext cx="609013" cy="400110"/>
+              </a:xfrm>
+              <a:prstGeom prst="rect">
+                <a:avLst/>
+              </a:prstGeom>
+              <a:noFill/>
+            </p:spPr>
+            <p:txBody>
+              <a:bodyPr wrap="none" rtlCol="0">
+                <a:spAutoFit/>
+              </a:bodyPr>
+              <a:lstStyle/>
+              <a:p>
+                <a:pPr algn="ctr"/>
+                <a14:m>
+                  <m:oMathPara xmlns:m="http://schemas.openxmlformats.org/officeDocument/2006/math">
+                    <m:oMathParaPr>
+                      <m:jc m:val="centerGroup"/>
+                    </m:oMathParaPr>
+                    <m:oMath xmlns:m="http://schemas.openxmlformats.org/officeDocument/2006/math">
+                      <m:sSub>
+                        <m:sSubPr>
+                          <m:ctrlPr>
+                            <a:rPr kumimoji="1" lang="en-US" altLang="ja-JP" sz="2000" i="1" smtClean="0">
+                              <a:latin typeface="Cambria Math" panose="02040503050406030204" pitchFamily="18" charset="0"/>
+                            </a:rPr>
+                          </m:ctrlPr>
+                        </m:sSubPr>
+                        <m:e>
+                          <m:r>
+                            <a:rPr kumimoji="1" lang="en-US" altLang="ja-JP" sz="2000" b="0" i="1" smtClean="0">
+                              <a:latin typeface="Cambria Math" panose="02040503050406030204" pitchFamily="18" charset="0"/>
+                            </a:rPr>
+                            <m:t>𝑧</m:t>
+                          </m:r>
+                        </m:e>
+                        <m:sub>
+                          <m:r>
+                            <a:rPr kumimoji="1" lang="en-US" altLang="ja-JP" sz="2000" b="0" i="1" smtClean="0">
+                              <a:latin typeface="Cambria Math" panose="02040503050406030204" pitchFamily="18" charset="0"/>
+                            </a:rPr>
+                            <m:t>𝑘</m:t>
+                          </m:r>
+                          <m:r>
+                            <a:rPr kumimoji="1" lang="en-US" altLang="ja-JP" sz="2000" b="0" i="1" smtClean="0">
+                              <a:latin typeface="Cambria Math" panose="02040503050406030204" pitchFamily="18" charset="0"/>
+                            </a:rPr>
+                            <m:t>2</m:t>
+                          </m:r>
+                        </m:sub>
+                      </m:sSub>
+                    </m:oMath>
+                  </m:oMathPara>
+                </a14:m>
+                <a:endParaRPr kumimoji="1" lang="ja-JP" altLang="en-US" sz="2000" dirty="0"/>
+              </a:p>
+            </p:txBody>
+          </p:sp>
+        </mc:Choice>
+        <mc:Fallback>
+          <p:sp>
+            <p:nvSpPr>
+              <p:cNvPr id="24" name="テキスト ボックス 23">
+                <a:extLst>
+                  <a:ext uri="{FF2B5EF4-FFF2-40B4-BE49-F238E27FC236}">
+                    <a16:creationId xmlns:a16="http://schemas.microsoft.com/office/drawing/2014/main" id="{DCC1E4DA-EDE8-4631-8325-0320284BC554}"/>
+                  </a:ext>
+                </a:extLst>
+              </p:cNvPr>
+              <p:cNvSpPr txBox="1">
+                <a:spLocks noRot="1" noChangeAspect="1" noMove="1" noResize="1" noEditPoints="1" noAdjustHandles="1" noChangeArrowheads="1" noChangeShapeType="1" noTextEdit="1"/>
+              </p:cNvSpPr>
+              <p:nvPr/>
+            </p:nvSpPr>
+            <p:spPr>
+              <a:xfrm rot="317610">
+                <a:off x="6032412" y="2376484"/>
+                <a:ext cx="609013" cy="400110"/>
+              </a:xfrm>
+              <a:prstGeom prst="rect">
+                <a:avLst/>
+              </a:prstGeom>
+              <a:blipFill>
+                <a:blip r:embed="rId10"/>
+                <a:stretch>
+                  <a:fillRect/>
+                </a:stretch>
+              </a:blipFill>
+            </p:spPr>
+            <p:txBody>
+              <a:bodyPr/>
+              <a:lstStyle/>
+              <a:p>
+                <a:r>
+                  <a:rPr lang="ja-JP" altLang="en-US">
+                    <a:noFill/>
+                  </a:rPr>
+                  <a:t> </a:t>
+                </a:r>
+              </a:p>
+            </p:txBody>
+          </p:sp>
+        </mc:Fallback>
+      </mc:AlternateContent>
+      <p:sp>
+        <p:nvSpPr>
+          <p:cNvPr id="28" name="矢印: 五方向 27">
+            <a:extLst>
+              <a:ext uri="{FF2B5EF4-FFF2-40B4-BE49-F238E27FC236}">
+                <a16:creationId xmlns:a16="http://schemas.microsoft.com/office/drawing/2014/main" id="{0C406453-8582-4157-8968-0009F9C84730}"/>
+              </a:ext>
+            </a:extLst>
+          </p:cNvPr>
+          <p:cNvSpPr/>
+          <p:nvPr/>
+        </p:nvSpPr>
+        <p:spPr>
+          <a:xfrm rot="1552166">
+            <a:off x="4087488" y="2299393"/>
+            <a:ext cx="738711" cy="484632"/>
+          </a:xfrm>
+          <a:prstGeom prst="homePlate">
+            <a:avLst/>
+          </a:prstGeom>
+        </p:spPr>
+        <p:style>
+          <a:lnRef idx="2">
+            <a:schemeClr val="accent1">
+              <a:shade val="50000"/>
+            </a:schemeClr>
+          </a:lnRef>
+          <a:fillRef idx="1">
+            <a:schemeClr val="accent1"/>
+          </a:fillRef>
+          <a:effectRef idx="0">
+            <a:schemeClr val="accent1"/>
+          </a:effectRef>
+          <a:fontRef idx="minor">
+            <a:schemeClr val="lt1"/>
+          </a:fontRef>
+        </p:style>
+        <p:txBody>
+          <a:bodyPr rtlCol="0" anchor="ctr"/>
+          <a:lstStyle/>
+          <a:p>
+            <a:pPr algn="ctr"/>
+            <a:endParaRPr kumimoji="1" lang="ja-JP" altLang="en-US"/>
+          </a:p>
+        </p:txBody>
+      </p:sp>
+      <p:cxnSp>
+        <p:nvCxnSpPr>
+          <p:cNvPr id="29" name="直線矢印コネクタ 28">
+            <a:extLst>
+              <a:ext uri="{FF2B5EF4-FFF2-40B4-BE49-F238E27FC236}">
+                <a16:creationId xmlns:a16="http://schemas.microsoft.com/office/drawing/2014/main" id="{0C2465AF-1672-42FE-ACC0-E82ED3908D9C}"/>
+              </a:ext>
+            </a:extLst>
+          </p:cNvPr>
+          <p:cNvCxnSpPr>
+            <a:cxnSpLocks/>
+          </p:cNvCxnSpPr>
+          <p:nvPr/>
+        </p:nvCxnSpPr>
+        <p:spPr>
+          <a:xfrm>
+            <a:off x="4443606" y="2541709"/>
+            <a:ext cx="1444179" cy="662276"/>
+          </a:xfrm>
+          <a:prstGeom prst="straightConnector1">
+            <a:avLst/>
+          </a:prstGeom>
+          <a:ln w="19050">
+            <a:solidFill>
+              <a:schemeClr val="tx1"/>
+            </a:solidFill>
+            <a:tailEnd type="triangle"/>
+          </a:ln>
+        </p:spPr>
+        <p:style>
+          <a:lnRef idx="1">
+            <a:schemeClr val="accent1"/>
+          </a:lnRef>
+          <a:fillRef idx="0">
+            <a:schemeClr val="accent1"/>
+          </a:fillRef>
+          <a:effectRef idx="0">
+            <a:schemeClr val="accent1"/>
+          </a:effectRef>
+          <a:fontRef idx="minor">
+            <a:schemeClr val="tx1"/>
+          </a:fontRef>
+        </p:style>
+      </p:cxnSp>
+      <p:sp>
+        <p:nvSpPr>
+          <p:cNvPr id="32" name="矢印: 五方向 31">
+            <a:extLst>
+              <a:ext uri="{FF2B5EF4-FFF2-40B4-BE49-F238E27FC236}">
+                <a16:creationId xmlns:a16="http://schemas.microsoft.com/office/drawing/2014/main" id="{E9077D4F-E921-40CB-BF4A-2228EE86FD1B}"/>
+              </a:ext>
+            </a:extLst>
+          </p:cNvPr>
+          <p:cNvSpPr/>
+          <p:nvPr/>
+        </p:nvSpPr>
+        <p:spPr>
+          <a:xfrm rot="21529034">
+            <a:off x="4610116" y="3571949"/>
+            <a:ext cx="738711" cy="484632"/>
+          </a:xfrm>
+          <a:prstGeom prst="homePlate">
+            <a:avLst/>
+          </a:prstGeom>
+          <a:solidFill>
+            <a:schemeClr val="accent1">
+              <a:lumMod val="60000"/>
+              <a:lumOff val="40000"/>
+            </a:schemeClr>
+          </a:solidFill>
+          <a:ln>
+            <a:solidFill>
+              <a:schemeClr val="accent1">
+                <a:lumMod val="40000"/>
+                <a:lumOff val="60000"/>
+              </a:schemeClr>
+            </a:solidFill>
+          </a:ln>
+        </p:spPr>
+        <p:style>
+          <a:lnRef idx="2">
+            <a:schemeClr val="accent1">
+              <a:shade val="50000"/>
+            </a:schemeClr>
+          </a:lnRef>
+          <a:fillRef idx="1">
+            <a:schemeClr val="accent1"/>
+          </a:fillRef>
+          <a:effectRef idx="0">
+            <a:schemeClr val="accent1"/>
+          </a:effectRef>
+          <a:fontRef idx="minor">
+            <a:schemeClr val="lt1"/>
+          </a:fontRef>
+        </p:style>
+        <p:txBody>
+          <a:bodyPr rtlCol="0" anchor="ctr"/>
+          <a:lstStyle/>
+          <a:p>
+            <a:pPr algn="ctr"/>
+            <a:endParaRPr kumimoji="1" lang="ja-JP" altLang="en-US"/>
+          </a:p>
+        </p:txBody>
+      </p:sp>
+      <p:cxnSp>
+        <p:nvCxnSpPr>
+          <p:cNvPr id="33" name="直線矢印コネクタ 32">
+            <a:extLst>
+              <a:ext uri="{FF2B5EF4-FFF2-40B4-BE49-F238E27FC236}">
+                <a16:creationId xmlns:a16="http://schemas.microsoft.com/office/drawing/2014/main" id="{62979FB5-757E-4429-8566-5D6B5D8B2C40}"/>
+              </a:ext>
+            </a:extLst>
+          </p:cNvPr>
+          <p:cNvCxnSpPr>
+            <a:cxnSpLocks/>
+          </p:cNvCxnSpPr>
+          <p:nvPr/>
+        </p:nvCxnSpPr>
+        <p:spPr>
+          <a:xfrm flipV="1">
+            <a:off x="4894914" y="3309820"/>
+            <a:ext cx="674167" cy="501101"/>
+          </a:xfrm>
+          <a:prstGeom prst="straightConnector1">
+            <a:avLst/>
+          </a:prstGeom>
+          <a:ln w="19050">
+            <a:solidFill>
+              <a:srgbClr val="FF0000"/>
+            </a:solidFill>
+            <a:tailEnd type="triangle"/>
+          </a:ln>
+        </p:spPr>
+        <p:style>
+          <a:lnRef idx="1">
+            <a:schemeClr val="accent1"/>
+          </a:lnRef>
+          <a:fillRef idx="0">
+            <a:schemeClr val="accent1"/>
+          </a:fillRef>
+          <a:effectRef idx="0">
+            <a:schemeClr val="accent1"/>
+          </a:effectRef>
+          <a:fontRef idx="minor">
+            <a:schemeClr val="tx1"/>
+          </a:fontRef>
+        </p:style>
+      </p:cxnSp>
+      <p:sp>
+        <p:nvSpPr>
+          <p:cNvPr id="36" name="テキスト ボックス 35">
+            <a:extLst>
+              <a:ext uri="{FF2B5EF4-FFF2-40B4-BE49-F238E27FC236}">
+                <a16:creationId xmlns:a16="http://schemas.microsoft.com/office/drawing/2014/main" id="{25A1C83C-9FB8-42F4-8DF2-81A8C77C48B9}"/>
+              </a:ext>
+            </a:extLst>
+          </p:cNvPr>
+          <p:cNvSpPr txBox="1"/>
+          <p:nvPr/>
+        </p:nvSpPr>
+        <p:spPr>
+          <a:xfrm>
+            <a:off x="4344313" y="3252543"/>
+            <a:ext cx="950901" cy="307777"/>
+          </a:xfrm>
+          <a:prstGeom prst="rect">
+            <a:avLst/>
+          </a:prstGeom>
+          <a:noFill/>
+        </p:spPr>
+        <p:txBody>
+          <a:bodyPr wrap="none" rtlCol="0">
+            <a:spAutoFit/>
+          </a:bodyPr>
+          <a:lstStyle/>
+          <a:p>
+            <a:pPr algn="ctr"/>
+            <a:r>
+              <a:rPr kumimoji="1" lang="en-US" altLang="ja-JP" sz="1400" b="1" dirty="0"/>
+              <a:t>modified</a:t>
+            </a:r>
+            <a:endParaRPr kumimoji="1" lang="ja-JP" altLang="en-US" sz="1400" b="1" dirty="0"/>
+          </a:p>
+        </p:txBody>
+      </p:sp>
+      <p:sp>
+        <p:nvSpPr>
+          <p:cNvPr id="37" name="矢印: 五方向 36">
+            <a:extLst>
+              <a:ext uri="{FF2B5EF4-FFF2-40B4-BE49-F238E27FC236}">
+                <a16:creationId xmlns:a16="http://schemas.microsoft.com/office/drawing/2014/main" id="{3AAF9E41-1F80-4F41-B6DB-4A15F6001D22}"/>
+              </a:ext>
+            </a:extLst>
+          </p:cNvPr>
+          <p:cNvSpPr/>
+          <p:nvPr/>
+        </p:nvSpPr>
+        <p:spPr>
+          <a:xfrm rot="1552166">
+            <a:off x="3168864" y="2942867"/>
+            <a:ext cx="738711" cy="484632"/>
+          </a:xfrm>
+          <a:prstGeom prst="homePlate">
+            <a:avLst/>
+          </a:prstGeom>
+          <a:solidFill>
+            <a:schemeClr val="accent1">
+              <a:lumMod val="60000"/>
+              <a:lumOff val="40000"/>
+            </a:schemeClr>
+          </a:solidFill>
+          <a:ln>
+            <a:solidFill>
+              <a:schemeClr val="accent1">
+                <a:lumMod val="60000"/>
+                <a:lumOff val="40000"/>
+              </a:schemeClr>
+            </a:solidFill>
+          </a:ln>
+        </p:spPr>
+        <p:style>
+          <a:lnRef idx="2">
+            <a:schemeClr val="accent1">
+              <a:shade val="50000"/>
+            </a:schemeClr>
+          </a:lnRef>
+          <a:fillRef idx="1">
+            <a:schemeClr val="accent1"/>
+          </a:fillRef>
+          <a:effectRef idx="0">
+            <a:schemeClr val="accent1"/>
+          </a:effectRef>
+          <a:fontRef idx="minor">
+            <a:schemeClr val="lt1"/>
+          </a:fontRef>
+        </p:style>
+        <p:txBody>
+          <a:bodyPr rtlCol="0" anchor="ctr"/>
+          <a:lstStyle/>
+          <a:p>
+            <a:pPr algn="ctr"/>
+            <a:endParaRPr kumimoji="1" lang="ja-JP" altLang="en-US"/>
+          </a:p>
+        </p:txBody>
+      </p:sp>
+      <mc:AlternateContent xmlns:mc="http://schemas.openxmlformats.org/markup-compatibility/2006">
+        <mc:Choice xmlns:a14="http://schemas.microsoft.com/office/drawing/2010/main" Requires="a14">
+          <p:sp>
+            <p:nvSpPr>
+              <p:cNvPr id="38" name="テキスト ボックス 37">
+                <a:extLst>
+                  <a:ext uri="{FF2B5EF4-FFF2-40B4-BE49-F238E27FC236}">
+                    <a16:creationId xmlns:a16="http://schemas.microsoft.com/office/drawing/2014/main" id="{AB7DC85E-7E24-487C-A944-614FAEB6AB07}"/>
+                  </a:ext>
+                </a:extLst>
+              </p:cNvPr>
+              <p:cNvSpPr txBox="1"/>
+              <p:nvPr/>
+            </p:nvSpPr>
+            <p:spPr>
+              <a:xfrm rot="317610">
+                <a:off x="3729382" y="1777217"/>
+                <a:ext cx="767390" cy="400110"/>
+              </a:xfrm>
+              <a:prstGeom prst="rect">
+                <a:avLst/>
+              </a:prstGeom>
+              <a:noFill/>
+            </p:spPr>
+            <p:txBody>
+              <a:bodyPr wrap="none" rtlCol="0">
+                <a:spAutoFit/>
+              </a:bodyPr>
+              <a:lstStyle/>
+              <a:p>
+                <a:pPr algn="ctr"/>
+                <a14:m>
+                  <m:oMathPara xmlns:m="http://schemas.openxmlformats.org/officeDocument/2006/math">
+                    <m:oMathParaPr>
+                      <m:jc m:val="centerGroup"/>
+                    </m:oMathParaPr>
+                    <m:oMath xmlns:m="http://schemas.openxmlformats.org/officeDocument/2006/math">
+                      <m:sSub>
+                        <m:sSubPr>
+                          <m:ctrlPr>
+                            <a:rPr kumimoji="1" lang="en-US" altLang="ja-JP" sz="2000" i="1" smtClean="0">
+                              <a:latin typeface="Cambria Math" panose="02040503050406030204" pitchFamily="18" charset="0"/>
+                            </a:rPr>
+                          </m:ctrlPr>
+                        </m:sSubPr>
+                        <m:e>
+                          <m:r>
+                            <a:rPr kumimoji="1" lang="en-US" altLang="ja-JP" sz="2000" b="0" i="1" smtClean="0">
+                              <a:latin typeface="Cambria Math" panose="02040503050406030204" pitchFamily="18" charset="0"/>
+                            </a:rPr>
+                            <m:t>𝑥</m:t>
+                          </m:r>
+                        </m:e>
+                        <m:sub>
+                          <m:r>
+                            <a:rPr kumimoji="1" lang="en-US" altLang="ja-JP" sz="2000" b="0" i="1" smtClean="0">
+                              <a:latin typeface="Cambria Math" panose="02040503050406030204" pitchFamily="18" charset="0"/>
+                            </a:rPr>
+                            <m:t>𝑘</m:t>
+                          </m:r>
+                          <m:r>
+                            <a:rPr kumimoji="1" lang="en-US" altLang="ja-JP" sz="2000" b="0" i="1" smtClean="0">
+                              <a:latin typeface="Cambria Math" panose="02040503050406030204" pitchFamily="18" charset="0"/>
+                            </a:rPr>
+                            <m:t>−1</m:t>
+                          </m:r>
+                        </m:sub>
+                      </m:sSub>
+                    </m:oMath>
+                  </m:oMathPara>
+                </a14:m>
+                <a:endParaRPr kumimoji="1" lang="ja-JP" altLang="en-US" sz="2000" dirty="0"/>
+              </a:p>
+            </p:txBody>
+          </p:sp>
+        </mc:Choice>
+        <mc:Fallback>
+          <p:sp>
+            <p:nvSpPr>
+              <p:cNvPr id="38" name="テキスト ボックス 37">
+                <a:extLst>
+                  <a:ext uri="{FF2B5EF4-FFF2-40B4-BE49-F238E27FC236}">
+                    <a16:creationId xmlns:a16="http://schemas.microsoft.com/office/drawing/2014/main" id="{AB7DC85E-7E24-487C-A944-614FAEB6AB07}"/>
+                  </a:ext>
+                </a:extLst>
+              </p:cNvPr>
+              <p:cNvSpPr txBox="1">
+                <a:spLocks noRot="1" noChangeAspect="1" noMove="1" noResize="1" noEditPoints="1" noAdjustHandles="1" noChangeArrowheads="1" noChangeShapeType="1" noTextEdit="1"/>
+              </p:cNvSpPr>
+              <p:nvPr/>
+            </p:nvSpPr>
+            <p:spPr>
+              <a:xfrm rot="317610">
+                <a:off x="3729382" y="1777217"/>
+                <a:ext cx="767390" cy="400110"/>
+              </a:xfrm>
+              <a:prstGeom prst="rect">
+                <a:avLst/>
+              </a:prstGeom>
+              <a:blipFill>
+                <a:blip r:embed="rId11"/>
+                <a:stretch>
+                  <a:fillRect/>
+                </a:stretch>
+              </a:blipFill>
+            </p:spPr>
+            <p:txBody>
+              <a:bodyPr/>
+              <a:lstStyle/>
+              <a:p>
+                <a:r>
+                  <a:rPr lang="ja-JP" altLang="en-US">
+                    <a:noFill/>
+                  </a:rPr>
+                  <a:t> </a:t>
+                </a:r>
+              </a:p>
+            </p:txBody>
+          </p:sp>
+        </mc:Fallback>
+      </mc:AlternateContent>
+      <p:cxnSp>
+        <p:nvCxnSpPr>
+          <p:cNvPr id="39" name="直線矢印コネクタ 38">
+            <a:extLst>
+              <a:ext uri="{FF2B5EF4-FFF2-40B4-BE49-F238E27FC236}">
+                <a16:creationId xmlns:a16="http://schemas.microsoft.com/office/drawing/2014/main" id="{3A3B479A-66B4-4BB2-B59E-1AA22D8CF32F}"/>
+              </a:ext>
+            </a:extLst>
+          </p:cNvPr>
+          <p:cNvCxnSpPr>
+            <a:cxnSpLocks/>
+          </p:cNvCxnSpPr>
+          <p:nvPr/>
+        </p:nvCxnSpPr>
+        <p:spPr>
+          <a:xfrm flipV="1">
+            <a:off x="3528584" y="2585621"/>
+            <a:ext cx="674167" cy="501101"/>
+          </a:xfrm>
+          <a:prstGeom prst="straightConnector1">
+            <a:avLst/>
+          </a:prstGeom>
+          <a:ln w="19050">
+            <a:solidFill>
+              <a:srgbClr val="FF0000"/>
+            </a:solidFill>
+            <a:tailEnd type="triangle"/>
+          </a:ln>
+        </p:spPr>
+        <p:style>
+          <a:lnRef idx="1">
+            <a:schemeClr val="accent1"/>
+          </a:lnRef>
+          <a:fillRef idx="0">
+            <a:schemeClr val="accent1"/>
+          </a:fillRef>
+          <a:effectRef idx="0">
+            <a:schemeClr val="accent1"/>
+          </a:effectRef>
+          <a:fontRef idx="minor">
+            <a:schemeClr val="tx1"/>
+          </a:fontRef>
+        </p:style>
+      </p:cxnSp>
+      <p:sp>
+        <p:nvSpPr>
+          <p:cNvPr id="40" name="テキスト ボックス 39">
+            <a:extLst>
+              <a:ext uri="{FF2B5EF4-FFF2-40B4-BE49-F238E27FC236}">
+                <a16:creationId xmlns:a16="http://schemas.microsoft.com/office/drawing/2014/main" id="{9916E37C-1B0A-4C62-AB41-09B56242E583}"/>
+              </a:ext>
+            </a:extLst>
+          </p:cNvPr>
+          <p:cNvSpPr txBox="1"/>
+          <p:nvPr/>
+        </p:nvSpPr>
+        <p:spPr>
+          <a:xfrm>
+            <a:off x="2965054" y="2558464"/>
+            <a:ext cx="950901" cy="307777"/>
+          </a:xfrm>
+          <a:prstGeom prst="rect">
+            <a:avLst/>
+          </a:prstGeom>
+          <a:noFill/>
+        </p:spPr>
+        <p:txBody>
+          <a:bodyPr wrap="none" rtlCol="0">
+            <a:spAutoFit/>
+          </a:bodyPr>
+          <a:lstStyle/>
+          <a:p>
+            <a:pPr algn="ctr"/>
+            <a:r>
+              <a:rPr kumimoji="1" lang="en-US" altLang="ja-JP" sz="1400" b="1" dirty="0"/>
+              <a:t>modified</a:t>
+            </a:r>
+            <a:endParaRPr kumimoji="1" lang="ja-JP" altLang="en-US" sz="1400" b="1" dirty="0"/>
+          </a:p>
+        </p:txBody>
+      </p:sp>
+      <p:cxnSp>
+        <p:nvCxnSpPr>
+          <p:cNvPr id="41" name="直線矢印コネクタ 40">
+            <a:extLst>
+              <a:ext uri="{FF2B5EF4-FFF2-40B4-BE49-F238E27FC236}">
+                <a16:creationId xmlns:a16="http://schemas.microsoft.com/office/drawing/2014/main" id="{8AD49B47-31C4-48B8-B388-5610186A3EF7}"/>
+              </a:ext>
+            </a:extLst>
+          </p:cNvPr>
+          <p:cNvCxnSpPr>
+            <a:cxnSpLocks/>
+          </p:cNvCxnSpPr>
+          <p:nvPr/>
+        </p:nvCxnSpPr>
+        <p:spPr>
+          <a:xfrm>
+            <a:off x="3443244" y="3145600"/>
+            <a:ext cx="1444179" cy="662276"/>
+          </a:xfrm>
+          <a:prstGeom prst="straightConnector1">
+            <a:avLst/>
+          </a:prstGeom>
+          <a:ln w="19050">
+            <a:solidFill>
+              <a:schemeClr val="tx1"/>
+            </a:solidFill>
+            <a:prstDash val="sysDash"/>
+            <a:tailEnd type="triangle"/>
+          </a:ln>
+        </p:spPr>
+        <p:style>
+          <a:lnRef idx="1">
+            <a:schemeClr val="accent1"/>
+          </a:lnRef>
+          <a:fillRef idx="0">
+            <a:schemeClr val="accent1"/>
+          </a:fillRef>
+          <a:effectRef idx="0">
+            <a:schemeClr val="accent1"/>
+          </a:effectRef>
+          <a:fontRef idx="minor">
+            <a:schemeClr val="tx1"/>
+          </a:fontRef>
+        </p:style>
+      </p:cxnSp>
+    </p:spTree>
+    <p:extLst>
+      <p:ext uri="{BB962C8B-B14F-4D97-AF65-F5344CB8AC3E}">
+        <p14:creationId xmlns:p14="http://schemas.microsoft.com/office/powerpoint/2010/main" val="3024845563"/>
       </p:ext>
     </p:extLst>
   </p:cSld>

</xml_diff>

<commit_message>
add robot definition diagram.
</commit_message>
<xml_diff>
--- a/Diagrams.pptx
+++ b/Diagrams.pptx
@@ -8,6 +8,8 @@
     <p:sldId id="256" r:id="rId2"/>
     <p:sldId id="257" r:id="rId3"/>
     <p:sldId id="258" r:id="rId4"/>
+    <p:sldId id="259" r:id="rId5"/>
+    <p:sldId id="260" r:id="rId6"/>
   </p:sldIdLst>
   <p:sldSz cx="12192000" cy="6858000"/>
   <p:notesSz cx="6858000" cy="9144000"/>
@@ -261,7 +263,7 @@
           <a:p>
             <a:fld id="{353E9D2D-3B11-4ED7-9E14-A57937F35400}" type="datetimeFigureOut">
               <a:rPr kumimoji="1" lang="ja-JP" altLang="en-US" smtClean="0"/>
-              <a:t>2019/8/4</a:t>
+              <a:t>2019/8/9</a:t>
             </a:fld>
             <a:endParaRPr kumimoji="1" lang="ja-JP" altLang="en-US"/>
           </a:p>
@@ -491,7 +493,7 @@
           <a:p>
             <a:fld id="{353E9D2D-3B11-4ED7-9E14-A57937F35400}" type="datetimeFigureOut">
               <a:rPr kumimoji="1" lang="ja-JP" altLang="en-US" smtClean="0"/>
-              <a:t>2019/8/4</a:t>
+              <a:t>2019/8/9</a:t>
             </a:fld>
             <a:endParaRPr kumimoji="1" lang="ja-JP" altLang="en-US"/>
           </a:p>
@@ -731,7 +733,7 @@
           <a:p>
             <a:fld id="{353E9D2D-3B11-4ED7-9E14-A57937F35400}" type="datetimeFigureOut">
               <a:rPr kumimoji="1" lang="ja-JP" altLang="en-US" smtClean="0"/>
-              <a:t>2019/8/4</a:t>
+              <a:t>2019/8/9</a:t>
             </a:fld>
             <a:endParaRPr kumimoji="1" lang="ja-JP" altLang="en-US"/>
           </a:p>
@@ -961,7 +963,7 @@
           <a:p>
             <a:fld id="{353E9D2D-3B11-4ED7-9E14-A57937F35400}" type="datetimeFigureOut">
               <a:rPr kumimoji="1" lang="ja-JP" altLang="en-US" smtClean="0"/>
-              <a:t>2019/8/4</a:t>
+              <a:t>2019/8/9</a:t>
             </a:fld>
             <a:endParaRPr kumimoji="1" lang="ja-JP" altLang="en-US"/>
           </a:p>
@@ -1236,7 +1238,7 @@
           <a:p>
             <a:fld id="{353E9D2D-3B11-4ED7-9E14-A57937F35400}" type="datetimeFigureOut">
               <a:rPr kumimoji="1" lang="ja-JP" altLang="en-US" smtClean="0"/>
-              <a:t>2019/8/4</a:t>
+              <a:t>2019/8/9</a:t>
             </a:fld>
             <a:endParaRPr kumimoji="1" lang="ja-JP" altLang="en-US"/>
           </a:p>
@@ -1565,7 +1567,7 @@
           <a:p>
             <a:fld id="{353E9D2D-3B11-4ED7-9E14-A57937F35400}" type="datetimeFigureOut">
               <a:rPr kumimoji="1" lang="ja-JP" altLang="en-US" smtClean="0"/>
-              <a:t>2019/8/4</a:t>
+              <a:t>2019/8/9</a:t>
             </a:fld>
             <a:endParaRPr kumimoji="1" lang="ja-JP" altLang="en-US"/>
           </a:p>
@@ -2041,7 +2043,7 @@
           <a:p>
             <a:fld id="{353E9D2D-3B11-4ED7-9E14-A57937F35400}" type="datetimeFigureOut">
               <a:rPr kumimoji="1" lang="ja-JP" altLang="en-US" smtClean="0"/>
-              <a:t>2019/8/4</a:t>
+              <a:t>2019/8/9</a:t>
             </a:fld>
             <a:endParaRPr kumimoji="1" lang="ja-JP" altLang="en-US"/>
           </a:p>
@@ -2182,7 +2184,7 @@
           <a:p>
             <a:fld id="{353E9D2D-3B11-4ED7-9E14-A57937F35400}" type="datetimeFigureOut">
               <a:rPr kumimoji="1" lang="ja-JP" altLang="en-US" smtClean="0"/>
-              <a:t>2019/8/4</a:t>
+              <a:t>2019/8/9</a:t>
             </a:fld>
             <a:endParaRPr kumimoji="1" lang="ja-JP" altLang="en-US"/>
           </a:p>
@@ -2295,7 +2297,7 @@
           <a:p>
             <a:fld id="{353E9D2D-3B11-4ED7-9E14-A57937F35400}" type="datetimeFigureOut">
               <a:rPr kumimoji="1" lang="ja-JP" altLang="en-US" smtClean="0"/>
-              <a:t>2019/8/4</a:t>
+              <a:t>2019/8/9</a:t>
             </a:fld>
             <a:endParaRPr kumimoji="1" lang="ja-JP" altLang="en-US"/>
           </a:p>
@@ -2638,7 +2640,7 @@
           <a:p>
             <a:fld id="{353E9D2D-3B11-4ED7-9E14-A57937F35400}" type="datetimeFigureOut">
               <a:rPr kumimoji="1" lang="ja-JP" altLang="en-US" smtClean="0"/>
-              <a:t>2019/8/4</a:t>
+              <a:t>2019/8/9</a:t>
             </a:fld>
             <a:endParaRPr kumimoji="1" lang="ja-JP" altLang="en-US"/>
           </a:p>
@@ -2926,7 +2928,7 @@
           <a:p>
             <a:fld id="{353E9D2D-3B11-4ED7-9E14-A57937F35400}" type="datetimeFigureOut">
               <a:rPr kumimoji="1" lang="ja-JP" altLang="en-US" smtClean="0"/>
-              <a:t>2019/8/4</a:t>
+              <a:t>2019/8/9</a:t>
             </a:fld>
             <a:endParaRPr kumimoji="1" lang="ja-JP" altLang="en-US"/>
           </a:p>
@@ -3199,7 +3201,7 @@
           <a:p>
             <a:fld id="{353E9D2D-3B11-4ED7-9E14-A57937F35400}" type="datetimeFigureOut">
               <a:rPr kumimoji="1" lang="ja-JP" altLang="en-US" smtClean="0"/>
-              <a:t>2019/8/4</a:t>
+              <a:t>2019/8/9</a:t>
             </a:fld>
             <a:endParaRPr kumimoji="1" lang="ja-JP" altLang="en-US"/>
           </a:p>
@@ -6349,8 +6351,8 @@
           </a:fontRef>
         </p:style>
       </p:cxnSp>
-      <mc:AlternateContent xmlns:mc="http://schemas.openxmlformats.org/markup-compatibility/2006">
-        <mc:Choice xmlns:a14="http://schemas.microsoft.com/office/drawing/2010/main" Requires="a14">
+      <mc:AlternateContent xmlns:mc="http://schemas.openxmlformats.org/markup-compatibility/2006" xmlns:a14="http://schemas.microsoft.com/office/drawing/2010/main">
+        <mc:Choice Requires="a14">
           <p:sp>
             <p:nvSpPr>
               <p:cNvPr id="9" name="テキスト ボックス 8">
@@ -6419,7 +6421,7 @@
             </p:txBody>
           </p:sp>
         </mc:Choice>
-        <mc:Fallback>
+        <mc:Fallback xmlns="">
           <p:sp>
             <p:nvSpPr>
               <p:cNvPr id="9" name="テキスト ボックス 8">
@@ -6464,8 +6466,8 @@
           </p:sp>
         </mc:Fallback>
       </mc:AlternateContent>
-      <mc:AlternateContent xmlns:mc="http://schemas.openxmlformats.org/markup-compatibility/2006">
-        <mc:Choice xmlns:a14="http://schemas.microsoft.com/office/drawing/2010/main" Requires="a14">
+      <mc:AlternateContent xmlns:mc="http://schemas.openxmlformats.org/markup-compatibility/2006" xmlns:a14="http://schemas.microsoft.com/office/drawing/2010/main">
+        <mc:Choice Requires="a14">
           <p:sp>
             <p:nvSpPr>
               <p:cNvPr id="10" name="テキスト ボックス 9">
@@ -6534,7 +6536,7 @@
             </p:txBody>
           </p:sp>
         </mc:Choice>
-        <mc:Fallback>
+        <mc:Fallback xmlns="">
           <p:sp>
             <p:nvSpPr>
               <p:cNvPr id="10" name="テキスト ボックス 9">
@@ -6579,8 +6581,8 @@
           </p:sp>
         </mc:Fallback>
       </mc:AlternateContent>
-      <mc:AlternateContent xmlns:mc="http://schemas.openxmlformats.org/markup-compatibility/2006">
-        <mc:Choice xmlns:a14="http://schemas.microsoft.com/office/drawing/2010/main" Requires="a14">
+      <mc:AlternateContent xmlns:mc="http://schemas.openxmlformats.org/markup-compatibility/2006" xmlns:a14="http://schemas.microsoft.com/office/drawing/2010/main">
+        <mc:Choice Requires="a14">
           <p:sp>
             <p:nvSpPr>
               <p:cNvPr id="11" name="テキスト ボックス 10">
@@ -6649,7 +6651,7 @@
             </p:txBody>
           </p:sp>
         </mc:Choice>
-        <mc:Fallback>
+        <mc:Fallback xmlns="">
           <p:sp>
             <p:nvSpPr>
               <p:cNvPr id="11" name="テキスト ボックス 10">
@@ -6694,8 +6696,8 @@
           </p:sp>
         </mc:Fallback>
       </mc:AlternateContent>
-      <mc:AlternateContent xmlns:mc="http://schemas.openxmlformats.org/markup-compatibility/2006">
-        <mc:Choice xmlns:a14="http://schemas.microsoft.com/office/drawing/2010/main" Requires="a14">
+      <mc:AlternateContent xmlns:mc="http://schemas.openxmlformats.org/markup-compatibility/2006" xmlns:a14="http://schemas.microsoft.com/office/drawing/2010/main">
+        <mc:Choice Requires="a14">
           <p:sp>
             <p:nvSpPr>
               <p:cNvPr id="12" name="テキスト ボックス 11">
@@ -6764,7 +6766,7 @@
             </p:txBody>
           </p:sp>
         </mc:Choice>
-        <mc:Fallback>
+        <mc:Fallback xmlns="">
           <p:sp>
             <p:nvSpPr>
               <p:cNvPr id="12" name="テキスト ボックス 11">
@@ -6809,8 +6811,8 @@
           </p:sp>
         </mc:Fallback>
       </mc:AlternateContent>
-      <mc:AlternateContent xmlns:mc="http://schemas.openxmlformats.org/markup-compatibility/2006">
-        <mc:Choice xmlns:a14="http://schemas.microsoft.com/office/drawing/2010/main" Requires="a14">
+      <mc:AlternateContent xmlns:mc="http://schemas.openxmlformats.org/markup-compatibility/2006" xmlns:a14="http://schemas.microsoft.com/office/drawing/2010/main">
+        <mc:Choice Requires="a14">
           <p:sp>
             <p:nvSpPr>
               <p:cNvPr id="13" name="テキスト ボックス 12">
@@ -6879,7 +6881,7 @@
             </p:txBody>
           </p:sp>
         </mc:Choice>
-        <mc:Fallback>
+        <mc:Fallback xmlns="">
           <p:sp>
             <p:nvSpPr>
               <p:cNvPr id="13" name="テキスト ボックス 12">
@@ -6924,8 +6926,8 @@
           </p:sp>
         </mc:Fallback>
       </mc:AlternateContent>
-      <mc:AlternateContent xmlns:mc="http://schemas.openxmlformats.org/markup-compatibility/2006">
-        <mc:Choice xmlns:a14="http://schemas.microsoft.com/office/drawing/2010/main" Requires="a14">
+      <mc:AlternateContent xmlns:mc="http://schemas.openxmlformats.org/markup-compatibility/2006" xmlns:a14="http://schemas.microsoft.com/office/drawing/2010/main">
+        <mc:Choice Requires="a14">
           <p:sp>
             <p:nvSpPr>
               <p:cNvPr id="14" name="テキスト ボックス 13">
@@ -6994,7 +6996,7 @@
             </p:txBody>
           </p:sp>
         </mc:Choice>
-        <mc:Fallback>
+        <mc:Fallback xmlns="">
           <p:sp>
             <p:nvSpPr>
               <p:cNvPr id="14" name="テキスト ボックス 13">
@@ -7295,8 +7297,8 @@
             </a:fontRef>
           </p:style>
         </p:cxnSp>
-        <mc:AlternateContent xmlns:mc="http://schemas.openxmlformats.org/markup-compatibility/2006">
-          <mc:Choice xmlns:a14="http://schemas.microsoft.com/office/drawing/2010/main" Requires="a14">
+        <mc:AlternateContent xmlns:mc="http://schemas.openxmlformats.org/markup-compatibility/2006" xmlns:a14="http://schemas.microsoft.com/office/drawing/2010/main">
+          <mc:Choice Requires="a14">
             <p:sp>
               <p:nvSpPr>
                 <p:cNvPr id="21" name="テキスト ボックス 20">
@@ -7365,7 +7367,7 @@
               </p:txBody>
             </p:sp>
           </mc:Choice>
-          <mc:Fallback>
+          <mc:Fallback xmlns="">
             <p:sp>
               <p:nvSpPr>
                 <p:cNvPr id="21" name="テキスト ボックス 20">
@@ -7410,8 +7412,8 @@
             </p:sp>
           </mc:Fallback>
         </mc:AlternateContent>
-        <mc:AlternateContent xmlns:mc="http://schemas.openxmlformats.org/markup-compatibility/2006">
-          <mc:Choice xmlns:a14="http://schemas.microsoft.com/office/drawing/2010/main" Requires="a14">
+        <mc:AlternateContent xmlns:mc="http://schemas.openxmlformats.org/markup-compatibility/2006" xmlns:a14="http://schemas.microsoft.com/office/drawing/2010/main">
+          <mc:Choice Requires="a14">
             <p:sp>
               <p:nvSpPr>
                 <p:cNvPr id="22" name="テキスト ボックス 21">
@@ -7486,7 +7488,7 @@
               </p:txBody>
             </p:sp>
           </mc:Choice>
-          <mc:Fallback>
+          <mc:Fallback xmlns="">
             <p:sp>
               <p:nvSpPr>
                 <p:cNvPr id="22" name="テキスト ボックス 21">
@@ -7531,8 +7533,8 @@
             </p:sp>
           </mc:Fallback>
         </mc:AlternateContent>
-        <mc:AlternateContent xmlns:mc="http://schemas.openxmlformats.org/markup-compatibility/2006">
-          <mc:Choice xmlns:a14="http://schemas.microsoft.com/office/drawing/2010/main" Requires="a14">
+        <mc:AlternateContent xmlns:mc="http://schemas.openxmlformats.org/markup-compatibility/2006" xmlns:a14="http://schemas.microsoft.com/office/drawing/2010/main">
+          <mc:Choice Requires="a14">
             <p:sp>
               <p:nvSpPr>
                 <p:cNvPr id="23" name="テキスト ボックス 22">
@@ -7607,7 +7609,7 @@
               </p:txBody>
             </p:sp>
           </mc:Choice>
-          <mc:Fallback>
+          <mc:Fallback xmlns="">
             <p:sp>
               <p:nvSpPr>
                 <p:cNvPr id="23" name="テキスト ボックス 22">
@@ -7652,8 +7654,8 @@
             </p:sp>
           </mc:Fallback>
         </mc:AlternateContent>
-        <mc:AlternateContent xmlns:mc="http://schemas.openxmlformats.org/markup-compatibility/2006">
-          <mc:Choice xmlns:a14="http://schemas.microsoft.com/office/drawing/2010/main" Requires="a14">
+        <mc:AlternateContent xmlns:mc="http://schemas.openxmlformats.org/markup-compatibility/2006" xmlns:a14="http://schemas.microsoft.com/office/drawing/2010/main">
+          <mc:Choice Requires="a14">
             <p:sp>
               <p:nvSpPr>
                 <p:cNvPr id="24" name="テキスト ボックス 23">
@@ -7728,7 +7730,7 @@
               </p:txBody>
             </p:sp>
           </mc:Choice>
-          <mc:Fallback>
+          <mc:Fallback xmlns="">
             <p:sp>
               <p:nvSpPr>
                 <p:cNvPr id="24" name="テキスト ボックス 23">
@@ -7773,8 +7775,8 @@
             </p:sp>
           </mc:Fallback>
         </mc:AlternateContent>
-        <mc:AlternateContent xmlns:mc="http://schemas.openxmlformats.org/markup-compatibility/2006">
-          <mc:Choice xmlns:a14="http://schemas.microsoft.com/office/drawing/2010/main" Requires="a14">
+        <mc:AlternateContent xmlns:mc="http://schemas.openxmlformats.org/markup-compatibility/2006" xmlns:a14="http://schemas.microsoft.com/office/drawing/2010/main">
+          <mc:Choice Requires="a14">
             <p:sp>
               <p:nvSpPr>
                 <p:cNvPr id="25" name="テキスト ボックス 24">
@@ -7849,7 +7851,7 @@
               </p:txBody>
             </p:sp>
           </mc:Choice>
-          <mc:Fallback>
+          <mc:Fallback xmlns="">
             <p:sp>
               <p:nvSpPr>
                 <p:cNvPr id="25" name="テキスト ボックス 24">
@@ -7985,8 +7987,8 @@
           </a:fontRef>
         </p:style>
       </p:cxnSp>
-      <mc:AlternateContent xmlns:mc="http://schemas.openxmlformats.org/markup-compatibility/2006">
-        <mc:Choice xmlns:a14="http://schemas.microsoft.com/office/drawing/2010/main" Requires="a14">
+      <mc:AlternateContent xmlns:mc="http://schemas.openxmlformats.org/markup-compatibility/2006" xmlns:a14="http://schemas.microsoft.com/office/drawing/2010/main">
+        <mc:Choice Requires="a14">
           <p:sp>
             <p:nvSpPr>
               <p:cNvPr id="31" name="テキスト ボックス 30">
@@ -8061,7 +8063,7 @@
             </p:txBody>
           </p:sp>
         </mc:Choice>
-        <mc:Fallback>
+        <mc:Fallback xmlns="">
           <p:sp>
             <p:nvSpPr>
               <p:cNvPr id="31" name="テキスト ボックス 30">
@@ -8416,8 +8418,8 @@
           </a:fontRef>
         </p:style>
       </p:cxnSp>
-      <mc:AlternateContent xmlns:mc="http://schemas.openxmlformats.org/markup-compatibility/2006">
-        <mc:Choice xmlns:a14="http://schemas.microsoft.com/office/drawing/2010/main" Requires="a14">
+      <mc:AlternateContent xmlns:mc="http://schemas.openxmlformats.org/markup-compatibility/2006" xmlns:a14="http://schemas.microsoft.com/office/drawing/2010/main">
+        <mc:Choice Requires="a14">
           <p:sp>
             <p:nvSpPr>
               <p:cNvPr id="9" name="テキスト ボックス 8">
@@ -8486,7 +8488,7 @@
             </p:txBody>
           </p:sp>
         </mc:Choice>
-        <mc:Fallback>
+        <mc:Fallback xmlns="">
           <p:sp>
             <p:nvSpPr>
               <p:cNvPr id="9" name="テキスト ボックス 8">
@@ -8531,8 +8533,8 @@
           </p:sp>
         </mc:Fallback>
       </mc:AlternateContent>
-      <mc:AlternateContent xmlns:mc="http://schemas.openxmlformats.org/markup-compatibility/2006">
-        <mc:Choice xmlns:a14="http://schemas.microsoft.com/office/drawing/2010/main" Requires="a14">
+      <mc:AlternateContent xmlns:mc="http://schemas.openxmlformats.org/markup-compatibility/2006" xmlns:a14="http://schemas.microsoft.com/office/drawing/2010/main">
+        <mc:Choice Requires="a14">
           <p:sp>
             <p:nvSpPr>
               <p:cNvPr id="10" name="テキスト ボックス 9">
@@ -8601,7 +8603,7 @@
             </p:txBody>
           </p:sp>
         </mc:Choice>
-        <mc:Fallback>
+        <mc:Fallback xmlns="">
           <p:sp>
             <p:nvSpPr>
               <p:cNvPr id="10" name="テキスト ボックス 9">
@@ -8646,8 +8648,8 @@
           </p:sp>
         </mc:Fallback>
       </mc:AlternateContent>
-      <mc:AlternateContent xmlns:mc="http://schemas.openxmlformats.org/markup-compatibility/2006">
-        <mc:Choice xmlns:a14="http://schemas.microsoft.com/office/drawing/2010/main" Requires="a14">
+      <mc:AlternateContent xmlns:mc="http://schemas.openxmlformats.org/markup-compatibility/2006" xmlns:a14="http://schemas.microsoft.com/office/drawing/2010/main">
+        <mc:Choice Requires="a14">
           <p:sp>
             <p:nvSpPr>
               <p:cNvPr id="11" name="テキスト ボックス 10">
@@ -8716,7 +8718,7 @@
             </p:txBody>
           </p:sp>
         </mc:Choice>
-        <mc:Fallback>
+        <mc:Fallback xmlns="">
           <p:sp>
             <p:nvSpPr>
               <p:cNvPr id="11" name="テキスト ボックス 10">
@@ -8761,8 +8763,8 @@
           </p:sp>
         </mc:Fallback>
       </mc:AlternateContent>
-      <mc:AlternateContent xmlns:mc="http://schemas.openxmlformats.org/markup-compatibility/2006">
-        <mc:Choice xmlns:a14="http://schemas.microsoft.com/office/drawing/2010/main" Requires="a14">
+      <mc:AlternateContent xmlns:mc="http://schemas.openxmlformats.org/markup-compatibility/2006" xmlns:a14="http://schemas.microsoft.com/office/drawing/2010/main">
+        <mc:Choice Requires="a14">
           <p:sp>
             <p:nvSpPr>
               <p:cNvPr id="12" name="テキスト ボックス 11">
@@ -8831,7 +8833,7 @@
             </p:txBody>
           </p:sp>
         </mc:Choice>
-        <mc:Fallback>
+        <mc:Fallback xmlns="">
           <p:sp>
             <p:nvSpPr>
               <p:cNvPr id="12" name="テキスト ボックス 11">
@@ -8876,8 +8878,8 @@
           </p:sp>
         </mc:Fallback>
       </mc:AlternateContent>
-      <mc:AlternateContent xmlns:mc="http://schemas.openxmlformats.org/markup-compatibility/2006">
-        <mc:Choice xmlns:a14="http://schemas.microsoft.com/office/drawing/2010/main" Requires="a14">
+      <mc:AlternateContent xmlns:mc="http://schemas.openxmlformats.org/markup-compatibility/2006" xmlns:a14="http://schemas.microsoft.com/office/drawing/2010/main">
+        <mc:Choice Requires="a14">
           <p:sp>
             <p:nvSpPr>
               <p:cNvPr id="13" name="テキスト ボックス 12">
@@ -8946,7 +8948,7 @@
             </p:txBody>
           </p:sp>
         </mc:Choice>
-        <mc:Fallback>
+        <mc:Fallback xmlns="">
           <p:sp>
             <p:nvSpPr>
               <p:cNvPr id="13" name="テキスト ボックス 12">
@@ -8991,8 +8993,8 @@
           </p:sp>
         </mc:Fallback>
       </mc:AlternateContent>
-      <mc:AlternateContent xmlns:mc="http://schemas.openxmlformats.org/markup-compatibility/2006">
-        <mc:Choice xmlns:a14="http://schemas.microsoft.com/office/drawing/2010/main" Requires="a14">
+      <mc:AlternateContent xmlns:mc="http://schemas.openxmlformats.org/markup-compatibility/2006" xmlns:a14="http://schemas.microsoft.com/office/drawing/2010/main">
+        <mc:Choice Requires="a14">
           <p:sp>
             <p:nvSpPr>
               <p:cNvPr id="14" name="テキスト ボックス 13">
@@ -9061,7 +9063,7 @@
             </p:txBody>
           </p:sp>
         </mc:Choice>
-        <mc:Fallback>
+        <mc:Fallback xmlns="">
           <p:sp>
             <p:nvSpPr>
               <p:cNvPr id="14" name="テキスト ボックス 13">
@@ -9244,8 +9246,8 @@
           </a:fontRef>
         </p:style>
       </p:cxnSp>
-      <mc:AlternateContent xmlns:mc="http://schemas.openxmlformats.org/markup-compatibility/2006">
-        <mc:Choice xmlns:a14="http://schemas.microsoft.com/office/drawing/2010/main" Requires="a14">
+      <mc:AlternateContent xmlns:mc="http://schemas.openxmlformats.org/markup-compatibility/2006" xmlns:a14="http://schemas.microsoft.com/office/drawing/2010/main">
+        <mc:Choice Requires="a14">
           <p:sp>
             <p:nvSpPr>
               <p:cNvPr id="21" name="テキスト ボックス 20">
@@ -9314,7 +9316,7 @@
             </p:txBody>
           </p:sp>
         </mc:Choice>
-        <mc:Fallback>
+        <mc:Fallback xmlns="">
           <p:sp>
             <p:nvSpPr>
               <p:cNvPr id="21" name="テキスト ボックス 20">
@@ -9359,8 +9361,8 @@
           </p:sp>
         </mc:Fallback>
       </mc:AlternateContent>
-      <mc:AlternateContent xmlns:mc="http://schemas.openxmlformats.org/markup-compatibility/2006">
-        <mc:Choice xmlns:a14="http://schemas.microsoft.com/office/drawing/2010/main" Requires="a14">
+      <mc:AlternateContent xmlns:mc="http://schemas.openxmlformats.org/markup-compatibility/2006" xmlns:a14="http://schemas.microsoft.com/office/drawing/2010/main">
+        <mc:Choice Requires="a14">
           <p:sp>
             <p:nvSpPr>
               <p:cNvPr id="22" name="テキスト ボックス 21">
@@ -9435,7 +9437,7 @@
             </p:txBody>
           </p:sp>
         </mc:Choice>
-        <mc:Fallback>
+        <mc:Fallback xmlns="">
           <p:sp>
             <p:nvSpPr>
               <p:cNvPr id="22" name="テキスト ボックス 21">
@@ -9480,8 +9482,8 @@
           </p:sp>
         </mc:Fallback>
       </mc:AlternateContent>
-      <mc:AlternateContent xmlns:mc="http://schemas.openxmlformats.org/markup-compatibility/2006">
-        <mc:Choice xmlns:a14="http://schemas.microsoft.com/office/drawing/2010/main" Requires="a14">
+      <mc:AlternateContent xmlns:mc="http://schemas.openxmlformats.org/markup-compatibility/2006" xmlns:a14="http://schemas.microsoft.com/office/drawing/2010/main">
+        <mc:Choice Requires="a14">
           <p:sp>
             <p:nvSpPr>
               <p:cNvPr id="24" name="テキスト ボックス 23">
@@ -9556,7 +9558,7 @@
             </p:txBody>
           </p:sp>
         </mc:Choice>
-        <mc:Fallback>
+        <mc:Fallback xmlns="">
           <p:sp>
             <p:nvSpPr>
               <p:cNvPr id="24" name="テキスト ボックス 23">
@@ -9892,8 +9894,8 @@
           </a:p>
         </p:txBody>
       </p:sp>
-      <mc:AlternateContent xmlns:mc="http://schemas.openxmlformats.org/markup-compatibility/2006">
-        <mc:Choice xmlns:a14="http://schemas.microsoft.com/office/drawing/2010/main" Requires="a14">
+      <mc:AlternateContent xmlns:mc="http://schemas.openxmlformats.org/markup-compatibility/2006" xmlns:a14="http://schemas.microsoft.com/office/drawing/2010/main">
+        <mc:Choice Requires="a14">
           <p:sp>
             <p:nvSpPr>
               <p:cNvPr id="38" name="テキスト ボックス 37">
@@ -9968,7 +9970,7 @@
             </p:txBody>
           </p:sp>
         </mc:Choice>
-        <mc:Fallback>
+        <mc:Fallback xmlns="">
           <p:sp>
             <p:nvSpPr>
               <p:cNvPr id="38" name="テキスト ボックス 37">
@@ -10143,6 +10145,2177 @@
     <p:extLst>
       <p:ext uri="{BB962C8B-B14F-4D97-AF65-F5344CB8AC3E}">
         <p14:creationId xmlns:p14="http://schemas.microsoft.com/office/powerpoint/2010/main" val="3024845563"/>
+      </p:ext>
+    </p:extLst>
+  </p:cSld>
+  <p:clrMapOvr>
+    <a:masterClrMapping/>
+  </p:clrMapOvr>
+</p:sld>
+</file>
+
+<file path=ppt/slides/slide4.xml><?xml version="1.0" encoding="utf-8"?>
+<p:sld xmlns:a="http://schemas.openxmlformats.org/drawingml/2006/main" xmlns:r="http://schemas.openxmlformats.org/officeDocument/2006/relationships" xmlns:p="http://schemas.openxmlformats.org/presentationml/2006/main">
+  <p:cSld>
+    <p:spTree>
+      <p:nvGrpSpPr>
+        <p:cNvPr id="1" name=""/>
+        <p:cNvGrpSpPr/>
+        <p:nvPr/>
+      </p:nvGrpSpPr>
+      <p:grpSpPr>
+        <a:xfrm>
+          <a:off x="0" y="0"/>
+          <a:ext cx="0" cy="0"/>
+          <a:chOff x="0" y="0"/>
+          <a:chExt cx="0" cy="0"/>
+        </a:xfrm>
+      </p:grpSpPr>
+      <p:sp>
+        <p:nvSpPr>
+          <p:cNvPr id="2" name="矢印: 五方向 1">
+            <a:extLst>
+              <a:ext uri="{FF2B5EF4-FFF2-40B4-BE49-F238E27FC236}">
+                <a16:creationId xmlns:a16="http://schemas.microsoft.com/office/drawing/2014/main" id="{CE06E1E0-8D12-4E04-8224-009ACB5A64DC}"/>
+              </a:ext>
+            </a:extLst>
+          </p:cNvPr>
+          <p:cNvSpPr/>
+          <p:nvPr/>
+        </p:nvSpPr>
+        <p:spPr>
+          <a:xfrm>
+            <a:off x="1464814" y="3186684"/>
+            <a:ext cx="738711" cy="484632"/>
+          </a:xfrm>
+          <a:prstGeom prst="homePlate">
+            <a:avLst/>
+          </a:prstGeom>
+        </p:spPr>
+        <p:style>
+          <a:lnRef idx="2">
+            <a:schemeClr val="accent1">
+              <a:shade val="50000"/>
+            </a:schemeClr>
+          </a:lnRef>
+          <a:fillRef idx="1">
+            <a:schemeClr val="accent1"/>
+          </a:fillRef>
+          <a:effectRef idx="0">
+            <a:schemeClr val="accent1"/>
+          </a:effectRef>
+          <a:fontRef idx="minor">
+            <a:schemeClr val="lt1"/>
+          </a:fontRef>
+        </p:style>
+        <p:txBody>
+          <a:bodyPr rtlCol="0" anchor="ctr"/>
+          <a:lstStyle/>
+          <a:p>
+            <a:pPr algn="ctr"/>
+            <a:endParaRPr kumimoji="1" lang="ja-JP" altLang="en-US"/>
+          </a:p>
+        </p:txBody>
+      </p:sp>
+      <p:cxnSp>
+        <p:nvCxnSpPr>
+          <p:cNvPr id="3" name="直線矢印コネクタ 2">
+            <a:extLst>
+              <a:ext uri="{FF2B5EF4-FFF2-40B4-BE49-F238E27FC236}">
+                <a16:creationId xmlns:a16="http://schemas.microsoft.com/office/drawing/2014/main" id="{0DA83974-F19F-4F03-B418-FD54361A8F3A}"/>
+              </a:ext>
+            </a:extLst>
+          </p:cNvPr>
+          <p:cNvCxnSpPr>
+            <a:cxnSpLocks/>
+          </p:cNvCxnSpPr>
+          <p:nvPr/>
+        </p:nvCxnSpPr>
+        <p:spPr>
+          <a:xfrm>
+            <a:off x="1736514" y="3435492"/>
+            <a:ext cx="2382725" cy="0"/>
+          </a:xfrm>
+          <a:prstGeom prst="straightConnector1">
+            <a:avLst/>
+          </a:prstGeom>
+          <a:ln w="19050">
+            <a:solidFill>
+              <a:schemeClr val="tx1"/>
+            </a:solidFill>
+            <a:tailEnd type="triangle"/>
+          </a:ln>
+        </p:spPr>
+        <p:style>
+          <a:lnRef idx="1">
+            <a:schemeClr val="accent1"/>
+          </a:lnRef>
+          <a:fillRef idx="0">
+            <a:schemeClr val="accent1"/>
+          </a:fillRef>
+          <a:effectRef idx="0">
+            <a:schemeClr val="accent1"/>
+          </a:effectRef>
+          <a:fontRef idx="minor">
+            <a:schemeClr val="tx1"/>
+          </a:fontRef>
+        </p:style>
+      </p:cxnSp>
+      <mc:AlternateContent xmlns:mc="http://schemas.openxmlformats.org/markup-compatibility/2006">
+        <mc:Choice xmlns:a14="http://schemas.microsoft.com/office/drawing/2010/main" Requires="a14">
+          <p:sp>
+            <p:nvSpPr>
+              <p:cNvPr id="4" name="テキスト ボックス 3">
+                <a:extLst>
+                  <a:ext uri="{FF2B5EF4-FFF2-40B4-BE49-F238E27FC236}">
+                    <a16:creationId xmlns:a16="http://schemas.microsoft.com/office/drawing/2014/main" id="{6475C2EC-DB38-4B70-B680-09A285046065}"/>
+                  </a:ext>
+                </a:extLst>
+              </p:cNvPr>
+              <p:cNvSpPr txBox="1"/>
+              <p:nvPr/>
+            </p:nvSpPr>
+            <p:spPr>
+              <a:xfrm>
+                <a:off x="3447818" y="3435492"/>
+                <a:ext cx="2623282" cy="400110"/>
+              </a:xfrm>
+              <a:prstGeom prst="rect">
+                <a:avLst/>
+              </a:prstGeom>
+              <a:noFill/>
+            </p:spPr>
+            <p:txBody>
+              <a:bodyPr wrap="none" rtlCol="0">
+                <a:spAutoFit/>
+              </a:bodyPr>
+              <a:lstStyle/>
+              <a:p>
+                <a:pPr algn="ctr"/>
+                <a14:m>
+                  <m:oMathPara xmlns:m="http://schemas.openxmlformats.org/officeDocument/2006/math">
+                    <m:oMathParaPr>
+                      <m:jc m:val="centerGroup"/>
+                    </m:oMathParaPr>
+                    <m:oMath xmlns:m="http://schemas.openxmlformats.org/officeDocument/2006/math">
+                      <m:r>
+                        <a:rPr kumimoji="1" lang="en-US" altLang="ja-JP" sz="2000" b="0" i="1" smtClean="0">
+                          <a:latin typeface="Cambria Math" panose="02040503050406030204" pitchFamily="18" charset="0"/>
+                        </a:rPr>
+                        <m:t>𝑥</m:t>
+                      </m:r>
+                      <m:r>
+                        <a:rPr kumimoji="1" lang="en-US" altLang="ja-JP" sz="2000" b="0" i="1" smtClean="0">
+                          <a:latin typeface="Cambria Math" panose="02040503050406030204" pitchFamily="18" charset="0"/>
+                        </a:rPr>
+                        <m:t>(</m:t>
+                      </m:r>
+                      <m:r>
+                        <a:rPr kumimoji="1" lang="en-US" altLang="ja-JP" sz="2000" b="0" i="1" smtClean="0">
+                          <a:latin typeface="Cambria Math" panose="02040503050406030204" pitchFamily="18" charset="0"/>
+                        </a:rPr>
+                        <m:t>𝑀𝑜𝑣𝑖𝑛𝑔</m:t>
+                      </m:r>
+                      <m:r>
+                        <a:rPr kumimoji="1" lang="en-US" altLang="ja-JP" sz="2000" b="0" i="1" smtClean="0">
+                          <a:latin typeface="Cambria Math" panose="02040503050406030204" pitchFamily="18" charset="0"/>
+                        </a:rPr>
+                        <m:t> </m:t>
+                      </m:r>
+                      <m:r>
+                        <a:rPr kumimoji="1" lang="en-US" altLang="ja-JP" sz="2000" b="0" i="1" smtClean="0">
+                          <a:latin typeface="Cambria Math" panose="02040503050406030204" pitchFamily="18" charset="0"/>
+                        </a:rPr>
+                        <m:t>𝑑𝑖𝑟𝑒𝑐𝑡𝑖𝑜𝑛</m:t>
+                      </m:r>
+                      <m:r>
+                        <a:rPr kumimoji="1" lang="en-US" altLang="ja-JP" sz="2000" b="0" i="1" smtClean="0">
+                          <a:latin typeface="Cambria Math" panose="02040503050406030204" pitchFamily="18" charset="0"/>
+                        </a:rPr>
+                        <m:t>)</m:t>
+                      </m:r>
+                    </m:oMath>
+                  </m:oMathPara>
+                </a14:m>
+                <a:endParaRPr kumimoji="1" lang="ja-JP" altLang="en-US" sz="2000" dirty="0"/>
+              </a:p>
+            </p:txBody>
+          </p:sp>
+        </mc:Choice>
+        <mc:Fallback>
+          <p:sp>
+            <p:nvSpPr>
+              <p:cNvPr id="4" name="テキスト ボックス 3">
+                <a:extLst>
+                  <a:ext uri="{FF2B5EF4-FFF2-40B4-BE49-F238E27FC236}">
+                    <a16:creationId xmlns:a16="http://schemas.microsoft.com/office/drawing/2014/main" id="{6475C2EC-DB38-4B70-B680-09A285046065}"/>
+                  </a:ext>
+                </a:extLst>
+              </p:cNvPr>
+              <p:cNvSpPr txBox="1">
+                <a:spLocks noRot="1" noChangeAspect="1" noMove="1" noResize="1" noEditPoints="1" noAdjustHandles="1" noChangeArrowheads="1" noChangeShapeType="1" noTextEdit="1"/>
+              </p:cNvSpPr>
+              <p:nvPr/>
+            </p:nvSpPr>
+            <p:spPr>
+              <a:xfrm>
+                <a:off x="3447818" y="3435492"/>
+                <a:ext cx="2623282" cy="400110"/>
+              </a:xfrm>
+              <a:prstGeom prst="rect">
+                <a:avLst/>
+              </a:prstGeom>
+              <a:blipFill>
+                <a:blip r:embed="rId2"/>
+                <a:stretch>
+                  <a:fillRect b="-15385"/>
+                </a:stretch>
+              </a:blipFill>
+            </p:spPr>
+            <p:txBody>
+              <a:bodyPr/>
+              <a:lstStyle/>
+              <a:p>
+                <a:r>
+                  <a:rPr lang="ja-JP" altLang="en-US">
+                    <a:noFill/>
+                  </a:rPr>
+                  <a:t> </a:t>
+                </a:r>
+              </a:p>
+            </p:txBody>
+          </p:sp>
+        </mc:Fallback>
+      </mc:AlternateContent>
+      <p:cxnSp>
+        <p:nvCxnSpPr>
+          <p:cNvPr id="6" name="直線矢印コネクタ 5">
+            <a:extLst>
+              <a:ext uri="{FF2B5EF4-FFF2-40B4-BE49-F238E27FC236}">
+                <a16:creationId xmlns:a16="http://schemas.microsoft.com/office/drawing/2014/main" id="{9E6B4108-CA6E-4011-957C-3F44695441E1}"/>
+              </a:ext>
+            </a:extLst>
+          </p:cNvPr>
+          <p:cNvCxnSpPr>
+            <a:cxnSpLocks/>
+          </p:cNvCxnSpPr>
+          <p:nvPr/>
+        </p:nvCxnSpPr>
+        <p:spPr>
+          <a:xfrm flipV="1">
+            <a:off x="1746872" y="1216239"/>
+            <a:ext cx="0" cy="2211853"/>
+          </a:xfrm>
+          <a:prstGeom prst="straightConnector1">
+            <a:avLst/>
+          </a:prstGeom>
+          <a:ln w="19050">
+            <a:solidFill>
+              <a:schemeClr val="tx1"/>
+            </a:solidFill>
+            <a:tailEnd type="triangle"/>
+          </a:ln>
+        </p:spPr>
+        <p:style>
+          <a:lnRef idx="1">
+            <a:schemeClr val="accent1"/>
+          </a:lnRef>
+          <a:fillRef idx="0">
+            <a:schemeClr val="accent1"/>
+          </a:fillRef>
+          <a:effectRef idx="0">
+            <a:schemeClr val="accent1"/>
+          </a:effectRef>
+          <a:fontRef idx="minor">
+            <a:schemeClr val="tx1"/>
+          </a:fontRef>
+        </p:style>
+      </p:cxnSp>
+      <mc:AlternateContent xmlns:mc="http://schemas.openxmlformats.org/markup-compatibility/2006">
+        <mc:Choice xmlns:a14="http://schemas.microsoft.com/office/drawing/2010/main" Requires="a14">
+          <p:sp>
+            <p:nvSpPr>
+              <p:cNvPr id="10" name="テキスト ボックス 9">
+                <a:extLst>
+                  <a:ext uri="{FF2B5EF4-FFF2-40B4-BE49-F238E27FC236}">
+                    <a16:creationId xmlns:a16="http://schemas.microsoft.com/office/drawing/2014/main" id="{913A89EC-6E6D-42C2-BE82-6679C4C77CE4}"/>
+                  </a:ext>
+                </a:extLst>
+              </p:cNvPr>
+              <p:cNvSpPr txBox="1"/>
+              <p:nvPr/>
+            </p:nvSpPr>
+            <p:spPr>
+              <a:xfrm>
+                <a:off x="1736514" y="1008784"/>
+                <a:ext cx="2604431" cy="400110"/>
+              </a:xfrm>
+              <a:prstGeom prst="rect">
+                <a:avLst/>
+              </a:prstGeom>
+              <a:noFill/>
+            </p:spPr>
+            <p:txBody>
+              <a:bodyPr wrap="none" rtlCol="0">
+                <a:spAutoFit/>
+              </a:bodyPr>
+              <a:lstStyle/>
+              <a:p>
+                <a:pPr algn="ctr"/>
+                <a14:m>
+                  <m:oMathPara xmlns:m="http://schemas.openxmlformats.org/officeDocument/2006/math">
+                    <m:oMathParaPr>
+                      <m:jc m:val="centerGroup"/>
+                    </m:oMathParaPr>
+                    <m:oMath xmlns:m="http://schemas.openxmlformats.org/officeDocument/2006/math">
+                      <m:r>
+                        <a:rPr kumimoji="1" lang="en-US" altLang="ja-JP" sz="2000" b="0" i="1" smtClean="0">
+                          <a:latin typeface="Cambria Math" panose="02040503050406030204" pitchFamily="18" charset="0"/>
+                        </a:rPr>
+                        <m:t>𝑦</m:t>
+                      </m:r>
+                      <m:r>
+                        <a:rPr kumimoji="1" lang="en-US" altLang="ja-JP" sz="2000" b="0" i="1" smtClean="0">
+                          <a:latin typeface="Cambria Math" panose="02040503050406030204" pitchFamily="18" charset="0"/>
+                        </a:rPr>
+                        <m:t>(</m:t>
+                      </m:r>
+                      <m:r>
+                        <a:rPr kumimoji="1" lang="en-US" altLang="ja-JP" sz="2000" b="0" i="1" smtClean="0">
+                          <a:latin typeface="Cambria Math" panose="02040503050406030204" pitchFamily="18" charset="0"/>
+                        </a:rPr>
+                        <m:t>𝐿𝑎𝑡𝑒𝑟𝑎𝑙</m:t>
+                      </m:r>
+                      <m:r>
+                        <a:rPr kumimoji="1" lang="en-US" altLang="ja-JP" sz="2000" b="0" i="1" smtClean="0">
+                          <a:latin typeface="Cambria Math" panose="02040503050406030204" pitchFamily="18" charset="0"/>
+                        </a:rPr>
+                        <m:t> </m:t>
+                      </m:r>
+                      <m:r>
+                        <a:rPr kumimoji="1" lang="en-US" altLang="ja-JP" sz="2000" b="0" i="1" smtClean="0">
+                          <a:latin typeface="Cambria Math" panose="02040503050406030204" pitchFamily="18" charset="0"/>
+                        </a:rPr>
+                        <m:t>𝑑𝑖𝑟𝑒𝑐𝑡𝑖𝑜𝑛</m:t>
+                      </m:r>
+                      <m:r>
+                        <a:rPr kumimoji="1" lang="en-US" altLang="ja-JP" sz="2000" b="0" i="1" smtClean="0">
+                          <a:latin typeface="Cambria Math" panose="02040503050406030204" pitchFamily="18" charset="0"/>
+                        </a:rPr>
+                        <m:t>)</m:t>
+                      </m:r>
+                    </m:oMath>
+                  </m:oMathPara>
+                </a14:m>
+                <a:endParaRPr kumimoji="1" lang="ja-JP" altLang="en-US" sz="2000" dirty="0"/>
+              </a:p>
+            </p:txBody>
+          </p:sp>
+        </mc:Choice>
+        <mc:Fallback>
+          <p:sp>
+            <p:nvSpPr>
+              <p:cNvPr id="10" name="テキスト ボックス 9">
+                <a:extLst>
+                  <a:ext uri="{FF2B5EF4-FFF2-40B4-BE49-F238E27FC236}">
+                    <a16:creationId xmlns:a16="http://schemas.microsoft.com/office/drawing/2014/main" id="{913A89EC-6E6D-42C2-BE82-6679C4C77CE4}"/>
+                  </a:ext>
+                </a:extLst>
+              </p:cNvPr>
+              <p:cNvSpPr txBox="1">
+                <a:spLocks noRot="1" noChangeAspect="1" noMove="1" noResize="1" noEditPoints="1" noAdjustHandles="1" noChangeArrowheads="1" noChangeShapeType="1" noTextEdit="1"/>
+              </p:cNvSpPr>
+              <p:nvPr/>
+            </p:nvSpPr>
+            <p:spPr>
+              <a:xfrm>
+                <a:off x="1736514" y="1008784"/>
+                <a:ext cx="2604431" cy="400110"/>
+              </a:xfrm>
+              <a:prstGeom prst="rect">
+                <a:avLst/>
+              </a:prstGeom>
+              <a:blipFill>
+                <a:blip r:embed="rId3"/>
+                <a:stretch>
+                  <a:fillRect b="-15152"/>
+                </a:stretch>
+              </a:blipFill>
+            </p:spPr>
+            <p:txBody>
+              <a:bodyPr/>
+              <a:lstStyle/>
+              <a:p>
+                <a:r>
+                  <a:rPr lang="ja-JP" altLang="en-US">
+                    <a:noFill/>
+                  </a:rPr>
+                  <a:t> </a:t>
+                </a:r>
+              </a:p>
+            </p:txBody>
+          </p:sp>
+        </mc:Fallback>
+      </mc:AlternateContent>
+      <p:sp>
+        <p:nvSpPr>
+          <p:cNvPr id="11" name="テキスト ボックス 10">
+            <a:extLst>
+              <a:ext uri="{FF2B5EF4-FFF2-40B4-BE49-F238E27FC236}">
+                <a16:creationId xmlns:a16="http://schemas.microsoft.com/office/drawing/2014/main" id="{5354A297-2062-455E-8924-6BF5E06A4574}"/>
+              </a:ext>
+            </a:extLst>
+          </p:cNvPr>
+          <p:cNvSpPr txBox="1"/>
+          <p:nvPr/>
+        </p:nvSpPr>
+        <p:spPr>
+          <a:xfrm>
+            <a:off x="3126807" y="337930"/>
+            <a:ext cx="5437707" cy="461665"/>
+          </a:xfrm>
+          <a:prstGeom prst="rect">
+            <a:avLst/>
+          </a:prstGeom>
+          <a:noFill/>
+        </p:spPr>
+        <p:txBody>
+          <a:bodyPr wrap="none" rtlCol="0">
+            <a:spAutoFit/>
+          </a:bodyPr>
+          <a:lstStyle/>
+          <a:p>
+            <a:pPr algn="ctr"/>
+            <a:r>
+              <a:rPr kumimoji="1" lang="en-US" altLang="ja-JP" sz="2400" b="1" dirty="0"/>
+              <a:t>Robot coordinate system definition</a:t>
+            </a:r>
+            <a:endParaRPr kumimoji="1" lang="ja-JP" altLang="en-US" sz="2400" b="1" dirty="0"/>
+          </a:p>
+        </p:txBody>
+      </p:sp>
+      <p:sp>
+        <p:nvSpPr>
+          <p:cNvPr id="12" name="正方形/長方形 11">
+            <a:extLst>
+              <a:ext uri="{FF2B5EF4-FFF2-40B4-BE49-F238E27FC236}">
+                <a16:creationId xmlns:a16="http://schemas.microsoft.com/office/drawing/2014/main" id="{C311FC5C-B2D0-4998-9B35-33F4B113815A}"/>
+              </a:ext>
+            </a:extLst>
+          </p:cNvPr>
+          <p:cNvSpPr/>
+          <p:nvPr/>
+        </p:nvSpPr>
+        <p:spPr>
+          <a:xfrm>
+            <a:off x="6827799" y="2950860"/>
+            <a:ext cx="506029" cy="477232"/>
+          </a:xfrm>
+          <a:prstGeom prst="rect">
+            <a:avLst/>
+          </a:prstGeom>
+          <a:ln>
+            <a:solidFill>
+              <a:schemeClr val="tx1"/>
+            </a:solidFill>
+          </a:ln>
+        </p:spPr>
+        <p:style>
+          <a:lnRef idx="2">
+            <a:schemeClr val="accent1">
+              <a:shade val="50000"/>
+            </a:schemeClr>
+          </a:lnRef>
+          <a:fillRef idx="1">
+            <a:schemeClr val="accent1"/>
+          </a:fillRef>
+          <a:effectRef idx="0">
+            <a:schemeClr val="accent1"/>
+          </a:effectRef>
+          <a:fontRef idx="minor">
+            <a:schemeClr val="lt1"/>
+          </a:fontRef>
+        </p:style>
+        <p:txBody>
+          <a:bodyPr rtlCol="0" anchor="ctr"/>
+          <a:lstStyle/>
+          <a:p>
+            <a:pPr algn="ctr"/>
+            <a:endParaRPr kumimoji="1" lang="ja-JP" altLang="en-US"/>
+          </a:p>
+        </p:txBody>
+      </p:sp>
+      <p:sp>
+        <p:nvSpPr>
+          <p:cNvPr id="13" name="正方形/長方形 12">
+            <a:extLst>
+              <a:ext uri="{FF2B5EF4-FFF2-40B4-BE49-F238E27FC236}">
+                <a16:creationId xmlns:a16="http://schemas.microsoft.com/office/drawing/2014/main" id="{0402AED7-FCDC-4F11-968D-2DE79C46D0F2}"/>
+              </a:ext>
+            </a:extLst>
+          </p:cNvPr>
+          <p:cNvSpPr/>
+          <p:nvPr/>
+        </p:nvSpPr>
+        <p:spPr>
+          <a:xfrm>
+            <a:off x="7335307" y="2943461"/>
+            <a:ext cx="231204" cy="484632"/>
+          </a:xfrm>
+          <a:prstGeom prst="rect">
+            <a:avLst/>
+          </a:prstGeom>
+          <a:ln>
+            <a:solidFill>
+              <a:schemeClr val="tx1"/>
+            </a:solidFill>
+          </a:ln>
+        </p:spPr>
+        <p:style>
+          <a:lnRef idx="2">
+            <a:schemeClr val="accent1">
+              <a:shade val="50000"/>
+            </a:schemeClr>
+          </a:lnRef>
+          <a:fillRef idx="1">
+            <a:schemeClr val="accent1"/>
+          </a:fillRef>
+          <a:effectRef idx="0">
+            <a:schemeClr val="accent1"/>
+          </a:effectRef>
+          <a:fontRef idx="minor">
+            <a:schemeClr val="lt1"/>
+          </a:fontRef>
+        </p:style>
+        <p:txBody>
+          <a:bodyPr rtlCol="0" anchor="ctr"/>
+          <a:lstStyle/>
+          <a:p>
+            <a:pPr algn="ctr"/>
+            <a:endParaRPr kumimoji="1" lang="ja-JP" altLang="en-US"/>
+          </a:p>
+        </p:txBody>
+      </p:sp>
+      <p:cxnSp>
+        <p:nvCxnSpPr>
+          <p:cNvPr id="14" name="直線矢印コネクタ 13">
+            <a:extLst>
+              <a:ext uri="{FF2B5EF4-FFF2-40B4-BE49-F238E27FC236}">
+                <a16:creationId xmlns:a16="http://schemas.microsoft.com/office/drawing/2014/main" id="{8F2A525C-C1CC-44F3-AE95-BA6C494BB2CD}"/>
+              </a:ext>
+            </a:extLst>
+          </p:cNvPr>
+          <p:cNvCxnSpPr>
+            <a:cxnSpLocks/>
+          </p:cNvCxnSpPr>
+          <p:nvPr/>
+        </p:nvCxnSpPr>
+        <p:spPr>
+          <a:xfrm>
+            <a:off x="7082363" y="3436971"/>
+            <a:ext cx="2382725" cy="0"/>
+          </a:xfrm>
+          <a:prstGeom prst="straightConnector1">
+            <a:avLst/>
+          </a:prstGeom>
+          <a:ln w="19050">
+            <a:solidFill>
+              <a:schemeClr val="tx1"/>
+            </a:solidFill>
+            <a:tailEnd type="triangle"/>
+          </a:ln>
+        </p:spPr>
+        <p:style>
+          <a:lnRef idx="1">
+            <a:schemeClr val="accent1"/>
+          </a:lnRef>
+          <a:fillRef idx="0">
+            <a:schemeClr val="accent1"/>
+          </a:fillRef>
+          <a:effectRef idx="0">
+            <a:schemeClr val="accent1"/>
+          </a:effectRef>
+          <a:fontRef idx="minor">
+            <a:schemeClr val="tx1"/>
+          </a:fontRef>
+        </p:style>
+      </p:cxnSp>
+      <mc:AlternateContent xmlns:mc="http://schemas.openxmlformats.org/markup-compatibility/2006">
+        <mc:Choice xmlns:a14="http://schemas.microsoft.com/office/drawing/2010/main" Requires="a14">
+          <p:sp>
+            <p:nvSpPr>
+              <p:cNvPr id="15" name="テキスト ボックス 14">
+                <a:extLst>
+                  <a:ext uri="{FF2B5EF4-FFF2-40B4-BE49-F238E27FC236}">
+                    <a16:creationId xmlns:a16="http://schemas.microsoft.com/office/drawing/2014/main" id="{4C792DFD-2F6F-439F-8D79-16E5C68CD483}"/>
+                  </a:ext>
+                </a:extLst>
+              </p:cNvPr>
+              <p:cNvSpPr txBox="1"/>
+              <p:nvPr/>
+            </p:nvSpPr>
+            <p:spPr>
+              <a:xfrm>
+                <a:off x="8802545" y="3436971"/>
+                <a:ext cx="2623282" cy="400110"/>
+              </a:xfrm>
+              <a:prstGeom prst="rect">
+                <a:avLst/>
+              </a:prstGeom>
+              <a:noFill/>
+            </p:spPr>
+            <p:txBody>
+              <a:bodyPr wrap="none" rtlCol="0">
+                <a:spAutoFit/>
+              </a:bodyPr>
+              <a:lstStyle/>
+              <a:p>
+                <a:pPr algn="ctr"/>
+                <a14:m>
+                  <m:oMathPara xmlns:m="http://schemas.openxmlformats.org/officeDocument/2006/math">
+                    <m:oMathParaPr>
+                      <m:jc m:val="centerGroup"/>
+                    </m:oMathParaPr>
+                    <m:oMath xmlns:m="http://schemas.openxmlformats.org/officeDocument/2006/math">
+                      <m:r>
+                        <a:rPr kumimoji="1" lang="en-US" altLang="ja-JP" sz="2000" b="0" i="1" smtClean="0">
+                          <a:latin typeface="Cambria Math" panose="02040503050406030204" pitchFamily="18" charset="0"/>
+                        </a:rPr>
+                        <m:t>𝑥</m:t>
+                      </m:r>
+                      <m:r>
+                        <a:rPr kumimoji="1" lang="en-US" altLang="ja-JP" sz="2000" b="0" i="1" smtClean="0">
+                          <a:latin typeface="Cambria Math" panose="02040503050406030204" pitchFamily="18" charset="0"/>
+                        </a:rPr>
+                        <m:t>(</m:t>
+                      </m:r>
+                      <m:r>
+                        <a:rPr kumimoji="1" lang="en-US" altLang="ja-JP" sz="2000" b="0" i="1" smtClean="0">
+                          <a:latin typeface="Cambria Math" panose="02040503050406030204" pitchFamily="18" charset="0"/>
+                        </a:rPr>
+                        <m:t>𝑀𝑜𝑣𝑖𝑛𝑔</m:t>
+                      </m:r>
+                      <m:r>
+                        <a:rPr kumimoji="1" lang="en-US" altLang="ja-JP" sz="2000" b="0" i="1" smtClean="0">
+                          <a:latin typeface="Cambria Math" panose="02040503050406030204" pitchFamily="18" charset="0"/>
+                        </a:rPr>
+                        <m:t> </m:t>
+                      </m:r>
+                      <m:r>
+                        <a:rPr kumimoji="1" lang="en-US" altLang="ja-JP" sz="2000" b="0" i="1" smtClean="0">
+                          <a:latin typeface="Cambria Math" panose="02040503050406030204" pitchFamily="18" charset="0"/>
+                        </a:rPr>
+                        <m:t>𝑑𝑖𝑟𝑒𝑐𝑡𝑖𝑜𝑛</m:t>
+                      </m:r>
+                      <m:r>
+                        <a:rPr kumimoji="1" lang="en-US" altLang="ja-JP" sz="2000" b="0" i="1" smtClean="0">
+                          <a:latin typeface="Cambria Math" panose="02040503050406030204" pitchFamily="18" charset="0"/>
+                        </a:rPr>
+                        <m:t>)</m:t>
+                      </m:r>
+                    </m:oMath>
+                  </m:oMathPara>
+                </a14:m>
+                <a:endParaRPr kumimoji="1" lang="ja-JP" altLang="en-US" sz="2000" dirty="0"/>
+              </a:p>
+            </p:txBody>
+          </p:sp>
+        </mc:Choice>
+        <mc:Fallback>
+          <p:sp>
+            <p:nvSpPr>
+              <p:cNvPr id="15" name="テキスト ボックス 14">
+                <a:extLst>
+                  <a:ext uri="{FF2B5EF4-FFF2-40B4-BE49-F238E27FC236}">
+                    <a16:creationId xmlns:a16="http://schemas.microsoft.com/office/drawing/2014/main" id="{4C792DFD-2F6F-439F-8D79-16E5C68CD483}"/>
+                  </a:ext>
+                </a:extLst>
+              </p:cNvPr>
+              <p:cNvSpPr txBox="1">
+                <a:spLocks noRot="1" noChangeAspect="1" noMove="1" noResize="1" noEditPoints="1" noAdjustHandles="1" noChangeArrowheads="1" noChangeShapeType="1" noTextEdit="1"/>
+              </p:cNvSpPr>
+              <p:nvPr/>
+            </p:nvSpPr>
+            <p:spPr>
+              <a:xfrm>
+                <a:off x="8802545" y="3436971"/>
+                <a:ext cx="2623282" cy="400110"/>
+              </a:xfrm>
+              <a:prstGeom prst="rect">
+                <a:avLst/>
+              </a:prstGeom>
+              <a:blipFill>
+                <a:blip r:embed="rId4"/>
+                <a:stretch>
+                  <a:fillRect b="-15385"/>
+                </a:stretch>
+              </a:blipFill>
+            </p:spPr>
+            <p:txBody>
+              <a:bodyPr/>
+              <a:lstStyle/>
+              <a:p>
+                <a:r>
+                  <a:rPr lang="ja-JP" altLang="en-US">
+                    <a:noFill/>
+                  </a:rPr>
+                  <a:t> </a:t>
+                </a:r>
+              </a:p>
+            </p:txBody>
+          </p:sp>
+        </mc:Fallback>
+      </mc:AlternateContent>
+      <p:cxnSp>
+        <p:nvCxnSpPr>
+          <p:cNvPr id="16" name="直線矢印コネクタ 15">
+            <a:extLst>
+              <a:ext uri="{FF2B5EF4-FFF2-40B4-BE49-F238E27FC236}">
+                <a16:creationId xmlns:a16="http://schemas.microsoft.com/office/drawing/2014/main" id="{5FD87C3F-16DC-4CAA-A588-E61E0BD634C9}"/>
+              </a:ext>
+            </a:extLst>
+          </p:cNvPr>
+          <p:cNvCxnSpPr>
+            <a:cxnSpLocks/>
+          </p:cNvCxnSpPr>
+          <p:nvPr/>
+        </p:nvCxnSpPr>
+        <p:spPr>
+          <a:xfrm flipV="1">
+            <a:off x="7083845" y="1235473"/>
+            <a:ext cx="0" cy="2211853"/>
+          </a:xfrm>
+          <a:prstGeom prst="straightConnector1">
+            <a:avLst/>
+          </a:prstGeom>
+          <a:ln w="19050">
+            <a:solidFill>
+              <a:schemeClr val="tx1"/>
+            </a:solidFill>
+            <a:tailEnd type="triangle"/>
+          </a:ln>
+        </p:spPr>
+        <p:style>
+          <a:lnRef idx="1">
+            <a:schemeClr val="accent1"/>
+          </a:lnRef>
+          <a:fillRef idx="0">
+            <a:schemeClr val="accent1"/>
+          </a:fillRef>
+          <a:effectRef idx="0">
+            <a:schemeClr val="accent1"/>
+          </a:effectRef>
+          <a:fontRef idx="minor">
+            <a:schemeClr val="tx1"/>
+          </a:fontRef>
+        </p:style>
+      </p:cxnSp>
+      <mc:AlternateContent xmlns:mc="http://schemas.openxmlformats.org/markup-compatibility/2006">
+        <mc:Choice xmlns:a14="http://schemas.microsoft.com/office/drawing/2010/main" Requires="a14">
+          <p:sp>
+            <p:nvSpPr>
+              <p:cNvPr id="17" name="テキスト ボックス 16">
+                <a:extLst>
+                  <a:ext uri="{FF2B5EF4-FFF2-40B4-BE49-F238E27FC236}">
+                    <a16:creationId xmlns:a16="http://schemas.microsoft.com/office/drawing/2014/main" id="{F2D1346C-A2AE-44F0-AB94-09D7094AEC50}"/>
+                  </a:ext>
+                </a:extLst>
+              </p:cNvPr>
+              <p:cNvSpPr txBox="1"/>
+              <p:nvPr/>
+            </p:nvSpPr>
+            <p:spPr>
+              <a:xfrm>
+                <a:off x="7080813" y="1035418"/>
+                <a:ext cx="2665345" cy="400110"/>
+              </a:xfrm>
+              <a:prstGeom prst="rect">
+                <a:avLst/>
+              </a:prstGeom>
+              <a:noFill/>
+            </p:spPr>
+            <p:txBody>
+              <a:bodyPr wrap="none" rtlCol="0">
+                <a:spAutoFit/>
+              </a:bodyPr>
+              <a:lstStyle/>
+              <a:p>
+                <a:pPr algn="ctr"/>
+                <a14:m>
+                  <m:oMathPara xmlns:m="http://schemas.openxmlformats.org/officeDocument/2006/math">
+                    <m:oMathParaPr>
+                      <m:jc m:val="centerGroup"/>
+                    </m:oMathParaPr>
+                    <m:oMath xmlns:m="http://schemas.openxmlformats.org/officeDocument/2006/math">
+                      <m:r>
+                        <a:rPr kumimoji="1" lang="en-US" altLang="ja-JP" sz="2000" b="0" i="1" smtClean="0">
+                          <a:latin typeface="Cambria Math" panose="02040503050406030204" pitchFamily="18" charset="0"/>
+                        </a:rPr>
+                        <m:t>𝑧</m:t>
+                      </m:r>
+                      <m:r>
+                        <a:rPr kumimoji="1" lang="en-US" altLang="ja-JP" sz="2000" b="0" i="1" smtClean="0">
+                          <a:latin typeface="Cambria Math" panose="02040503050406030204" pitchFamily="18" charset="0"/>
+                        </a:rPr>
+                        <m:t>(</m:t>
+                      </m:r>
+                      <m:r>
+                        <a:rPr kumimoji="1" lang="en-US" altLang="ja-JP" sz="2000" b="0" i="1" smtClean="0">
+                          <a:latin typeface="Cambria Math" panose="02040503050406030204" pitchFamily="18" charset="0"/>
+                        </a:rPr>
+                        <m:t>𝑉𝑒𝑟𝑡𝑖𝑐𝑎𝑙</m:t>
+                      </m:r>
+                      <m:r>
+                        <a:rPr kumimoji="1" lang="en-US" altLang="ja-JP" sz="2000" b="0" i="1" smtClean="0">
+                          <a:latin typeface="Cambria Math" panose="02040503050406030204" pitchFamily="18" charset="0"/>
+                        </a:rPr>
+                        <m:t> </m:t>
+                      </m:r>
+                      <m:r>
+                        <a:rPr kumimoji="1" lang="en-US" altLang="ja-JP" sz="2000" b="0" i="1" smtClean="0">
+                          <a:latin typeface="Cambria Math" panose="02040503050406030204" pitchFamily="18" charset="0"/>
+                        </a:rPr>
+                        <m:t>𝑑𝑖𝑟𝑒𝑐𝑡𝑖𝑜𝑛</m:t>
+                      </m:r>
+                      <m:r>
+                        <a:rPr kumimoji="1" lang="en-US" altLang="ja-JP" sz="2000" b="0" i="1" smtClean="0">
+                          <a:latin typeface="Cambria Math" panose="02040503050406030204" pitchFamily="18" charset="0"/>
+                        </a:rPr>
+                        <m:t>)</m:t>
+                      </m:r>
+                    </m:oMath>
+                  </m:oMathPara>
+                </a14:m>
+                <a:endParaRPr kumimoji="1" lang="ja-JP" altLang="en-US" sz="2000" dirty="0"/>
+              </a:p>
+            </p:txBody>
+          </p:sp>
+        </mc:Choice>
+        <mc:Fallback>
+          <p:sp>
+            <p:nvSpPr>
+              <p:cNvPr id="17" name="テキスト ボックス 16">
+                <a:extLst>
+                  <a:ext uri="{FF2B5EF4-FFF2-40B4-BE49-F238E27FC236}">
+                    <a16:creationId xmlns:a16="http://schemas.microsoft.com/office/drawing/2014/main" id="{F2D1346C-A2AE-44F0-AB94-09D7094AEC50}"/>
+                  </a:ext>
+                </a:extLst>
+              </p:cNvPr>
+              <p:cNvSpPr txBox="1">
+                <a:spLocks noRot="1" noChangeAspect="1" noMove="1" noResize="1" noEditPoints="1" noAdjustHandles="1" noChangeArrowheads="1" noChangeShapeType="1" noTextEdit="1"/>
+              </p:cNvSpPr>
+              <p:nvPr/>
+            </p:nvSpPr>
+            <p:spPr>
+              <a:xfrm>
+                <a:off x="7080813" y="1035418"/>
+                <a:ext cx="2665345" cy="400110"/>
+              </a:xfrm>
+              <a:prstGeom prst="rect">
+                <a:avLst/>
+              </a:prstGeom>
+              <a:blipFill>
+                <a:blip r:embed="rId5"/>
+                <a:stretch>
+                  <a:fillRect b="-15385"/>
+                </a:stretch>
+              </a:blipFill>
+            </p:spPr>
+            <p:txBody>
+              <a:bodyPr/>
+              <a:lstStyle/>
+              <a:p>
+                <a:r>
+                  <a:rPr lang="ja-JP" altLang="en-US">
+                    <a:noFill/>
+                  </a:rPr>
+                  <a:t> </a:t>
+                </a:r>
+              </a:p>
+            </p:txBody>
+          </p:sp>
+        </mc:Fallback>
+      </mc:AlternateContent>
+    </p:spTree>
+    <p:extLst>
+      <p:ext uri="{BB962C8B-B14F-4D97-AF65-F5344CB8AC3E}">
+        <p14:creationId xmlns:p14="http://schemas.microsoft.com/office/powerpoint/2010/main" val="479173911"/>
+      </p:ext>
+    </p:extLst>
+  </p:cSld>
+  <p:clrMapOvr>
+    <a:masterClrMapping/>
+  </p:clrMapOvr>
+</p:sld>
+</file>
+
+<file path=ppt/slides/slide5.xml><?xml version="1.0" encoding="utf-8"?>
+<p:sld xmlns:a="http://schemas.openxmlformats.org/drawingml/2006/main" xmlns:r="http://schemas.openxmlformats.org/officeDocument/2006/relationships" xmlns:p="http://schemas.openxmlformats.org/presentationml/2006/main">
+  <p:cSld>
+    <p:spTree>
+      <p:nvGrpSpPr>
+        <p:cNvPr id="1" name=""/>
+        <p:cNvGrpSpPr/>
+        <p:nvPr/>
+      </p:nvGrpSpPr>
+      <p:grpSpPr>
+        <a:xfrm>
+          <a:off x="0" y="0"/>
+          <a:ext cx="0" cy="0"/>
+          <a:chOff x="0" y="0"/>
+          <a:chExt cx="0" cy="0"/>
+        </a:xfrm>
+      </p:grpSpPr>
+      <p:grpSp>
+        <p:nvGrpSpPr>
+          <p:cNvPr id="15" name="グループ化 14">
+            <a:extLst>
+              <a:ext uri="{FF2B5EF4-FFF2-40B4-BE49-F238E27FC236}">
+                <a16:creationId xmlns:a16="http://schemas.microsoft.com/office/drawing/2014/main" id="{F01FFBE0-FC52-4DDA-BCE4-0B11A92F92DF}"/>
+              </a:ext>
+            </a:extLst>
+          </p:cNvPr>
+          <p:cNvGrpSpPr/>
+          <p:nvPr/>
+        </p:nvGrpSpPr>
+        <p:grpSpPr>
+          <a:xfrm rot="20408583">
+            <a:off x="5644289" y="747032"/>
+            <a:ext cx="3084786" cy="2936422"/>
+            <a:chOff x="5651996" y="1013362"/>
+            <a:chExt cx="3084786" cy="2936422"/>
+          </a:xfrm>
+        </p:grpSpPr>
+        <p:sp>
+          <p:nvSpPr>
+            <p:cNvPr id="2" name="矢印: 五方向 1">
+              <a:extLst>
+                <a:ext uri="{FF2B5EF4-FFF2-40B4-BE49-F238E27FC236}">
+                  <a16:creationId xmlns:a16="http://schemas.microsoft.com/office/drawing/2014/main" id="{872B39E7-84CB-4D72-8859-15621F80C42A}"/>
+                </a:ext>
+              </a:extLst>
+            </p:cNvPr>
+            <p:cNvSpPr/>
+            <p:nvPr/>
+          </p:nvSpPr>
+          <p:spPr>
+            <a:xfrm>
+              <a:off x="5778738" y="3308266"/>
+              <a:ext cx="738711" cy="484632"/>
+            </a:xfrm>
+            <a:prstGeom prst="homePlate">
+              <a:avLst/>
+            </a:prstGeom>
+          </p:spPr>
+          <p:style>
+            <a:lnRef idx="2">
+              <a:schemeClr val="accent1">
+                <a:shade val="50000"/>
+              </a:schemeClr>
+            </a:lnRef>
+            <a:fillRef idx="1">
+              <a:schemeClr val="accent1"/>
+            </a:fillRef>
+            <a:effectRef idx="0">
+              <a:schemeClr val="accent1"/>
+            </a:effectRef>
+            <a:fontRef idx="minor">
+              <a:schemeClr val="lt1"/>
+            </a:fontRef>
+          </p:style>
+          <p:txBody>
+            <a:bodyPr rtlCol="0" anchor="ctr"/>
+            <a:lstStyle/>
+            <a:p>
+              <a:pPr algn="ctr"/>
+              <a:endParaRPr kumimoji="1" lang="ja-JP" altLang="en-US"/>
+            </a:p>
+          </p:txBody>
+        </p:sp>
+        <p:cxnSp>
+          <p:nvCxnSpPr>
+            <p:cNvPr id="3" name="直線矢印コネクタ 2">
+              <a:extLst>
+                <a:ext uri="{FF2B5EF4-FFF2-40B4-BE49-F238E27FC236}">
+                  <a16:creationId xmlns:a16="http://schemas.microsoft.com/office/drawing/2014/main" id="{0F790840-E677-4A90-AD95-700D4D187616}"/>
+                </a:ext>
+              </a:extLst>
+            </p:cNvPr>
+            <p:cNvCxnSpPr>
+              <a:cxnSpLocks/>
+            </p:cNvCxnSpPr>
+            <p:nvPr/>
+          </p:nvCxnSpPr>
+          <p:spPr>
+            <a:xfrm>
+              <a:off x="6050438" y="3557074"/>
+              <a:ext cx="2382725" cy="0"/>
+            </a:xfrm>
+            <a:prstGeom prst="straightConnector1">
+              <a:avLst/>
+            </a:prstGeom>
+            <a:ln w="19050">
+              <a:solidFill>
+                <a:schemeClr val="tx1"/>
+              </a:solidFill>
+              <a:tailEnd type="triangle"/>
+            </a:ln>
+          </p:spPr>
+          <p:style>
+            <a:lnRef idx="1">
+              <a:schemeClr val="accent1"/>
+            </a:lnRef>
+            <a:fillRef idx="0">
+              <a:schemeClr val="accent1"/>
+            </a:fillRef>
+            <a:effectRef idx="0">
+              <a:schemeClr val="accent1"/>
+            </a:effectRef>
+            <a:fontRef idx="minor">
+              <a:schemeClr val="tx1"/>
+            </a:fontRef>
+          </p:style>
+        </p:cxnSp>
+        <p:cxnSp>
+          <p:nvCxnSpPr>
+            <p:cNvPr id="5" name="直線矢印コネクタ 4">
+              <a:extLst>
+                <a:ext uri="{FF2B5EF4-FFF2-40B4-BE49-F238E27FC236}">
+                  <a16:creationId xmlns:a16="http://schemas.microsoft.com/office/drawing/2014/main" id="{6CD5FB02-A01D-48D4-9467-C9D35F046A9F}"/>
+                </a:ext>
+              </a:extLst>
+            </p:cNvPr>
+            <p:cNvCxnSpPr>
+              <a:cxnSpLocks/>
+            </p:cNvCxnSpPr>
+            <p:nvPr/>
+          </p:nvCxnSpPr>
+          <p:spPr>
+            <a:xfrm flipV="1">
+              <a:off x="6060796" y="1337821"/>
+              <a:ext cx="0" cy="2211853"/>
+            </a:xfrm>
+            <a:prstGeom prst="straightConnector1">
+              <a:avLst/>
+            </a:prstGeom>
+            <a:ln w="19050">
+              <a:solidFill>
+                <a:schemeClr val="tx1"/>
+              </a:solidFill>
+              <a:tailEnd type="triangle"/>
+            </a:ln>
+          </p:spPr>
+          <p:style>
+            <a:lnRef idx="1">
+              <a:schemeClr val="accent1"/>
+            </a:lnRef>
+            <a:fillRef idx="0">
+              <a:schemeClr val="accent1"/>
+            </a:fillRef>
+            <a:effectRef idx="0">
+              <a:schemeClr val="accent1"/>
+            </a:effectRef>
+            <a:fontRef idx="minor">
+              <a:schemeClr val="tx1"/>
+            </a:fontRef>
+          </p:style>
+        </p:cxnSp>
+        <mc:AlternateContent xmlns:mc="http://schemas.openxmlformats.org/markup-compatibility/2006">
+          <mc:Choice xmlns:a14="http://schemas.microsoft.com/office/drawing/2010/main" Requires="a14">
+            <p:sp>
+              <p:nvSpPr>
+                <p:cNvPr id="6" name="テキスト ボックス 5">
+                  <a:extLst>
+                    <a:ext uri="{FF2B5EF4-FFF2-40B4-BE49-F238E27FC236}">
+                      <a16:creationId xmlns:a16="http://schemas.microsoft.com/office/drawing/2014/main" id="{CDBAE277-91F2-4BD9-9FA7-11CF3CDF769D}"/>
+                    </a:ext>
+                  </a:extLst>
+                </p:cNvPr>
+                <p:cNvSpPr txBox="1"/>
+                <p:nvPr/>
+              </p:nvSpPr>
+              <p:spPr>
+                <a:xfrm>
+                  <a:off x="5651996" y="1013362"/>
+                  <a:ext cx="496097" cy="400110"/>
+                </a:xfrm>
+                <a:prstGeom prst="rect">
+                  <a:avLst/>
+                </a:prstGeom>
+                <a:noFill/>
+              </p:spPr>
+              <p:txBody>
+                <a:bodyPr wrap="none" rtlCol="0">
+                  <a:spAutoFit/>
+                </a:bodyPr>
+                <a:lstStyle/>
+                <a:p>
+                  <a:pPr algn="ctr"/>
+                  <a14:m>
+                    <m:oMathPara xmlns:m="http://schemas.openxmlformats.org/officeDocument/2006/math">
+                      <m:oMathParaPr>
+                        <m:jc m:val="centerGroup"/>
+                      </m:oMathParaPr>
+                      <m:oMath xmlns:m="http://schemas.openxmlformats.org/officeDocument/2006/math">
+                        <m:sSub>
+                          <m:sSubPr>
+                            <m:ctrlPr>
+                              <a:rPr kumimoji="1" lang="en-US" altLang="ja-JP" sz="2000" b="0" i="1" smtClean="0">
+                                <a:latin typeface="Cambria Math" panose="02040503050406030204" pitchFamily="18" charset="0"/>
+                              </a:rPr>
+                            </m:ctrlPr>
+                          </m:sSubPr>
+                          <m:e>
+                            <m:r>
+                              <a:rPr kumimoji="1" lang="en-US" altLang="ja-JP" sz="2000" b="0" i="1" smtClean="0">
+                                <a:latin typeface="Cambria Math" panose="02040503050406030204" pitchFamily="18" charset="0"/>
+                              </a:rPr>
+                              <m:t>𝑦</m:t>
+                            </m:r>
+                          </m:e>
+                          <m:sub>
+                            <m:r>
+                              <a:rPr kumimoji="1" lang="en-US" altLang="ja-JP" sz="2000" b="0" i="1" smtClean="0">
+                                <a:latin typeface="Cambria Math" panose="02040503050406030204" pitchFamily="18" charset="0"/>
+                              </a:rPr>
+                              <m:t>𝑟</m:t>
+                            </m:r>
+                          </m:sub>
+                        </m:sSub>
+                      </m:oMath>
+                    </m:oMathPara>
+                  </a14:m>
+                  <a:endParaRPr kumimoji="1" lang="ja-JP" altLang="en-US" sz="2000" dirty="0"/>
+                </a:p>
+              </p:txBody>
+            </p:sp>
+          </mc:Choice>
+          <mc:Fallback>
+            <p:sp>
+              <p:nvSpPr>
+                <p:cNvPr id="6" name="テキスト ボックス 5">
+                  <a:extLst>
+                    <a:ext uri="{FF2B5EF4-FFF2-40B4-BE49-F238E27FC236}">
+                      <a16:creationId xmlns:a16="http://schemas.microsoft.com/office/drawing/2014/main" id="{CDBAE277-91F2-4BD9-9FA7-11CF3CDF769D}"/>
+                    </a:ext>
+                  </a:extLst>
+                </p:cNvPr>
+                <p:cNvSpPr txBox="1">
+                  <a:spLocks noRot="1" noChangeAspect="1" noMove="1" noResize="1" noEditPoints="1" noAdjustHandles="1" noChangeArrowheads="1" noChangeShapeType="1" noTextEdit="1"/>
+                </p:cNvSpPr>
+                <p:nvPr/>
+              </p:nvSpPr>
+              <p:spPr>
+                <a:xfrm>
+                  <a:off x="5651996" y="1013362"/>
+                  <a:ext cx="496097" cy="400110"/>
+                </a:xfrm>
+                <a:prstGeom prst="rect">
+                  <a:avLst/>
+                </a:prstGeom>
+                <a:blipFill>
+                  <a:blip r:embed="rId2"/>
+                  <a:stretch>
+                    <a:fillRect b="-4444"/>
+                  </a:stretch>
+                </a:blipFill>
+              </p:spPr>
+              <p:txBody>
+                <a:bodyPr/>
+                <a:lstStyle/>
+                <a:p>
+                  <a:r>
+                    <a:rPr lang="ja-JP" altLang="en-US">
+                      <a:noFill/>
+                    </a:rPr>
+                    <a:t> </a:t>
+                  </a:r>
+                </a:p>
+              </p:txBody>
+            </p:sp>
+          </mc:Fallback>
+        </mc:AlternateContent>
+        <mc:AlternateContent xmlns:mc="http://schemas.openxmlformats.org/markup-compatibility/2006">
+          <mc:Choice xmlns:a14="http://schemas.microsoft.com/office/drawing/2010/main" Requires="a14">
+            <p:sp>
+              <p:nvSpPr>
+                <p:cNvPr id="7" name="テキスト ボックス 6">
+                  <a:extLst>
+                    <a:ext uri="{FF2B5EF4-FFF2-40B4-BE49-F238E27FC236}">
+                      <a16:creationId xmlns:a16="http://schemas.microsoft.com/office/drawing/2014/main" id="{5DF5C64D-8BDF-4424-8B6F-2E40D980FDDD}"/>
+                    </a:ext>
+                  </a:extLst>
+                </p:cNvPr>
+                <p:cNvSpPr txBox="1"/>
+                <p:nvPr/>
+              </p:nvSpPr>
+              <p:spPr>
+                <a:xfrm>
+                  <a:off x="8228631" y="3549674"/>
+                  <a:ext cx="508151" cy="400110"/>
+                </a:xfrm>
+                <a:prstGeom prst="rect">
+                  <a:avLst/>
+                </a:prstGeom>
+                <a:noFill/>
+              </p:spPr>
+              <p:txBody>
+                <a:bodyPr wrap="none" rtlCol="0">
+                  <a:spAutoFit/>
+                </a:bodyPr>
+                <a:lstStyle/>
+                <a:p>
+                  <a:pPr algn="ctr"/>
+                  <a14:m>
+                    <m:oMathPara xmlns:m="http://schemas.openxmlformats.org/officeDocument/2006/math">
+                      <m:oMathParaPr>
+                        <m:jc m:val="centerGroup"/>
+                      </m:oMathParaPr>
+                      <m:oMath xmlns:m="http://schemas.openxmlformats.org/officeDocument/2006/math">
+                        <m:sSub>
+                          <m:sSubPr>
+                            <m:ctrlPr>
+                              <a:rPr kumimoji="1" lang="en-US" altLang="ja-JP" sz="2000" b="0" i="1" smtClean="0">
+                                <a:latin typeface="Cambria Math" panose="02040503050406030204" pitchFamily="18" charset="0"/>
+                              </a:rPr>
+                            </m:ctrlPr>
+                          </m:sSubPr>
+                          <m:e>
+                            <m:r>
+                              <a:rPr kumimoji="1" lang="en-US" altLang="ja-JP" sz="2000" b="0" i="1" smtClean="0">
+                                <a:latin typeface="Cambria Math" panose="02040503050406030204" pitchFamily="18" charset="0"/>
+                              </a:rPr>
+                              <m:t>𝑥</m:t>
+                            </m:r>
+                          </m:e>
+                          <m:sub>
+                            <m:r>
+                              <a:rPr kumimoji="1" lang="en-US" altLang="ja-JP" sz="2000" b="0" i="1" smtClean="0">
+                                <a:latin typeface="Cambria Math" panose="02040503050406030204" pitchFamily="18" charset="0"/>
+                              </a:rPr>
+                              <m:t>𝑟</m:t>
+                            </m:r>
+                          </m:sub>
+                        </m:sSub>
+                      </m:oMath>
+                    </m:oMathPara>
+                  </a14:m>
+                  <a:endParaRPr kumimoji="1" lang="ja-JP" altLang="en-US" sz="2000" dirty="0"/>
+                </a:p>
+              </p:txBody>
+            </p:sp>
+          </mc:Choice>
+          <mc:Fallback>
+            <p:sp>
+              <p:nvSpPr>
+                <p:cNvPr id="7" name="テキスト ボックス 6">
+                  <a:extLst>
+                    <a:ext uri="{FF2B5EF4-FFF2-40B4-BE49-F238E27FC236}">
+                      <a16:creationId xmlns:a16="http://schemas.microsoft.com/office/drawing/2014/main" id="{5DF5C64D-8BDF-4424-8B6F-2E40D980FDDD}"/>
+                    </a:ext>
+                  </a:extLst>
+                </p:cNvPr>
+                <p:cNvSpPr txBox="1">
+                  <a:spLocks noRot="1" noChangeAspect="1" noMove="1" noResize="1" noEditPoints="1" noAdjustHandles="1" noChangeArrowheads="1" noChangeShapeType="1" noTextEdit="1"/>
+                </p:cNvSpPr>
+                <p:nvPr/>
+              </p:nvSpPr>
+              <p:spPr>
+                <a:xfrm>
+                  <a:off x="8228631" y="3549674"/>
+                  <a:ext cx="508151" cy="400110"/>
+                </a:xfrm>
+                <a:prstGeom prst="rect">
+                  <a:avLst/>
+                </a:prstGeom>
+                <a:blipFill>
+                  <a:blip r:embed="rId3"/>
+                  <a:stretch>
+                    <a:fillRect/>
+                  </a:stretch>
+                </a:blipFill>
+              </p:spPr>
+              <p:txBody>
+                <a:bodyPr/>
+                <a:lstStyle/>
+                <a:p>
+                  <a:r>
+                    <a:rPr lang="ja-JP" altLang="en-US">
+                      <a:noFill/>
+                    </a:rPr>
+                    <a:t> </a:t>
+                  </a:r>
+                </a:p>
+              </p:txBody>
+            </p:sp>
+          </mc:Fallback>
+        </mc:AlternateContent>
+      </p:grpSp>
+      <p:cxnSp>
+        <p:nvCxnSpPr>
+          <p:cNvPr id="8" name="直線矢印コネクタ 7">
+            <a:extLst>
+              <a:ext uri="{FF2B5EF4-FFF2-40B4-BE49-F238E27FC236}">
+                <a16:creationId xmlns:a16="http://schemas.microsoft.com/office/drawing/2014/main" id="{34152CC1-FF6B-402A-B9DA-DAD472D95A18}"/>
+              </a:ext>
+            </a:extLst>
+          </p:cNvPr>
+          <p:cNvCxnSpPr>
+            <a:cxnSpLocks/>
+          </p:cNvCxnSpPr>
+          <p:nvPr/>
+        </p:nvCxnSpPr>
+        <p:spPr>
+          <a:xfrm>
+            <a:off x="5226925" y="4342495"/>
+            <a:ext cx="3775032" cy="0"/>
+          </a:xfrm>
+          <a:prstGeom prst="straightConnector1">
+            <a:avLst/>
+          </a:prstGeom>
+          <a:ln w="19050">
+            <a:solidFill>
+              <a:schemeClr val="tx1"/>
+            </a:solidFill>
+            <a:tailEnd type="triangle"/>
+          </a:ln>
+        </p:spPr>
+        <p:style>
+          <a:lnRef idx="1">
+            <a:schemeClr val="accent1"/>
+          </a:lnRef>
+          <a:fillRef idx="0">
+            <a:schemeClr val="accent1"/>
+          </a:fillRef>
+          <a:effectRef idx="0">
+            <a:schemeClr val="accent1"/>
+          </a:effectRef>
+          <a:fontRef idx="minor">
+            <a:schemeClr val="tx1"/>
+          </a:fontRef>
+        </p:style>
+      </p:cxnSp>
+      <p:cxnSp>
+        <p:nvCxnSpPr>
+          <p:cNvPr id="9" name="直線矢印コネクタ 8">
+            <a:extLst>
+              <a:ext uri="{FF2B5EF4-FFF2-40B4-BE49-F238E27FC236}">
+                <a16:creationId xmlns:a16="http://schemas.microsoft.com/office/drawing/2014/main" id="{E1D572F5-91F4-4729-A817-F252F21F3DC2}"/>
+              </a:ext>
+            </a:extLst>
+          </p:cNvPr>
+          <p:cNvCxnSpPr>
+            <a:cxnSpLocks/>
+          </p:cNvCxnSpPr>
+          <p:nvPr/>
+        </p:nvCxnSpPr>
+        <p:spPr>
+          <a:xfrm flipV="1">
+            <a:off x="5237283" y="891780"/>
+            <a:ext cx="0" cy="3443317"/>
+          </a:xfrm>
+          <a:prstGeom prst="straightConnector1">
+            <a:avLst/>
+          </a:prstGeom>
+          <a:ln w="19050">
+            <a:solidFill>
+              <a:schemeClr val="tx1"/>
+            </a:solidFill>
+            <a:tailEnd type="triangle"/>
+          </a:ln>
+        </p:spPr>
+        <p:style>
+          <a:lnRef idx="1">
+            <a:schemeClr val="accent1"/>
+          </a:lnRef>
+          <a:fillRef idx="0">
+            <a:schemeClr val="accent1"/>
+          </a:fillRef>
+          <a:effectRef idx="0">
+            <a:schemeClr val="accent1"/>
+          </a:effectRef>
+          <a:fontRef idx="minor">
+            <a:schemeClr val="tx1"/>
+          </a:fontRef>
+        </p:style>
+      </p:cxnSp>
+      <mc:AlternateContent xmlns:mc="http://schemas.openxmlformats.org/markup-compatibility/2006">
+        <mc:Choice xmlns:a14="http://schemas.microsoft.com/office/drawing/2010/main" Requires="a14">
+          <p:sp>
+            <p:nvSpPr>
+              <p:cNvPr id="13" name="テキスト ボックス 12">
+                <a:extLst>
+                  <a:ext uri="{FF2B5EF4-FFF2-40B4-BE49-F238E27FC236}">
+                    <a16:creationId xmlns:a16="http://schemas.microsoft.com/office/drawing/2014/main" id="{1332A761-5E8B-4519-8D8B-B9964288E00B}"/>
+                  </a:ext>
+                </a:extLst>
+              </p:cNvPr>
+              <p:cNvSpPr txBox="1"/>
+              <p:nvPr/>
+            </p:nvSpPr>
+            <p:spPr>
+              <a:xfrm>
+                <a:off x="8713544" y="4335097"/>
+                <a:ext cx="576825" cy="400110"/>
+              </a:xfrm>
+              <a:prstGeom prst="rect">
+                <a:avLst/>
+              </a:prstGeom>
+              <a:noFill/>
+            </p:spPr>
+            <p:txBody>
+              <a:bodyPr wrap="none" rtlCol="0">
+                <a:spAutoFit/>
+              </a:bodyPr>
+              <a:lstStyle/>
+              <a:p>
+                <a:pPr algn="ctr"/>
+                <a14:m>
+                  <m:oMathPara xmlns:m="http://schemas.openxmlformats.org/officeDocument/2006/math">
+                    <m:oMathParaPr>
+                      <m:jc m:val="centerGroup"/>
+                    </m:oMathParaPr>
+                    <m:oMath xmlns:m="http://schemas.openxmlformats.org/officeDocument/2006/math">
+                      <m:sSub>
+                        <m:sSubPr>
+                          <m:ctrlPr>
+                            <a:rPr kumimoji="1" lang="en-US" altLang="ja-JP" sz="2000" b="0" i="1" smtClean="0">
+                              <a:latin typeface="Cambria Math" panose="02040503050406030204" pitchFamily="18" charset="0"/>
+                            </a:rPr>
+                          </m:ctrlPr>
+                        </m:sSubPr>
+                        <m:e>
+                          <m:r>
+                            <a:rPr kumimoji="1" lang="en-US" altLang="ja-JP" sz="2000" b="0" i="1" smtClean="0">
+                              <a:latin typeface="Cambria Math" panose="02040503050406030204" pitchFamily="18" charset="0"/>
+                            </a:rPr>
+                            <m:t>𝑥</m:t>
+                          </m:r>
+                        </m:e>
+                        <m:sub>
+                          <m:r>
+                            <a:rPr kumimoji="1" lang="en-US" altLang="ja-JP" sz="2000" b="0" i="1" smtClean="0">
+                              <a:latin typeface="Cambria Math" panose="02040503050406030204" pitchFamily="18" charset="0"/>
+                            </a:rPr>
+                            <m:t>𝑤</m:t>
+                          </m:r>
+                        </m:sub>
+                      </m:sSub>
+                    </m:oMath>
+                  </m:oMathPara>
+                </a14:m>
+                <a:endParaRPr kumimoji="1" lang="ja-JP" altLang="en-US" sz="2000" dirty="0"/>
+              </a:p>
+            </p:txBody>
+          </p:sp>
+        </mc:Choice>
+        <mc:Fallback>
+          <p:sp>
+            <p:nvSpPr>
+              <p:cNvPr id="13" name="テキスト ボックス 12">
+                <a:extLst>
+                  <a:ext uri="{FF2B5EF4-FFF2-40B4-BE49-F238E27FC236}">
+                    <a16:creationId xmlns:a16="http://schemas.microsoft.com/office/drawing/2014/main" id="{1332A761-5E8B-4519-8D8B-B9964288E00B}"/>
+                  </a:ext>
+                </a:extLst>
+              </p:cNvPr>
+              <p:cNvSpPr txBox="1">
+                <a:spLocks noRot="1" noChangeAspect="1" noMove="1" noResize="1" noEditPoints="1" noAdjustHandles="1" noChangeArrowheads="1" noChangeShapeType="1" noTextEdit="1"/>
+              </p:cNvSpPr>
+              <p:nvPr/>
+            </p:nvSpPr>
+            <p:spPr>
+              <a:xfrm>
+                <a:off x="8713544" y="4335097"/>
+                <a:ext cx="576825" cy="400110"/>
+              </a:xfrm>
+              <a:prstGeom prst="rect">
+                <a:avLst/>
+              </a:prstGeom>
+              <a:blipFill>
+                <a:blip r:embed="rId4"/>
+                <a:stretch>
+                  <a:fillRect/>
+                </a:stretch>
+              </a:blipFill>
+            </p:spPr>
+            <p:txBody>
+              <a:bodyPr/>
+              <a:lstStyle/>
+              <a:p>
+                <a:r>
+                  <a:rPr lang="ja-JP" altLang="en-US">
+                    <a:noFill/>
+                  </a:rPr>
+                  <a:t> </a:t>
+                </a:r>
+              </a:p>
+            </p:txBody>
+          </p:sp>
+        </mc:Fallback>
+      </mc:AlternateContent>
+      <mc:AlternateContent xmlns:mc="http://schemas.openxmlformats.org/markup-compatibility/2006">
+        <mc:Choice xmlns:a14="http://schemas.microsoft.com/office/drawing/2010/main" Requires="a14">
+          <p:sp>
+            <p:nvSpPr>
+              <p:cNvPr id="14" name="テキスト ボックス 13">
+                <a:extLst>
+                  <a:ext uri="{FF2B5EF4-FFF2-40B4-BE49-F238E27FC236}">
+                    <a16:creationId xmlns:a16="http://schemas.microsoft.com/office/drawing/2014/main" id="{79768403-E81B-42A3-B9F6-331AD05D0BAC}"/>
+                  </a:ext>
+                </a:extLst>
+              </p:cNvPr>
+              <p:cNvSpPr txBox="1"/>
+              <p:nvPr/>
+            </p:nvSpPr>
+            <p:spPr>
+              <a:xfrm>
+                <a:off x="4822571" y="590200"/>
+                <a:ext cx="549381" cy="400110"/>
+              </a:xfrm>
+              <a:prstGeom prst="rect">
+                <a:avLst/>
+              </a:prstGeom>
+              <a:noFill/>
+            </p:spPr>
+            <p:txBody>
+              <a:bodyPr wrap="none" rtlCol="0">
+                <a:spAutoFit/>
+              </a:bodyPr>
+              <a:lstStyle/>
+              <a:p>
+                <a:pPr algn="ctr"/>
+                <a14:m>
+                  <m:oMathPara xmlns:m="http://schemas.openxmlformats.org/officeDocument/2006/math">
+                    <m:oMathParaPr>
+                      <m:jc m:val="centerGroup"/>
+                    </m:oMathParaPr>
+                    <m:oMath xmlns:m="http://schemas.openxmlformats.org/officeDocument/2006/math">
+                      <m:sSub>
+                        <m:sSubPr>
+                          <m:ctrlPr>
+                            <a:rPr kumimoji="1" lang="en-US" altLang="ja-JP" sz="2000" b="0" i="1" smtClean="0">
+                              <a:latin typeface="Cambria Math" panose="02040503050406030204" pitchFamily="18" charset="0"/>
+                            </a:rPr>
+                          </m:ctrlPr>
+                        </m:sSubPr>
+                        <m:e>
+                          <m:r>
+                            <a:rPr kumimoji="1" lang="en-US" altLang="ja-JP" sz="2000" b="0" i="1" smtClean="0">
+                              <a:latin typeface="Cambria Math" panose="02040503050406030204" pitchFamily="18" charset="0"/>
+                            </a:rPr>
+                            <m:t>𝑦</m:t>
+                          </m:r>
+                        </m:e>
+                        <m:sub>
+                          <m:r>
+                            <a:rPr kumimoji="1" lang="en-US" altLang="ja-JP" sz="2000" b="0" i="1" smtClean="0">
+                              <a:latin typeface="Cambria Math" panose="02040503050406030204" pitchFamily="18" charset="0"/>
+                            </a:rPr>
+                            <m:t>𝑤</m:t>
+                          </m:r>
+                        </m:sub>
+                      </m:sSub>
+                    </m:oMath>
+                  </m:oMathPara>
+                </a14:m>
+                <a:endParaRPr kumimoji="1" lang="ja-JP" altLang="en-US" sz="2000" dirty="0"/>
+              </a:p>
+            </p:txBody>
+          </p:sp>
+        </mc:Choice>
+        <mc:Fallback>
+          <p:sp>
+            <p:nvSpPr>
+              <p:cNvPr id="14" name="テキスト ボックス 13">
+                <a:extLst>
+                  <a:ext uri="{FF2B5EF4-FFF2-40B4-BE49-F238E27FC236}">
+                    <a16:creationId xmlns:a16="http://schemas.microsoft.com/office/drawing/2014/main" id="{79768403-E81B-42A3-B9F6-331AD05D0BAC}"/>
+                  </a:ext>
+                </a:extLst>
+              </p:cNvPr>
+              <p:cNvSpPr txBox="1">
+                <a:spLocks noRot="1" noChangeAspect="1" noMove="1" noResize="1" noEditPoints="1" noAdjustHandles="1" noChangeArrowheads="1" noChangeShapeType="1" noTextEdit="1"/>
+              </p:cNvSpPr>
+              <p:nvPr/>
+            </p:nvSpPr>
+            <p:spPr>
+              <a:xfrm>
+                <a:off x="4822571" y="590200"/>
+                <a:ext cx="549381" cy="400110"/>
+              </a:xfrm>
+              <a:prstGeom prst="rect">
+                <a:avLst/>
+              </a:prstGeom>
+              <a:blipFill>
+                <a:blip r:embed="rId5"/>
+                <a:stretch>
+                  <a:fillRect b="-7692"/>
+                </a:stretch>
+              </a:blipFill>
+            </p:spPr>
+            <p:txBody>
+              <a:bodyPr/>
+              <a:lstStyle/>
+              <a:p>
+                <a:r>
+                  <a:rPr lang="ja-JP" altLang="en-US">
+                    <a:noFill/>
+                  </a:rPr>
+                  <a:t> </a:t>
+                </a:r>
+              </a:p>
+            </p:txBody>
+          </p:sp>
+        </mc:Fallback>
+      </mc:AlternateContent>
+      <p:cxnSp>
+        <p:nvCxnSpPr>
+          <p:cNvPr id="16" name="直線矢印コネクタ 15">
+            <a:extLst>
+              <a:ext uri="{FF2B5EF4-FFF2-40B4-BE49-F238E27FC236}">
+                <a16:creationId xmlns:a16="http://schemas.microsoft.com/office/drawing/2014/main" id="{1E0FCF22-3096-4A94-8172-DD460F443D38}"/>
+              </a:ext>
+            </a:extLst>
+          </p:cNvPr>
+          <p:cNvCxnSpPr>
+            <a:cxnSpLocks/>
+          </p:cNvCxnSpPr>
+          <p:nvPr/>
+        </p:nvCxnSpPr>
+        <p:spPr>
+          <a:xfrm>
+            <a:off x="6468586" y="3615368"/>
+            <a:ext cx="2244958" cy="0"/>
+          </a:xfrm>
+          <a:prstGeom prst="straightConnector1">
+            <a:avLst/>
+          </a:prstGeom>
+          <a:ln w="19050">
+            <a:solidFill>
+              <a:schemeClr val="tx1"/>
+            </a:solidFill>
+            <a:prstDash val="dash"/>
+            <a:tailEnd type="triangle"/>
+          </a:ln>
+        </p:spPr>
+        <p:style>
+          <a:lnRef idx="1">
+            <a:schemeClr val="accent1"/>
+          </a:lnRef>
+          <a:fillRef idx="0">
+            <a:schemeClr val="accent1"/>
+          </a:fillRef>
+          <a:effectRef idx="0">
+            <a:schemeClr val="accent1"/>
+          </a:effectRef>
+          <a:fontRef idx="minor">
+            <a:schemeClr val="tx1"/>
+          </a:fontRef>
+        </p:style>
+      </p:cxnSp>
+      <p:sp>
+        <p:nvSpPr>
+          <p:cNvPr id="18" name="部分円 17">
+            <a:extLst>
+              <a:ext uri="{FF2B5EF4-FFF2-40B4-BE49-F238E27FC236}">
+                <a16:creationId xmlns:a16="http://schemas.microsoft.com/office/drawing/2014/main" id="{854735B4-AA95-4F25-B7DA-28024123F755}"/>
+              </a:ext>
+            </a:extLst>
+          </p:cNvPr>
+          <p:cNvSpPr/>
+          <p:nvPr/>
+        </p:nvSpPr>
+        <p:spPr>
+          <a:xfrm rot="18827171">
+            <a:off x="5797758" y="3030195"/>
+            <a:ext cx="1399140" cy="1162750"/>
+          </a:xfrm>
+          <a:prstGeom prst="pie">
+            <a:avLst>
+              <a:gd name="adj1" fmla="val 1579314"/>
+              <a:gd name="adj2" fmla="val 2785561"/>
+            </a:avLst>
+          </a:prstGeom>
+          <a:solidFill>
+            <a:schemeClr val="accent2">
+              <a:lumMod val="20000"/>
+              <a:lumOff val="80000"/>
+            </a:schemeClr>
+          </a:solidFill>
+        </p:spPr>
+        <p:style>
+          <a:lnRef idx="2">
+            <a:schemeClr val="accent1">
+              <a:shade val="50000"/>
+            </a:schemeClr>
+          </a:lnRef>
+          <a:fillRef idx="1">
+            <a:schemeClr val="accent1"/>
+          </a:fillRef>
+          <a:effectRef idx="0">
+            <a:schemeClr val="accent1"/>
+          </a:effectRef>
+          <a:fontRef idx="minor">
+            <a:schemeClr val="lt1"/>
+          </a:fontRef>
+        </p:style>
+        <p:txBody>
+          <a:bodyPr rtlCol="0" anchor="ctr"/>
+          <a:lstStyle/>
+          <a:p>
+            <a:pPr algn="ctr"/>
+            <a:endParaRPr kumimoji="1" lang="ja-JP" altLang="en-US">
+              <a:solidFill>
+                <a:schemeClr val="tx1"/>
+              </a:solidFill>
+            </a:endParaRPr>
+          </a:p>
+        </p:txBody>
+      </p:sp>
+      <mc:AlternateContent xmlns:mc="http://schemas.openxmlformats.org/markup-compatibility/2006">
+        <mc:Choice xmlns:a14="http://schemas.microsoft.com/office/drawing/2010/main" Requires="a14">
+          <p:sp>
+            <p:nvSpPr>
+              <p:cNvPr id="19" name="テキスト ボックス 18">
+                <a:extLst>
+                  <a:ext uri="{FF2B5EF4-FFF2-40B4-BE49-F238E27FC236}">
+                    <a16:creationId xmlns:a16="http://schemas.microsoft.com/office/drawing/2014/main" id="{907D37E2-D7F2-473E-90F3-87A5816F721E}"/>
+                  </a:ext>
+                </a:extLst>
+              </p:cNvPr>
+              <p:cNvSpPr txBox="1"/>
+              <p:nvPr/>
+            </p:nvSpPr>
+            <p:spPr>
+              <a:xfrm>
+                <a:off x="7259407" y="3228945"/>
+                <a:ext cx="556947" cy="400110"/>
+              </a:xfrm>
+              <a:prstGeom prst="rect">
+                <a:avLst/>
+              </a:prstGeom>
+              <a:noFill/>
+            </p:spPr>
+            <p:txBody>
+              <a:bodyPr wrap="none" rtlCol="0">
+                <a:spAutoFit/>
+              </a:bodyPr>
+              <a:lstStyle/>
+              <a:p>
+                <a:pPr algn="ctr"/>
+                <a14:m>
+                  <m:oMathPara xmlns:m="http://schemas.openxmlformats.org/officeDocument/2006/math">
+                    <m:oMathParaPr>
+                      <m:jc m:val="centerGroup"/>
+                    </m:oMathParaPr>
+                    <m:oMath xmlns:m="http://schemas.openxmlformats.org/officeDocument/2006/math">
+                      <m:sSub>
+                        <m:sSubPr>
+                          <m:ctrlPr>
+                            <a:rPr kumimoji="1" lang="en-US" altLang="ja-JP" sz="2000" b="0" i="1" smtClean="0">
+                              <a:latin typeface="Cambria Math" panose="02040503050406030204" pitchFamily="18" charset="0"/>
+                            </a:rPr>
+                          </m:ctrlPr>
+                        </m:sSubPr>
+                        <m:e>
+                          <m:r>
+                            <a:rPr kumimoji="1" lang="ja-JP" altLang="en-US" sz="2000" b="0" i="1" smtClean="0">
+                              <a:latin typeface="Cambria Math" panose="02040503050406030204" pitchFamily="18" charset="0"/>
+                            </a:rPr>
+                            <m:t>𝜃</m:t>
+                          </m:r>
+                        </m:e>
+                        <m:sub>
+                          <m:r>
+                            <a:rPr kumimoji="1" lang="en-US" altLang="ja-JP" sz="2000" b="0" i="1" smtClean="0">
+                              <a:latin typeface="Cambria Math" panose="02040503050406030204" pitchFamily="18" charset="0"/>
+                            </a:rPr>
+                            <m:t>𝑤</m:t>
+                          </m:r>
+                        </m:sub>
+                      </m:sSub>
+                    </m:oMath>
+                  </m:oMathPara>
+                </a14:m>
+                <a:endParaRPr kumimoji="1" lang="ja-JP" altLang="en-US" sz="2000" dirty="0"/>
+              </a:p>
+            </p:txBody>
+          </p:sp>
+        </mc:Choice>
+        <mc:Fallback>
+          <p:sp>
+            <p:nvSpPr>
+              <p:cNvPr id="19" name="テキスト ボックス 18">
+                <a:extLst>
+                  <a:ext uri="{FF2B5EF4-FFF2-40B4-BE49-F238E27FC236}">
+                    <a16:creationId xmlns:a16="http://schemas.microsoft.com/office/drawing/2014/main" id="{907D37E2-D7F2-473E-90F3-87A5816F721E}"/>
+                  </a:ext>
+                </a:extLst>
+              </p:cNvPr>
+              <p:cNvSpPr txBox="1">
+                <a:spLocks noRot="1" noChangeAspect="1" noMove="1" noResize="1" noEditPoints="1" noAdjustHandles="1" noChangeArrowheads="1" noChangeShapeType="1" noTextEdit="1"/>
+              </p:cNvSpPr>
+              <p:nvPr/>
+            </p:nvSpPr>
+            <p:spPr>
+              <a:xfrm>
+                <a:off x="7259407" y="3228945"/>
+                <a:ext cx="556947" cy="400110"/>
+              </a:xfrm>
+              <a:prstGeom prst="rect">
+                <a:avLst/>
+              </a:prstGeom>
+              <a:blipFill>
+                <a:blip r:embed="rId6"/>
+                <a:stretch>
+                  <a:fillRect/>
+                </a:stretch>
+              </a:blipFill>
+            </p:spPr>
+            <p:txBody>
+              <a:bodyPr/>
+              <a:lstStyle/>
+              <a:p>
+                <a:r>
+                  <a:rPr lang="ja-JP" altLang="en-US">
+                    <a:noFill/>
+                  </a:rPr>
+                  <a:t> </a:t>
+                </a:r>
+              </a:p>
+            </p:txBody>
+          </p:sp>
+        </mc:Fallback>
+      </mc:AlternateContent>
+      <p:sp>
+        <p:nvSpPr>
+          <p:cNvPr id="21" name="テキスト ボックス 20">
+            <a:extLst>
+              <a:ext uri="{FF2B5EF4-FFF2-40B4-BE49-F238E27FC236}">
+                <a16:creationId xmlns:a16="http://schemas.microsoft.com/office/drawing/2014/main" id="{E25CED9C-896D-43E3-8618-3D333ADC827B}"/>
+              </a:ext>
+            </a:extLst>
+          </p:cNvPr>
+          <p:cNvSpPr txBox="1"/>
+          <p:nvPr/>
+        </p:nvSpPr>
+        <p:spPr>
+          <a:xfrm>
+            <a:off x="5538536" y="285765"/>
+            <a:ext cx="3395481" cy="461665"/>
+          </a:xfrm>
+          <a:prstGeom prst="rect">
+            <a:avLst/>
+          </a:prstGeom>
+          <a:noFill/>
+        </p:spPr>
+        <p:txBody>
+          <a:bodyPr wrap="none" rtlCol="0">
+            <a:spAutoFit/>
+          </a:bodyPr>
+          <a:lstStyle/>
+          <a:p>
+            <a:pPr algn="ctr"/>
+            <a:r>
+              <a:rPr kumimoji="1" lang="en-US" altLang="ja-JP" sz="2400" b="1" dirty="0"/>
+              <a:t>Robot pose definition</a:t>
+            </a:r>
+            <a:endParaRPr kumimoji="1" lang="ja-JP" altLang="en-US" sz="2400" b="1" dirty="0"/>
+          </a:p>
+        </p:txBody>
+      </p:sp>
+      <mc:AlternateContent xmlns:mc="http://schemas.openxmlformats.org/markup-compatibility/2006">
+        <mc:Choice xmlns:a14="http://schemas.microsoft.com/office/drawing/2010/main" Requires="a14">
+          <p:sp>
+            <p:nvSpPr>
+              <p:cNvPr id="22" name="テキスト ボックス 21">
+                <a:extLst>
+                  <a:ext uri="{FF2B5EF4-FFF2-40B4-BE49-F238E27FC236}">
+                    <a16:creationId xmlns:a16="http://schemas.microsoft.com/office/drawing/2014/main" id="{9BA0146A-514F-4B35-B753-5CA8D0A08282}"/>
+                  </a:ext>
+                </a:extLst>
+              </p:cNvPr>
+              <p:cNvSpPr txBox="1"/>
+              <p:nvPr/>
+            </p:nvSpPr>
+            <p:spPr>
+              <a:xfrm>
+                <a:off x="6640679" y="2078894"/>
+                <a:ext cx="1237455" cy="400110"/>
+              </a:xfrm>
+              <a:prstGeom prst="rect">
+                <a:avLst/>
+              </a:prstGeom>
+              <a:noFill/>
+            </p:spPr>
+            <p:txBody>
+              <a:bodyPr wrap="none" rtlCol="0">
+                <a:spAutoFit/>
+              </a:bodyPr>
+              <a:lstStyle/>
+              <a:p>
+                <a:pPr algn="ctr"/>
+                <a14:m>
+                  <m:oMathPara xmlns:m="http://schemas.openxmlformats.org/officeDocument/2006/math">
+                    <m:oMathParaPr>
+                      <m:jc m:val="centerGroup"/>
+                    </m:oMathParaPr>
+                    <m:oMath xmlns:m="http://schemas.openxmlformats.org/officeDocument/2006/math">
+                      <m:sSup>
+                        <m:sSupPr>
+                          <m:ctrlPr>
+                            <a:rPr kumimoji="1" lang="en-US" altLang="ja-JP" sz="2000" i="1" smtClean="0">
+                              <a:latin typeface="Cambria Math" panose="02040503050406030204" pitchFamily="18" charset="0"/>
+                            </a:rPr>
+                          </m:ctrlPr>
+                        </m:sSupPr>
+                        <m:e>
+                          <m:r>
+                            <a:rPr kumimoji="1" lang="en-US" altLang="ja-JP" sz="2000" b="0" i="1" smtClean="0">
+                              <a:latin typeface="Cambria Math" panose="02040503050406030204" pitchFamily="18" charset="0"/>
+                            </a:rPr>
+                            <m:t>(</m:t>
+                          </m:r>
+                          <m:r>
+                            <a:rPr kumimoji="1" lang="en-US" altLang="ja-JP" sz="2000" b="0" i="1" smtClean="0">
+                              <a:latin typeface="Cambria Math" panose="02040503050406030204" pitchFamily="18" charset="0"/>
+                            </a:rPr>
+                            <m:t>𝑥</m:t>
+                          </m:r>
+                          <m:r>
+                            <a:rPr kumimoji="1" lang="en-US" altLang="ja-JP" sz="2000" b="0" i="1" smtClean="0">
+                              <a:latin typeface="Cambria Math" panose="02040503050406030204" pitchFamily="18" charset="0"/>
+                            </a:rPr>
+                            <m:t>, </m:t>
+                          </m:r>
+                          <m:r>
+                            <a:rPr kumimoji="1" lang="en-US" altLang="ja-JP" sz="2000" b="0" i="1" smtClean="0">
+                              <a:latin typeface="Cambria Math" panose="02040503050406030204" pitchFamily="18" charset="0"/>
+                            </a:rPr>
+                            <m:t>𝑦</m:t>
+                          </m:r>
+                          <m:r>
+                            <a:rPr kumimoji="1" lang="en-US" altLang="ja-JP" sz="2000" b="0" i="1" smtClean="0">
+                              <a:latin typeface="Cambria Math" panose="02040503050406030204" pitchFamily="18" charset="0"/>
+                            </a:rPr>
+                            <m:t>, </m:t>
+                          </m:r>
+                          <m:r>
+                            <a:rPr kumimoji="1" lang="ja-JP" altLang="en-US" sz="2000" b="0" i="1" smtClean="0">
+                              <a:latin typeface="Cambria Math" panose="02040503050406030204" pitchFamily="18" charset="0"/>
+                            </a:rPr>
+                            <m:t>𝜃</m:t>
+                          </m:r>
+                          <m:r>
+                            <a:rPr kumimoji="1" lang="en-US" altLang="ja-JP" sz="2000" b="0" i="1" smtClean="0">
+                              <a:latin typeface="Cambria Math" panose="02040503050406030204" pitchFamily="18" charset="0"/>
+                            </a:rPr>
+                            <m:t>)</m:t>
+                          </m:r>
+                        </m:e>
+                        <m:sup>
+                          <m:r>
+                            <a:rPr kumimoji="1" lang="en-US" altLang="ja-JP" sz="2000" b="0" i="1" smtClean="0">
+                              <a:latin typeface="Cambria Math" panose="02040503050406030204" pitchFamily="18" charset="0"/>
+                            </a:rPr>
+                            <m:t>𝑇</m:t>
+                          </m:r>
+                        </m:sup>
+                      </m:sSup>
+                    </m:oMath>
+                  </m:oMathPara>
+                </a14:m>
+                <a:endParaRPr kumimoji="1" lang="ja-JP" altLang="en-US" sz="2000" dirty="0"/>
+              </a:p>
+            </p:txBody>
+          </p:sp>
+        </mc:Choice>
+        <mc:Fallback>
+          <p:sp>
+            <p:nvSpPr>
+              <p:cNvPr id="22" name="テキスト ボックス 21">
+                <a:extLst>
+                  <a:ext uri="{FF2B5EF4-FFF2-40B4-BE49-F238E27FC236}">
+                    <a16:creationId xmlns:a16="http://schemas.microsoft.com/office/drawing/2014/main" id="{9BA0146A-514F-4B35-B753-5CA8D0A08282}"/>
+                  </a:ext>
+                </a:extLst>
+              </p:cNvPr>
+              <p:cNvSpPr txBox="1">
+                <a:spLocks noRot="1" noChangeAspect="1" noMove="1" noResize="1" noEditPoints="1" noAdjustHandles="1" noChangeArrowheads="1" noChangeShapeType="1" noTextEdit="1"/>
+              </p:cNvSpPr>
+              <p:nvPr/>
+            </p:nvSpPr>
+            <p:spPr>
+              <a:xfrm>
+                <a:off x="6640679" y="2078894"/>
+                <a:ext cx="1237455" cy="400110"/>
+              </a:xfrm>
+              <a:prstGeom prst="rect">
+                <a:avLst/>
+              </a:prstGeom>
+              <a:blipFill>
+                <a:blip r:embed="rId7"/>
+                <a:stretch>
+                  <a:fillRect l="-1970" b="-15152"/>
+                </a:stretch>
+              </a:blipFill>
+            </p:spPr>
+            <p:txBody>
+              <a:bodyPr/>
+              <a:lstStyle/>
+              <a:p>
+                <a:r>
+                  <a:rPr lang="ja-JP" altLang="en-US">
+                    <a:noFill/>
+                  </a:rPr>
+                  <a:t> </a:t>
+                </a:r>
+              </a:p>
+            </p:txBody>
+          </p:sp>
+        </mc:Fallback>
+      </mc:AlternateContent>
+      <p:cxnSp>
+        <p:nvCxnSpPr>
+          <p:cNvPr id="23" name="直線矢印コネクタ 22">
+            <a:extLst>
+              <a:ext uri="{FF2B5EF4-FFF2-40B4-BE49-F238E27FC236}">
+                <a16:creationId xmlns:a16="http://schemas.microsoft.com/office/drawing/2014/main" id="{4F56A014-8F3C-47BF-87C6-21DF0D8F11C9}"/>
+              </a:ext>
+            </a:extLst>
+          </p:cNvPr>
+          <p:cNvCxnSpPr>
+            <a:cxnSpLocks/>
+            <a:endCxn id="22" idx="2"/>
+          </p:cNvCxnSpPr>
+          <p:nvPr/>
+        </p:nvCxnSpPr>
+        <p:spPr>
+          <a:xfrm flipV="1">
+            <a:off x="6621744" y="2479004"/>
+            <a:ext cx="637663" cy="949996"/>
+          </a:xfrm>
+          <a:prstGeom prst="straightConnector1">
+            <a:avLst/>
+          </a:prstGeom>
+          <a:ln w="19050">
+            <a:solidFill>
+              <a:schemeClr val="tx1"/>
+            </a:solidFill>
+            <a:prstDash val="dash"/>
+            <a:tailEnd type="none"/>
+          </a:ln>
+        </p:spPr>
+        <p:style>
+          <a:lnRef idx="1">
+            <a:schemeClr val="accent1"/>
+          </a:lnRef>
+          <a:fillRef idx="0">
+            <a:schemeClr val="accent1"/>
+          </a:fillRef>
+          <a:effectRef idx="0">
+            <a:schemeClr val="accent1"/>
+          </a:effectRef>
+          <a:fontRef idx="minor">
+            <a:schemeClr val="tx1"/>
+          </a:fontRef>
+        </p:style>
+      </p:cxnSp>
+      <p:cxnSp>
+        <p:nvCxnSpPr>
+          <p:cNvPr id="26" name="直線矢印コネクタ 25">
+            <a:extLst>
+              <a:ext uri="{FF2B5EF4-FFF2-40B4-BE49-F238E27FC236}">
+                <a16:creationId xmlns:a16="http://schemas.microsoft.com/office/drawing/2014/main" id="{EEC76E47-A456-4D2C-9470-F06450456BC4}"/>
+              </a:ext>
+            </a:extLst>
+          </p:cNvPr>
+          <p:cNvCxnSpPr>
+            <a:cxnSpLocks/>
+          </p:cNvCxnSpPr>
+          <p:nvPr/>
+        </p:nvCxnSpPr>
+        <p:spPr>
+          <a:xfrm flipV="1">
+            <a:off x="6480460" y="3580827"/>
+            <a:ext cx="0" cy="754270"/>
+          </a:xfrm>
+          <a:prstGeom prst="straightConnector1">
+            <a:avLst/>
+          </a:prstGeom>
+          <a:ln w="19050">
+            <a:solidFill>
+              <a:schemeClr val="tx1"/>
+            </a:solidFill>
+            <a:prstDash val="dash"/>
+            <a:tailEnd type="none"/>
+          </a:ln>
+        </p:spPr>
+        <p:style>
+          <a:lnRef idx="1">
+            <a:schemeClr val="accent1"/>
+          </a:lnRef>
+          <a:fillRef idx="0">
+            <a:schemeClr val="accent1"/>
+          </a:fillRef>
+          <a:effectRef idx="0">
+            <a:schemeClr val="accent1"/>
+          </a:effectRef>
+          <a:fontRef idx="minor">
+            <a:schemeClr val="tx1"/>
+          </a:fontRef>
+        </p:style>
+      </p:cxnSp>
+      <p:cxnSp>
+        <p:nvCxnSpPr>
+          <p:cNvPr id="28" name="直線矢印コネクタ 27">
+            <a:extLst>
+              <a:ext uri="{FF2B5EF4-FFF2-40B4-BE49-F238E27FC236}">
+                <a16:creationId xmlns:a16="http://schemas.microsoft.com/office/drawing/2014/main" id="{B8D0E046-F2DB-479E-8616-F62229D9D887}"/>
+              </a:ext>
+            </a:extLst>
+          </p:cNvPr>
+          <p:cNvCxnSpPr>
+            <a:cxnSpLocks/>
+          </p:cNvCxnSpPr>
+          <p:nvPr/>
+        </p:nvCxnSpPr>
+        <p:spPr>
+          <a:xfrm>
+            <a:off x="5237282" y="3610583"/>
+            <a:ext cx="1250810" cy="0"/>
+          </a:xfrm>
+          <a:prstGeom prst="straightConnector1">
+            <a:avLst/>
+          </a:prstGeom>
+          <a:ln w="19050">
+            <a:solidFill>
+              <a:schemeClr val="tx1"/>
+            </a:solidFill>
+            <a:prstDash val="dash"/>
+            <a:tailEnd type="none"/>
+          </a:ln>
+        </p:spPr>
+        <p:style>
+          <a:lnRef idx="1">
+            <a:schemeClr val="accent1"/>
+          </a:lnRef>
+          <a:fillRef idx="0">
+            <a:schemeClr val="accent1"/>
+          </a:fillRef>
+          <a:effectRef idx="0">
+            <a:schemeClr val="accent1"/>
+          </a:effectRef>
+          <a:fontRef idx="minor">
+            <a:schemeClr val="tx1"/>
+          </a:fontRef>
+        </p:style>
+      </p:cxnSp>
+    </p:spTree>
+    <p:extLst>
+      <p:ext uri="{BB962C8B-B14F-4D97-AF65-F5344CB8AC3E}">
+        <p14:creationId xmlns:p14="http://schemas.microsoft.com/office/powerpoint/2010/main" val="3294257288"/>
       </p:ext>
     </p:extLst>
   </p:cSld>

</xml_diff>